<commit_message>
Synced content with the Pyth Crash Course content.
</commit_message>
<xml_diff>
--- a/presentations/02_variables_operators_types_style.pptx
+++ b/presentations/02_variables_operators_types_style.pptx
@@ -5,7 +5,7 @@
     <p:sldMasterId id="2147483648" r:id="rId4"/>
   </p:sldMasterIdLst>
   <p:notesMasterIdLst>
-    <p:notesMasterId r:id="rId28"/>
+    <p:notesMasterId r:id="rId26"/>
   </p:notesMasterIdLst>
   <p:sldIdLst>
     <p:sldId id="329" r:id="rId5"/>
@@ -29,8 +29,6 @@
     <p:sldId id="331" r:id="rId23"/>
     <p:sldId id="280" r:id="rId24"/>
     <p:sldId id="273" r:id="rId25"/>
-    <p:sldId id="345" r:id="rId26"/>
-    <p:sldId id="271" r:id="rId27"/>
   </p:sldIdLst>
   <p:sldSz cx="12192000" cy="6858000"/>
   <p:notesSz cx="6858000" cy="9144000"/>
@@ -157,19 +155,180 @@
 </p188:authorLst>
 </file>
 
-<file path=ppt/revisionInfo.xml><?xml version="1.0" encoding="utf-8"?>
-<p1510:revInfo xmlns:a="http://schemas.openxmlformats.org/drawingml/2006/main" xmlns:r="http://schemas.openxmlformats.org/officeDocument/2006/relationships" xmlns:p1510="http://schemas.microsoft.com/office/powerpoint/2015/10/main">
-  <p1510:revLst>
-    <p1510:client id="{07A6B61E-C1A0-4DFF-BA1D-AC60A3FD0371}" v="10" dt="2023-11-30T16:12:38.021"/>
-    <p1510:client id="{0C6293EC-6907-68E5-5001-1052E3FDB578}" v="2" dt="2023-11-30T04:27:44.851"/>
-    <p1510:client id="{1B4ECB15-F96E-6087-430A-D71DFABB7837}" v="5" dt="2023-11-30T04:28:43.941"/>
-    <p1510:client id="{338F8242-20CC-BD5C-C11A-0AAB6E9FA4EF}" v="12" dt="2023-11-30T15:44:50.310"/>
-  </p1510:revLst>
-</p1510:revInfo>
-</file>
-
 <file path=ppt/changesInfos/changesInfo1.xml><?xml version="1.0" encoding="utf-8"?>
 <pc:chgInfo xmlns:a="http://schemas.openxmlformats.org/drawingml/2006/main" xmlns:r="http://schemas.openxmlformats.org/officeDocument/2006/relationships" xmlns:ac="http://schemas.microsoft.com/office/drawing/2013/main/command" xmlns:pc="http://schemas.microsoft.com/office/powerpoint/2013/main/command">
+  <pc:docChgLst>
+    <pc:chgData name="Maxwell,Daniel" userId="1b6ea79d-60d7-472e-a79a-e3fa9de1dfad" providerId="ADAL" clId="{07A6B61E-C1A0-4DFF-BA1D-AC60A3FD0371}"/>
+    <pc:docChg chg="custSel addSld modSld sldOrd">
+      <pc:chgData name="Maxwell,Daniel" userId="1b6ea79d-60d7-472e-a79a-e3fa9de1dfad" providerId="ADAL" clId="{07A6B61E-C1A0-4DFF-BA1D-AC60A3FD0371}" dt="2023-11-30T16:13:34.947" v="333"/>
+      <pc:docMkLst>
+        <pc:docMk/>
+      </pc:docMkLst>
+      <pc:sldChg chg="addSp modSp mod ord modCm">
+        <pc:chgData name="Maxwell,Daniel" userId="1b6ea79d-60d7-472e-a79a-e3fa9de1dfad" providerId="ADAL" clId="{07A6B61E-C1A0-4DFF-BA1D-AC60A3FD0371}" dt="2023-11-30T15:54:01.790" v="17" actId="207"/>
+        <pc:sldMkLst>
+          <pc:docMk/>
+          <pc:sldMk cId="2288319049" sldId="271"/>
+        </pc:sldMkLst>
+        <pc:spChg chg="add mod">
+          <ac:chgData name="Maxwell,Daniel" userId="1b6ea79d-60d7-472e-a79a-e3fa9de1dfad" providerId="ADAL" clId="{07A6B61E-C1A0-4DFF-BA1D-AC60A3FD0371}" dt="2023-11-30T15:54:01.790" v="17" actId="207"/>
+          <ac:spMkLst>
+            <pc:docMk/>
+            <pc:sldMk cId="2288319049" sldId="271"/>
+            <ac:spMk id="5" creationId="{E2E80E2E-17C6-5C5F-46CF-95BD82F6E2D3}"/>
+          </ac:spMkLst>
+        </pc:spChg>
+        <pc:extLst>
+          <p:ext xmlns:p="http://schemas.openxmlformats.org/presentationml/2006/main" uri="{D6D511B9-2390-475A-947B-AFAB55BFBCF1}">
+            <pc226:cmChg xmlns:pc226="http://schemas.microsoft.com/office/powerpoint/2022/06/main/command" chg="">
+              <pc226:chgData name="Maxwell,Daniel" userId="1b6ea79d-60d7-472e-a79a-e3fa9de1dfad" providerId="ADAL" clId="{07A6B61E-C1A0-4DFF-BA1D-AC60A3FD0371}" dt="2023-11-30T15:53:12.287" v="3"/>
+              <pc2:cmMkLst xmlns:pc2="http://schemas.microsoft.com/office/powerpoint/2019/9/main/command">
+                <pc:docMk/>
+                <pc:sldMk cId="2288319049" sldId="271"/>
+                <pc2:cmMk id="{E6BDAA77-A739-405A-B6BB-B3A25F33140A}"/>
+              </pc2:cmMkLst>
+              <pc226:cmRplyChg chg="add">
+                <pc226:chgData name="Maxwell,Daniel" userId="1b6ea79d-60d7-472e-a79a-e3fa9de1dfad" providerId="ADAL" clId="{07A6B61E-C1A0-4DFF-BA1D-AC60A3FD0371}" dt="2023-11-30T15:53:12.287" v="3"/>
+                <pc2:cmRplyMkLst xmlns:pc2="http://schemas.microsoft.com/office/powerpoint/2019/9/main/command">
+                  <pc:docMk/>
+                  <pc:sldMk cId="2288319049" sldId="271"/>
+                  <pc2:cmMk id="{E6BDAA77-A739-405A-B6BB-B3A25F33140A}"/>
+                  <pc2:cmRplyMk id="{DCE30F5A-8568-4A3C-8D4F-CAC1D5150671}"/>
+                </pc2:cmRplyMkLst>
+              </pc226:cmRplyChg>
+            </pc226:cmChg>
+          </p:ext>
+        </pc:extLst>
+      </pc:sldChg>
+      <pc:sldChg chg="modSp modAnim modCm modNotesTx">
+        <pc:chgData name="Maxwell,Daniel" userId="1b6ea79d-60d7-472e-a79a-e3fa9de1dfad" providerId="ADAL" clId="{07A6B61E-C1A0-4DFF-BA1D-AC60A3FD0371}" dt="2023-11-30T16:13:34.947" v="333"/>
+        <pc:sldMkLst>
+          <pc:docMk/>
+          <pc:sldMk cId="1958738313" sldId="273"/>
+        </pc:sldMkLst>
+        <pc:spChg chg="mod">
+          <ac:chgData name="Maxwell,Daniel" userId="1b6ea79d-60d7-472e-a79a-e3fa9de1dfad" providerId="ADAL" clId="{07A6B61E-C1A0-4DFF-BA1D-AC60A3FD0371}" dt="2023-11-30T16:12:38.021" v="330" actId="20577"/>
+          <ac:spMkLst>
+            <pc:docMk/>
+            <pc:sldMk cId="1958738313" sldId="273"/>
+            <ac:spMk id="3" creationId="{1E86C963-755D-4715-8118-D4601D47AAD3}"/>
+          </ac:spMkLst>
+        </pc:spChg>
+        <pc:extLst>
+          <p:ext xmlns:p="http://schemas.openxmlformats.org/presentationml/2006/main" uri="{D6D511B9-2390-475A-947B-AFAB55BFBCF1}">
+            <pc226:cmChg xmlns:pc226="http://schemas.microsoft.com/office/powerpoint/2022/06/main/command" chg="">
+              <pc226:chgData name="Maxwell,Daniel" userId="1b6ea79d-60d7-472e-a79a-e3fa9de1dfad" providerId="ADAL" clId="{07A6B61E-C1A0-4DFF-BA1D-AC60A3FD0371}" dt="2023-11-30T16:13:34.947" v="333"/>
+              <pc2:cmMkLst xmlns:pc2="http://schemas.microsoft.com/office/powerpoint/2019/9/main/command">
+                <pc:docMk/>
+                <pc:sldMk cId="1958738313" sldId="273"/>
+                <pc2:cmMk id="{279D8E60-1B1E-4A01-A3C3-6A6B0DC1111B}"/>
+              </pc2:cmMkLst>
+              <pc226:cmRplyChg chg="add mod">
+                <pc226:chgData name="Maxwell,Daniel" userId="1b6ea79d-60d7-472e-a79a-e3fa9de1dfad" providerId="ADAL" clId="{07A6B61E-C1A0-4DFF-BA1D-AC60A3FD0371}" dt="2023-11-30T16:13:34.947" v="333"/>
+                <pc2:cmRplyMkLst xmlns:pc2="http://schemas.microsoft.com/office/powerpoint/2019/9/main/command">
+                  <pc:docMk/>
+                  <pc:sldMk cId="1958738313" sldId="273"/>
+                  <pc2:cmMk id="{279D8E60-1B1E-4A01-A3C3-6A6B0DC1111B}"/>
+                  <pc2:cmRplyMk id="{0B6C524A-4666-4B12-BDBF-84AD15C84700}"/>
+                </pc2:cmRplyMkLst>
+              </pc226:cmRplyChg>
+            </pc226:cmChg>
+          </p:ext>
+        </pc:extLst>
+      </pc:sldChg>
+      <pc:sldChg chg="addSp delSp modSp mod modCm modNotesTx">
+        <pc:chgData name="Maxwell,Daniel" userId="1b6ea79d-60d7-472e-a79a-e3fa9de1dfad" providerId="ADAL" clId="{07A6B61E-C1A0-4DFF-BA1D-AC60A3FD0371}" dt="2023-11-30T16:06:33.943" v="327" actId="20577"/>
+        <pc:sldMkLst>
+          <pc:docMk/>
+          <pc:sldMk cId="4083169647" sldId="280"/>
+        </pc:sldMkLst>
+        <pc:spChg chg="add del">
+          <ac:chgData name="Maxwell,Daniel" userId="1b6ea79d-60d7-472e-a79a-e3fa9de1dfad" providerId="ADAL" clId="{07A6B61E-C1A0-4DFF-BA1D-AC60A3FD0371}" dt="2023-11-30T15:57:00.704" v="23" actId="478"/>
+          <ac:spMkLst>
+            <pc:docMk/>
+            <pc:sldMk cId="4083169647" sldId="280"/>
+            <ac:spMk id="4" creationId="{F2CD9A60-39C9-50E1-1BF6-314C91715334}"/>
+          </ac:spMkLst>
+        </pc:spChg>
+        <pc:spChg chg="add del">
+          <ac:chgData name="Maxwell,Daniel" userId="1b6ea79d-60d7-472e-a79a-e3fa9de1dfad" providerId="ADAL" clId="{07A6B61E-C1A0-4DFF-BA1D-AC60A3FD0371}" dt="2023-11-30T15:57:39.520" v="25" actId="478"/>
+          <ac:spMkLst>
+            <pc:docMk/>
+            <pc:sldMk cId="4083169647" sldId="280"/>
+            <ac:spMk id="5" creationId="{FE640065-B982-6D8F-531E-14BED0FBECD8}"/>
+          </ac:spMkLst>
+        </pc:spChg>
+        <pc:spChg chg="mod">
+          <ac:chgData name="Maxwell,Daniel" userId="1b6ea79d-60d7-472e-a79a-e3fa9de1dfad" providerId="ADAL" clId="{07A6B61E-C1A0-4DFF-BA1D-AC60A3FD0371}" dt="2023-11-30T16:04:39.878" v="160" actId="20577"/>
+          <ac:spMkLst>
+            <pc:docMk/>
+            <pc:sldMk cId="4083169647" sldId="280"/>
+            <ac:spMk id="11" creationId="{D139B772-0676-4CFA-8DC1-30205C5EF85F}"/>
+          </ac:spMkLst>
+        </pc:spChg>
+        <pc:picChg chg="add del">
+          <ac:chgData name="Maxwell,Daniel" userId="1b6ea79d-60d7-472e-a79a-e3fa9de1dfad" providerId="ADAL" clId="{07A6B61E-C1A0-4DFF-BA1D-AC60A3FD0371}" dt="2023-11-30T16:00:49.419" v="27" actId="478"/>
+          <ac:picMkLst>
+            <pc:docMk/>
+            <pc:sldMk cId="4083169647" sldId="280"/>
+            <ac:picMk id="7" creationId="{5AEED4D5-7125-D5A2-7A51-97090C652BD4}"/>
+          </ac:picMkLst>
+        </pc:picChg>
+        <pc:picChg chg="del mod">
+          <ac:chgData name="Maxwell,Daniel" userId="1b6ea79d-60d7-472e-a79a-e3fa9de1dfad" providerId="ADAL" clId="{07A6B61E-C1A0-4DFF-BA1D-AC60A3FD0371}" dt="2023-11-30T15:56:50.083" v="20" actId="478"/>
+          <ac:picMkLst>
+            <pc:docMk/>
+            <pc:sldMk cId="4083169647" sldId="280"/>
+            <ac:picMk id="8" creationId="{40E51E7D-A4F8-47A3-953B-E63CEA5AA233}"/>
+          </ac:picMkLst>
+        </pc:picChg>
+        <pc:picChg chg="add">
+          <ac:chgData name="Maxwell,Daniel" userId="1b6ea79d-60d7-472e-a79a-e3fa9de1dfad" providerId="ADAL" clId="{07A6B61E-C1A0-4DFF-BA1D-AC60A3FD0371}" dt="2023-11-30T16:00:52.240" v="28"/>
+          <ac:picMkLst>
+            <pc:docMk/>
+            <pc:sldMk cId="4083169647" sldId="280"/>
+            <ac:picMk id="1030" creationId="{BF0429D3-C239-9943-FFF1-53DBD8570023}"/>
+          </ac:picMkLst>
+        </pc:picChg>
+        <pc:picChg chg="del">
+          <ac:chgData name="Maxwell,Daniel" userId="1b6ea79d-60d7-472e-a79a-e3fa9de1dfad" providerId="ADAL" clId="{07A6B61E-C1A0-4DFF-BA1D-AC60A3FD0371}" dt="2023-11-30T15:56:53.091" v="22" actId="478"/>
+          <ac:picMkLst>
+            <pc:docMk/>
+            <pc:sldMk cId="4083169647" sldId="280"/>
+            <ac:picMk id="2050" creationId="{A8A604AE-38F9-4BA8-858C-E33429DF7680}"/>
+          </ac:picMkLst>
+        </pc:picChg>
+        <pc:extLst>
+          <p:ext xmlns:p="http://schemas.openxmlformats.org/presentationml/2006/main" uri="{D6D511B9-2390-475A-947B-AFAB55BFBCF1}">
+            <pc226:cmChg xmlns:pc226="http://schemas.microsoft.com/office/powerpoint/2022/06/main/command" chg="mod">
+              <pc226:chgData name="Maxwell,Daniel" userId="1b6ea79d-60d7-472e-a79a-e3fa9de1dfad" providerId="ADAL" clId="{07A6B61E-C1A0-4DFF-BA1D-AC60A3FD0371}" dt="2023-11-30T16:06:12.841" v="319"/>
+              <pc2:cmMkLst xmlns:pc2="http://schemas.microsoft.com/office/powerpoint/2019/9/main/command">
+                <pc:docMk/>
+                <pc:sldMk cId="4083169647" sldId="280"/>
+                <pc2:cmMk id="{5F15D6F7-5430-4AC9-BBFC-8F52A8F0598E}"/>
+              </pc2:cmMkLst>
+              <pc226:cmRplyChg chg="add mod">
+                <pc226:chgData name="Maxwell,Daniel" userId="1b6ea79d-60d7-472e-a79a-e3fa9de1dfad" providerId="ADAL" clId="{07A6B61E-C1A0-4DFF-BA1D-AC60A3FD0371}" dt="2023-11-30T16:06:12.841" v="319"/>
+                <pc2:cmRplyMkLst xmlns:pc2="http://schemas.microsoft.com/office/powerpoint/2019/9/main/command">
+                  <pc:docMk/>
+                  <pc:sldMk cId="4083169647" sldId="280"/>
+                  <pc2:cmMk id="{5F15D6F7-5430-4AC9-BBFC-8F52A8F0598E}"/>
+                  <pc2:cmRplyMk id="{A4FC82C3-2706-46AC-B467-9E87A89C8272}"/>
+                </pc2:cmRplyMkLst>
+              </pc226:cmRplyChg>
+            </pc226:cmChg>
+          </p:ext>
+        </pc:extLst>
+      </pc:sldChg>
+      <pc:sldChg chg="new">
+        <pc:chgData name="Maxwell,Daniel" userId="1b6ea79d-60d7-472e-a79a-e3fa9de1dfad" providerId="ADAL" clId="{07A6B61E-C1A0-4DFF-BA1D-AC60A3FD0371}" dt="2023-11-30T15:52:19.945" v="2" actId="680"/>
+        <pc:sldMkLst>
+          <pc:docMk/>
+          <pc:sldMk cId="4273893588" sldId="345"/>
+        </pc:sldMkLst>
+      </pc:sldChg>
+    </pc:docChg>
+  </pc:docChgLst>
   <pc:docChgLst>
     <pc:chgData name="Maxwell,Daniel" userId="1b6ea79d-60d7-472e-a79a-e3fa9de1dfad" providerId="ADAL" clId="{D1C6496E-3BE3-4DEB-AF75-EF1923EDB2CD}"/>
     <pc:docChg chg="custSel modSld">
@@ -187,22 +346,22 @@
     </pc:docChg>
   </pc:docChgLst>
   <pc:docChgLst>
-    <pc:chgData name="brian.stucky" userId="S::brian.stucky_usda.gov#ext#@uflorida.onmicrosoft.com::5072c14d-432b-458e-801b-9505db496804" providerId="AD" clId="Web-{1B4ECB15-F96E-6087-430A-D71DFABB7837}"/>
-    <pc:docChg chg="mod">
-      <pc:chgData name="brian.stucky" userId="S::brian.stucky_usda.gov#ext#@uflorida.onmicrosoft.com::5072c14d-432b-458e-801b-9505db496804" providerId="AD" clId="Web-{1B4ECB15-F96E-6087-430A-D71DFABB7837}" dt="2023-11-30T04:28:43.941" v="4"/>
+    <pc:chgData name="Gitzendanner, Matt" userId="b4bd9a28-947d-4019-a646-080a1de8474c" providerId="ADAL" clId="{97F31FD1-00C1-4414-A100-D1220899B2F0}"/>
+    <pc:docChg chg="">
+      <pc:chgData name="Gitzendanner, Matt" userId="b4bd9a28-947d-4019-a646-080a1de8474c" providerId="ADAL" clId="{97F31FD1-00C1-4414-A100-D1220899B2F0}" dt="2023-11-30T19:49:28.290" v="3"/>
       <pc:docMkLst>
         <pc:docMk/>
       </pc:docMkLst>
-      <pc:sldChg chg="addCm">
-        <pc:chgData name="brian.stucky" userId="S::brian.stucky_usda.gov#ext#@uflorida.onmicrosoft.com::5072c14d-432b-458e-801b-9505db496804" providerId="AD" clId="Web-{1B4ECB15-F96E-6087-430A-D71DFABB7837}" dt="2023-11-30T04:25:38.670" v="1"/>
+      <pc:sldChg chg="delCm">
+        <pc:chgData name="Gitzendanner, Matt" userId="b4bd9a28-947d-4019-a646-080a1de8474c" providerId="ADAL" clId="{97F31FD1-00C1-4414-A100-D1220899B2F0}" dt="2023-11-30T19:48:04.519" v="0"/>
         <pc:sldMkLst>
           <pc:docMk/>
           <pc:sldMk cId="1497806272" sldId="256"/>
         </pc:sldMkLst>
         <pc:extLst>
           <p:ext xmlns:p="http://schemas.openxmlformats.org/presentationml/2006/main" uri="{D6D511B9-2390-475A-947B-AFAB55BFBCF1}">
-            <pc226:cmChg xmlns:pc226="http://schemas.microsoft.com/office/powerpoint/2022/06/main/command" chg="add">
-              <pc226:chgData name="brian.stucky" userId="S::brian.stucky_usda.gov#ext#@uflorida.onmicrosoft.com::5072c14d-432b-458e-801b-9505db496804" providerId="AD" clId="Web-{1B4ECB15-F96E-6087-430A-D71DFABB7837}" dt="2023-11-30T04:25:38.670" v="1"/>
+            <pc226:cmChg xmlns:pc226="http://schemas.microsoft.com/office/powerpoint/2022/06/main/command" chg="del">
+              <pc226:chgData name="Gitzendanner, Matt" userId="b4bd9a28-947d-4019-a646-080a1de8474c" providerId="ADAL" clId="{97F31FD1-00C1-4414-A100-D1220899B2F0}" dt="2023-11-30T19:48:04.519" v="0"/>
               <pc2:cmMkLst xmlns:pc2="http://schemas.microsoft.com/office/powerpoint/2019/9/main/command">
                 <pc:docMk/>
                 <pc:sldMk cId="1497806272" sldId="256"/>
@@ -212,54 +371,35 @@
           </p:ext>
         </pc:extLst>
       </pc:sldChg>
-      <pc:sldChg chg="addCm">
-        <pc:chgData name="brian.stucky" userId="S::brian.stucky_usda.gov#ext#@uflorida.onmicrosoft.com::5072c14d-432b-458e-801b-9505db496804" providerId="AD" clId="Web-{1B4ECB15-F96E-6087-430A-D71DFABB7837}" dt="2023-11-30T04:26:42.781" v="2"/>
+      <pc:sldChg chg="delCm">
+        <pc:chgData name="Gitzendanner, Matt" userId="b4bd9a28-947d-4019-a646-080a1de8474c" providerId="ADAL" clId="{97F31FD1-00C1-4414-A100-D1220899B2F0}" dt="2023-11-30T19:48:27.549" v="1"/>
         <pc:sldMkLst>
           <pc:docMk/>
-          <pc:sldMk cId="2288319049" sldId="271"/>
+          <pc:sldMk cId="662354849" sldId="260"/>
         </pc:sldMkLst>
         <pc:extLst>
           <p:ext xmlns:p="http://schemas.openxmlformats.org/presentationml/2006/main" uri="{D6D511B9-2390-475A-947B-AFAB55BFBCF1}">
-            <pc226:cmChg xmlns:pc226="http://schemas.microsoft.com/office/powerpoint/2022/06/main/command" chg="add">
-              <pc226:chgData name="brian.stucky" userId="S::brian.stucky_usda.gov#ext#@uflorida.onmicrosoft.com::5072c14d-432b-458e-801b-9505db496804" providerId="AD" clId="Web-{1B4ECB15-F96E-6087-430A-D71DFABB7837}" dt="2023-11-30T04:26:42.781" v="2"/>
+            <pc226:cmChg xmlns:pc226="http://schemas.microsoft.com/office/powerpoint/2022/06/main/command" chg="del">
+              <pc226:chgData name="Gitzendanner, Matt" userId="b4bd9a28-947d-4019-a646-080a1de8474c" providerId="ADAL" clId="{97F31FD1-00C1-4414-A100-D1220899B2F0}" dt="2023-11-30T19:48:27.549" v="1"/>
               <pc2:cmMkLst xmlns:pc2="http://schemas.microsoft.com/office/powerpoint/2019/9/main/command">
                 <pc:docMk/>
-                <pc:sldMk cId="2288319049" sldId="271"/>
-                <pc2:cmMk id="{E6BDAA77-A739-405A-B6BB-B3A25F33140A}"/>
+                <pc:sldMk cId="662354849" sldId="260"/>
+                <pc2:cmMk id="{F0E7D142-9E67-4A1B-B1CA-B53583088BD4}"/>
               </pc2:cmMkLst>
             </pc226:cmChg>
           </p:ext>
         </pc:extLst>
       </pc:sldChg>
-      <pc:sldChg chg="addCm">
-        <pc:chgData name="brian.stucky" userId="S::brian.stucky_usda.gov#ext#@uflorida.onmicrosoft.com::5072c14d-432b-458e-801b-9505db496804" providerId="AD" clId="Web-{1B4ECB15-F96E-6087-430A-D71DFABB7837}" dt="2023-11-30T04:28:43.941" v="4"/>
-        <pc:sldMkLst>
-          <pc:docMk/>
-          <pc:sldMk cId="1958738313" sldId="273"/>
-        </pc:sldMkLst>
-        <pc:extLst>
-          <p:ext xmlns:p="http://schemas.openxmlformats.org/presentationml/2006/main" uri="{D6D511B9-2390-475A-947B-AFAB55BFBCF1}">
-            <pc226:cmChg xmlns:pc226="http://schemas.microsoft.com/office/powerpoint/2022/06/main/command" chg="add">
-              <pc226:chgData name="brian.stucky" userId="S::brian.stucky_usda.gov#ext#@uflorida.onmicrosoft.com::5072c14d-432b-458e-801b-9505db496804" providerId="AD" clId="Web-{1B4ECB15-F96E-6087-430A-D71DFABB7837}" dt="2023-11-30T04:28:43.941" v="4"/>
-              <pc2:cmMkLst xmlns:pc2="http://schemas.microsoft.com/office/powerpoint/2019/9/main/command">
-                <pc:docMk/>
-                <pc:sldMk cId="1958738313" sldId="273"/>
-                <pc2:cmMk id="{279D8E60-1B1E-4A01-A3C3-6A6B0DC1111B}"/>
-              </pc2:cmMkLst>
-            </pc226:cmChg>
-          </p:ext>
-        </pc:extLst>
-      </pc:sldChg>
-      <pc:sldChg chg="addCm">
-        <pc:chgData name="brian.stucky" userId="S::brian.stucky_usda.gov#ext#@uflorida.onmicrosoft.com::5072c14d-432b-458e-801b-9505db496804" providerId="AD" clId="Web-{1B4ECB15-F96E-6087-430A-D71DFABB7837}" dt="2023-11-30T04:27:45.080" v="3"/>
+      <pc:sldChg chg="delCm modCm">
+        <pc:chgData name="Gitzendanner, Matt" userId="b4bd9a28-947d-4019-a646-080a1de8474c" providerId="ADAL" clId="{97F31FD1-00C1-4414-A100-D1220899B2F0}" dt="2023-11-30T19:49:28.290" v="3"/>
         <pc:sldMkLst>
           <pc:docMk/>
           <pc:sldMk cId="4083169647" sldId="280"/>
         </pc:sldMkLst>
         <pc:extLst>
           <p:ext xmlns:p="http://schemas.openxmlformats.org/presentationml/2006/main" uri="{D6D511B9-2390-475A-947B-AFAB55BFBCF1}">
-            <pc226:cmChg xmlns:pc226="http://schemas.microsoft.com/office/powerpoint/2022/06/main/command" chg="add">
-              <pc226:chgData name="brian.stucky" userId="S::brian.stucky_usda.gov#ext#@uflorida.onmicrosoft.com::5072c14d-432b-458e-801b-9505db496804" providerId="AD" clId="Web-{1B4ECB15-F96E-6087-430A-D71DFABB7837}" dt="2023-11-30T04:27:45.080" v="3"/>
+            <pc226:cmChg xmlns:pc226="http://schemas.microsoft.com/office/powerpoint/2022/06/main/command" chg="del mod modRxn">
+              <pc226:chgData name="Gitzendanner, Matt" userId="b4bd9a28-947d-4019-a646-080a1de8474c" providerId="ADAL" clId="{97F31FD1-00C1-4414-A100-D1220899B2F0}" dt="2023-11-30T19:49:28.290" v="3"/>
               <pc2:cmMkLst xmlns:pc2="http://schemas.microsoft.com/office/powerpoint/2019/9/main/command">
                 <pc:docMk/>
                 <pc:sldMk cId="4083169647" sldId="280"/>
@@ -337,6 +477,115 @@
             <ac:picMk id="5" creationId="{FD7C293A-3CC2-A34D-CEFE-88CF5ED0E9E5}"/>
           </ac:picMkLst>
         </pc:picChg>
+      </pc:sldChg>
+    </pc:docChg>
+  </pc:docChgLst>
+  <pc:docChgLst>
+    <pc:chgData name="Maxwell,Daniel" userId="S::danielmaxwell@ufl.edu::1b6ea79d-60d7-472e-a79a-e3fa9de1dfad" providerId="AD" clId="Web-{338F8242-20CC-BD5C-C11A-0AAB6E9FA4EF}"/>
+    <pc:docChg chg="mod modSld">
+      <pc:chgData name="Maxwell,Daniel" userId="S::danielmaxwell@ufl.edu::1b6ea79d-60d7-472e-a79a-e3fa9de1dfad" providerId="AD" clId="Web-{338F8242-20CC-BD5C-C11A-0AAB6E9FA4EF}" dt="2023-11-30T15:44:50.310" v="19" actId="20577"/>
+      <pc:docMkLst>
+        <pc:docMk/>
+      </pc:docMkLst>
+      <pc:sldChg chg="modSp modCm">
+        <pc:chgData name="Maxwell,Daniel" userId="S::danielmaxwell@ufl.edu::1b6ea79d-60d7-472e-a79a-e3fa9de1dfad" providerId="AD" clId="Web-{338F8242-20CC-BD5C-C11A-0AAB6E9FA4EF}" dt="2023-11-30T15:42:05.399" v="9" actId="20577"/>
+        <pc:sldMkLst>
+          <pc:docMk/>
+          <pc:sldMk cId="1497806272" sldId="256"/>
+        </pc:sldMkLst>
+        <pc:spChg chg="mod">
+          <ac:chgData name="Maxwell,Daniel" userId="S::danielmaxwell@ufl.edu::1b6ea79d-60d7-472e-a79a-e3fa9de1dfad" providerId="AD" clId="Web-{338F8242-20CC-BD5C-C11A-0AAB6E9FA4EF}" dt="2023-11-30T15:42:05.399" v="9" actId="20577"/>
+          <ac:spMkLst>
+            <pc:docMk/>
+            <pc:sldMk cId="1497806272" sldId="256"/>
+            <ac:spMk id="5" creationId="{00000000-0000-0000-0000-000000000000}"/>
+          </ac:spMkLst>
+        </pc:spChg>
+        <pc:extLst>
+          <p:ext xmlns:p="http://schemas.openxmlformats.org/presentationml/2006/main" uri="{D6D511B9-2390-475A-947B-AFAB55BFBCF1}">
+            <pc226:cmChg xmlns:pc226="http://schemas.microsoft.com/office/powerpoint/2022/06/main/command" chg="mod">
+              <pc226:chgData name="Maxwell,Daniel" userId="S::danielmaxwell@ufl.edu::1b6ea79d-60d7-472e-a79a-e3fa9de1dfad" providerId="AD" clId="Web-{338F8242-20CC-BD5C-C11A-0AAB6E9FA4EF}" dt="2023-11-30T15:42:05.399" v="9" actId="20577"/>
+              <pc2:cmMkLst xmlns:pc2="http://schemas.microsoft.com/office/powerpoint/2019/9/main/command">
+                <pc:docMk/>
+                <pc:sldMk cId="1497806272" sldId="256"/>
+                <pc2:cmMk id="{329310D8-0964-4626-8D31-036CD4CD6DB2}"/>
+              </pc2:cmMkLst>
+              <pc226:cmRplyChg chg="add">
+                <pc226:chgData name="Maxwell,Daniel" userId="S::danielmaxwell@ufl.edu::1b6ea79d-60d7-472e-a79a-e3fa9de1dfad" providerId="AD" clId="Web-{338F8242-20CC-BD5C-C11A-0AAB6E9FA4EF}" dt="2023-11-30T15:41:56.665" v="8"/>
+                <pc2:cmRplyMkLst xmlns:pc2="http://schemas.microsoft.com/office/powerpoint/2019/9/main/command">
+                  <pc:docMk/>
+                  <pc:sldMk cId="1497806272" sldId="256"/>
+                  <pc2:cmMk id="{329310D8-0964-4626-8D31-036CD4CD6DB2}"/>
+                  <pc2:cmRplyMk id="{36A94BD6-17CD-4865-AA4B-B5ADDC784817}"/>
+                </pc2:cmRplyMkLst>
+              </pc226:cmRplyChg>
+            </pc226:cmChg>
+          </p:ext>
+        </pc:extLst>
+      </pc:sldChg>
+      <pc:sldChg chg="modSp modCm">
+        <pc:chgData name="Maxwell,Daniel" userId="S::danielmaxwell@ufl.edu::1b6ea79d-60d7-472e-a79a-e3fa9de1dfad" providerId="AD" clId="Web-{338F8242-20CC-BD5C-C11A-0AAB6E9FA4EF}" dt="2023-11-30T15:44:50.310" v="19" actId="20577"/>
+        <pc:sldMkLst>
+          <pc:docMk/>
+          <pc:sldMk cId="662354849" sldId="260"/>
+        </pc:sldMkLst>
+        <pc:spChg chg="mod">
+          <ac:chgData name="Maxwell,Daniel" userId="S::danielmaxwell@ufl.edu::1b6ea79d-60d7-472e-a79a-e3fa9de1dfad" providerId="AD" clId="Web-{338F8242-20CC-BD5C-C11A-0AAB6E9FA4EF}" dt="2023-11-30T15:44:50.310" v="19" actId="20577"/>
+          <ac:spMkLst>
+            <pc:docMk/>
+            <pc:sldMk cId="662354849" sldId="260"/>
+            <ac:spMk id="5" creationId="{00000000-0000-0000-0000-000000000000}"/>
+          </ac:spMkLst>
+        </pc:spChg>
+        <pc:extLst>
+          <p:ext xmlns:p="http://schemas.openxmlformats.org/presentationml/2006/main" uri="{D6D511B9-2390-475A-947B-AFAB55BFBCF1}">
+            <pc226:cmChg xmlns:pc226="http://schemas.microsoft.com/office/powerpoint/2022/06/main/command" chg="">
+              <pc226:chgData name="Maxwell,Daniel" userId="S::danielmaxwell@ufl.edu::1b6ea79d-60d7-472e-a79a-e3fa9de1dfad" providerId="AD" clId="Web-{338F8242-20CC-BD5C-C11A-0AAB6E9FA4EF}" dt="2023-11-30T15:44:45.763" v="18"/>
+              <pc2:cmMkLst xmlns:pc2="http://schemas.microsoft.com/office/powerpoint/2019/9/main/command">
+                <pc:docMk/>
+                <pc:sldMk cId="662354849" sldId="260"/>
+                <pc2:cmMk id="{F0E7D142-9E67-4A1B-B1CA-B53583088BD4}"/>
+              </pc2:cmMkLst>
+              <pc226:cmRplyChg chg="add">
+                <pc226:chgData name="Maxwell,Daniel" userId="S::danielmaxwell@ufl.edu::1b6ea79d-60d7-472e-a79a-e3fa9de1dfad" providerId="AD" clId="Web-{338F8242-20CC-BD5C-C11A-0AAB6E9FA4EF}" dt="2023-11-30T15:44:45.763" v="18"/>
+                <pc2:cmRplyMkLst xmlns:pc2="http://schemas.microsoft.com/office/powerpoint/2019/9/main/command">
+                  <pc:docMk/>
+                  <pc:sldMk cId="662354849" sldId="260"/>
+                  <pc2:cmMk id="{F0E7D142-9E67-4A1B-B1CA-B53583088BD4}"/>
+                  <pc2:cmRplyMk id="{60C0CA22-AFBD-4523-BB43-F7FEE42AA451}"/>
+                </pc2:cmRplyMkLst>
+              </pc226:cmRplyChg>
+            </pc226:cmChg>
+          </p:ext>
+        </pc:extLst>
+      </pc:sldChg>
+    </pc:docChg>
+  </pc:docChgLst>
+  <pc:docChgLst>
+    <pc:chgData name="heather.savoy" userId="S::heather.savoy_usda.gov#ext#@uflorida.onmicrosoft.com::14fc4cfb-ad45-439a-89d7-7df559a38e96" providerId="AD" clId="Web-{0C6293EC-6907-68E5-5001-1052E3FDB578}"/>
+    <pc:docChg chg="mod">
+      <pc:chgData name="heather.savoy" userId="S::heather.savoy_usda.gov#ext#@uflorida.onmicrosoft.com::14fc4cfb-ad45-439a-89d7-7df559a38e96" providerId="AD" clId="Web-{0C6293EC-6907-68E5-5001-1052E3FDB578}" dt="2023-11-30T04:27:44.851" v="1"/>
+      <pc:docMkLst>
+        <pc:docMk/>
+      </pc:docMkLst>
+      <pc:sldChg chg="addCm">
+        <pc:chgData name="heather.savoy" userId="S::heather.savoy_usda.gov#ext#@uflorida.onmicrosoft.com::14fc4cfb-ad45-439a-89d7-7df559a38e96" providerId="AD" clId="Web-{0C6293EC-6907-68E5-5001-1052E3FDB578}" dt="2023-11-30T04:27:44.851" v="1"/>
+        <pc:sldMkLst>
+          <pc:docMk/>
+          <pc:sldMk cId="662354849" sldId="260"/>
+        </pc:sldMkLst>
+        <pc:extLst>
+          <p:ext xmlns:p="http://schemas.openxmlformats.org/presentationml/2006/main" uri="{D6D511B9-2390-475A-947B-AFAB55BFBCF1}">
+            <pc226:cmChg xmlns:pc226="http://schemas.microsoft.com/office/powerpoint/2022/06/main/command" chg="add">
+              <pc226:chgData name="heather.savoy" userId="S::heather.savoy_usda.gov#ext#@uflorida.onmicrosoft.com::14fc4cfb-ad45-439a-89d7-7df559a38e96" providerId="AD" clId="Web-{0C6293EC-6907-68E5-5001-1052E3FDB578}" dt="2023-11-30T04:27:44.851" v="1"/>
+              <pc2:cmMkLst xmlns:pc2="http://schemas.microsoft.com/office/powerpoint/2019/9/main/command">
+                <pc:docMk/>
+                <pc:sldMk cId="662354849" sldId="260"/>
+                <pc2:cmMk id="{F0E7D142-9E67-4A1B-B1CA-B53583088BD4}"/>
+              </pc2:cmMkLst>
+            </pc226:cmChg>
+          </p:ext>
+        </pc:extLst>
       </pc:sldChg>
     </pc:docChg>
   </pc:docChgLst>
@@ -449,30 +698,1132 @@
     </pc:docChg>
   </pc:docChgLst>
   <pc:docChgLst>
-    <pc:chgData name="heather.savoy" userId="S::heather.savoy_usda.gov#ext#@uflorida.onmicrosoft.com::14fc4cfb-ad45-439a-89d7-7df559a38e96" providerId="AD" clId="Web-{0C6293EC-6907-68E5-5001-1052E3FDB578}"/>
+    <pc:chgData name="Maxwell,Daniel" userId="1b6ea79d-60d7-472e-a79a-e3fa9de1dfad" providerId="ADAL" clId="{7EADAE9A-F2CD-4ADD-9950-0327C2C1326E}"/>
+    <pc:docChg chg="custSel addSld modSld">
+      <pc:chgData name="Maxwell,Daniel" userId="1b6ea79d-60d7-472e-a79a-e3fa9de1dfad" providerId="ADAL" clId="{7EADAE9A-F2CD-4ADD-9950-0327C2C1326E}" dt="2023-05-25T19:02:47.969" v="5889"/>
+      <pc:docMkLst>
+        <pc:docMk/>
+      </pc:docMkLst>
+      <pc:sldChg chg="addSp delSp modSp mod modTransition modAnim modNotesTx">
+        <pc:chgData name="Maxwell,Daniel" userId="1b6ea79d-60d7-472e-a79a-e3fa9de1dfad" providerId="ADAL" clId="{7EADAE9A-F2CD-4ADD-9950-0327C2C1326E}" dt="2023-05-25T17:58:24.049" v="3999"/>
+        <pc:sldMkLst>
+          <pc:docMk/>
+          <pc:sldMk cId="2815250072" sldId="287"/>
+        </pc:sldMkLst>
+        <pc:spChg chg="add mod">
+          <ac:chgData name="Maxwell,Daniel" userId="1b6ea79d-60d7-472e-a79a-e3fa9de1dfad" providerId="ADAL" clId="{7EADAE9A-F2CD-4ADD-9950-0327C2C1326E}" dt="2023-05-25T14:11:39.690" v="1516" actId="20577"/>
+          <ac:spMkLst>
+            <pc:docMk/>
+            <pc:sldMk cId="2815250072" sldId="287"/>
+            <ac:spMk id="15" creationId="{12AF450C-973B-0F40-0F68-086AD9FD3455}"/>
+          </ac:spMkLst>
+        </pc:spChg>
+        <pc:picChg chg="del">
+          <ac:chgData name="Maxwell,Daniel" userId="1b6ea79d-60d7-472e-a79a-e3fa9de1dfad" providerId="ADAL" clId="{7EADAE9A-F2CD-4ADD-9950-0327C2C1326E}" dt="2023-05-25T17:55:21.651" v="3989"/>
+          <ac:picMkLst>
+            <pc:docMk/>
+            <pc:sldMk cId="2815250072" sldId="287"/>
+            <ac:picMk id="5" creationId="{1F5A25BC-AEF1-4F35-E881-6346287E0A05}"/>
+          </ac:picMkLst>
+        </pc:picChg>
+        <pc:picChg chg="add del mod">
+          <ac:chgData name="Maxwell,Daniel" userId="1b6ea79d-60d7-472e-a79a-e3fa9de1dfad" providerId="ADAL" clId="{7EADAE9A-F2CD-4ADD-9950-0327C2C1326E}" dt="2023-05-25T17:57:56.748" v="3998"/>
+          <ac:picMkLst>
+            <pc:docMk/>
+            <pc:sldMk cId="2815250072" sldId="287"/>
+            <ac:picMk id="6" creationId="{B28E9F03-87BF-ADAA-D96C-7EE25E2BFCC8}"/>
+          </ac:picMkLst>
+        </pc:picChg>
+        <pc:picChg chg="add mod">
+          <ac:chgData name="Maxwell,Daniel" userId="1b6ea79d-60d7-472e-a79a-e3fa9de1dfad" providerId="ADAL" clId="{7EADAE9A-F2CD-4ADD-9950-0327C2C1326E}" dt="2023-05-25T17:58:24.049" v="3999"/>
+          <ac:picMkLst>
+            <pc:docMk/>
+            <pc:sldMk cId="2815250072" sldId="287"/>
+            <ac:picMk id="7" creationId="{DD9F4BE1-7FB4-55F4-AD59-D5FDBD2FF2B9}"/>
+          </ac:picMkLst>
+        </pc:picChg>
+      </pc:sldChg>
+      <pc:sldChg chg="addSp delSp modSp modTransition modAnim modNotesTx">
+        <pc:chgData name="Maxwell,Daniel" userId="1b6ea79d-60d7-472e-a79a-e3fa9de1dfad" providerId="ADAL" clId="{7EADAE9A-F2CD-4ADD-9950-0327C2C1326E}" dt="2023-05-25T18:57:13.026" v="5843"/>
+        <pc:sldMkLst>
+          <pc:docMk/>
+          <pc:sldMk cId="3192052037" sldId="293"/>
+        </pc:sldMkLst>
+        <pc:picChg chg="add del mod">
+          <ac:chgData name="Maxwell,Daniel" userId="1b6ea79d-60d7-472e-a79a-e3fa9de1dfad" providerId="ADAL" clId="{7EADAE9A-F2CD-4ADD-9950-0327C2C1326E}" dt="2023-05-25T18:56:46.457" v="5840"/>
+          <ac:picMkLst>
+            <pc:docMk/>
+            <pc:sldMk cId="3192052037" sldId="293"/>
+            <ac:picMk id="4" creationId="{3146CAD9-588C-1F4E-4CAB-C7557A4E426B}"/>
+          </ac:picMkLst>
+        </pc:picChg>
+        <pc:picChg chg="add del mod">
+          <ac:chgData name="Maxwell,Daniel" userId="1b6ea79d-60d7-472e-a79a-e3fa9de1dfad" providerId="ADAL" clId="{7EADAE9A-F2CD-4ADD-9950-0327C2C1326E}" dt="2023-05-25T18:57:00.111" v="5842"/>
+          <ac:picMkLst>
+            <pc:docMk/>
+            <pc:sldMk cId="3192052037" sldId="293"/>
+            <ac:picMk id="6" creationId="{BEEEDC65-1862-D2D2-6F1E-EA8A6994E82B}"/>
+          </ac:picMkLst>
+        </pc:picChg>
+        <pc:picChg chg="del">
+          <ac:chgData name="Maxwell,Daniel" userId="1b6ea79d-60d7-472e-a79a-e3fa9de1dfad" providerId="ADAL" clId="{7EADAE9A-F2CD-4ADD-9950-0327C2C1326E}" dt="2023-05-25T18:55:53.756" v="5739"/>
+          <ac:picMkLst>
+            <pc:docMk/>
+            <pc:sldMk cId="3192052037" sldId="293"/>
+            <ac:picMk id="7" creationId="{8BA7D920-234A-0C8A-A7D5-28F313DACFC8}"/>
+          </ac:picMkLst>
+        </pc:picChg>
+        <pc:picChg chg="add mod">
+          <ac:chgData name="Maxwell,Daniel" userId="1b6ea79d-60d7-472e-a79a-e3fa9de1dfad" providerId="ADAL" clId="{7EADAE9A-F2CD-4ADD-9950-0327C2C1326E}" dt="2023-05-25T18:57:13.026" v="5843"/>
+          <ac:picMkLst>
+            <pc:docMk/>
+            <pc:sldMk cId="3192052037" sldId="293"/>
+            <ac:picMk id="8" creationId="{3646C95C-4F3A-453B-750E-44A9F00E5D12}"/>
+          </ac:picMkLst>
+        </pc:picChg>
+      </pc:sldChg>
+      <pc:sldChg chg="addSp delSp modSp mod modTransition modAnim modNotesTx">
+        <pc:chgData name="Maxwell,Daniel" userId="1b6ea79d-60d7-472e-a79a-e3fa9de1dfad" providerId="ADAL" clId="{7EADAE9A-F2CD-4ADD-9950-0327C2C1326E}" dt="2023-05-25T18:12:10.278" v="4414"/>
+        <pc:sldMkLst>
+          <pc:docMk/>
+          <pc:sldMk cId="1132462549" sldId="296"/>
+        </pc:sldMkLst>
+        <pc:spChg chg="add mod">
+          <ac:chgData name="Maxwell,Daniel" userId="1b6ea79d-60d7-472e-a79a-e3fa9de1dfad" providerId="ADAL" clId="{7EADAE9A-F2CD-4ADD-9950-0327C2C1326E}" dt="2023-05-25T14:10:59.523" v="1485" actId="20577"/>
+          <ac:spMkLst>
+            <pc:docMk/>
+            <pc:sldMk cId="1132462549" sldId="296"/>
+            <ac:spMk id="6" creationId="{993B0674-BA9C-A38D-92EB-22D2774DDC99}"/>
+          </ac:spMkLst>
+        </pc:spChg>
+        <pc:picChg chg="add del mod">
+          <ac:chgData name="Maxwell,Daniel" userId="1b6ea79d-60d7-472e-a79a-e3fa9de1dfad" providerId="ADAL" clId="{7EADAE9A-F2CD-4ADD-9950-0327C2C1326E}" dt="2023-05-25T18:00:02.250" v="4002"/>
+          <ac:picMkLst>
+            <pc:docMk/>
+            <pc:sldMk cId="1132462549" sldId="296"/>
+            <ac:picMk id="2" creationId="{4CBF7054-6C3B-EB4A-DBDE-4D319AA50269}"/>
+          </ac:picMkLst>
+        </pc:picChg>
+        <pc:picChg chg="del">
+          <ac:chgData name="Maxwell,Daniel" userId="1b6ea79d-60d7-472e-a79a-e3fa9de1dfad" providerId="ADAL" clId="{7EADAE9A-F2CD-4ADD-9950-0327C2C1326E}" dt="2023-05-25T17:59:04.881" v="4000"/>
+          <ac:picMkLst>
+            <pc:docMk/>
+            <pc:sldMk cId="1132462549" sldId="296"/>
+            <ac:picMk id="5" creationId="{D3FEC116-A279-1453-B3D5-796D3BE12B68}"/>
+          </ac:picMkLst>
+        </pc:picChg>
+        <pc:picChg chg="add del mod">
+          <ac:chgData name="Maxwell,Daniel" userId="1b6ea79d-60d7-472e-a79a-e3fa9de1dfad" providerId="ADAL" clId="{7EADAE9A-F2CD-4ADD-9950-0327C2C1326E}" dt="2023-05-25T18:00:13.360" v="4004"/>
+          <ac:picMkLst>
+            <pc:docMk/>
+            <pc:sldMk cId="1132462549" sldId="296"/>
+            <ac:picMk id="8" creationId="{533676E9-F031-0455-1C93-121262790508}"/>
+          </ac:picMkLst>
+        </pc:picChg>
+        <pc:picChg chg="add del mod">
+          <ac:chgData name="Maxwell,Daniel" userId="1b6ea79d-60d7-472e-a79a-e3fa9de1dfad" providerId="ADAL" clId="{7EADAE9A-F2CD-4ADD-9950-0327C2C1326E}" dt="2023-05-25T18:06:53.809" v="4362"/>
+          <ac:picMkLst>
+            <pc:docMk/>
+            <pc:sldMk cId="1132462549" sldId="296"/>
+            <ac:picMk id="9" creationId="{DB608422-BB44-CE43-F183-2379FBBD4D42}"/>
+          </ac:picMkLst>
+        </pc:picChg>
+        <pc:picChg chg="add del mod">
+          <ac:chgData name="Maxwell,Daniel" userId="1b6ea79d-60d7-472e-a79a-e3fa9de1dfad" providerId="ADAL" clId="{7EADAE9A-F2CD-4ADD-9950-0327C2C1326E}" dt="2023-05-25T18:08:13.649" v="4390"/>
+          <ac:picMkLst>
+            <pc:docMk/>
+            <pc:sldMk cId="1132462549" sldId="296"/>
+            <ac:picMk id="10" creationId="{11995508-984B-20DE-AFF7-56C464049645}"/>
+          </ac:picMkLst>
+        </pc:picChg>
+        <pc:picChg chg="add del mod">
+          <ac:chgData name="Maxwell,Daniel" userId="1b6ea79d-60d7-472e-a79a-e3fa9de1dfad" providerId="ADAL" clId="{7EADAE9A-F2CD-4ADD-9950-0327C2C1326E}" dt="2023-05-25T18:08:31.904" v="4392"/>
+          <ac:picMkLst>
+            <pc:docMk/>
+            <pc:sldMk cId="1132462549" sldId="296"/>
+            <ac:picMk id="11" creationId="{DD2CA4E6-696E-7A18-0205-3BBD4DEE7221}"/>
+          </ac:picMkLst>
+        </pc:picChg>
+        <pc:picChg chg="add del mod">
+          <ac:chgData name="Maxwell,Daniel" userId="1b6ea79d-60d7-472e-a79a-e3fa9de1dfad" providerId="ADAL" clId="{7EADAE9A-F2CD-4ADD-9950-0327C2C1326E}" dt="2023-05-25T18:09:55.098" v="4405"/>
+          <ac:picMkLst>
+            <pc:docMk/>
+            <pc:sldMk cId="1132462549" sldId="296"/>
+            <ac:picMk id="12" creationId="{19FCDA0D-06B6-4A90-539F-D7EE8DD7BDF1}"/>
+          </ac:picMkLst>
+        </pc:picChg>
+        <pc:picChg chg="add del mod">
+          <ac:chgData name="Maxwell,Daniel" userId="1b6ea79d-60d7-472e-a79a-e3fa9de1dfad" providerId="ADAL" clId="{7EADAE9A-F2CD-4ADD-9950-0327C2C1326E}" dt="2023-05-25T18:10:12.240" v="4407"/>
+          <ac:picMkLst>
+            <pc:docMk/>
+            <pc:sldMk cId="1132462549" sldId="296"/>
+            <ac:picMk id="13" creationId="{CE7A0F5F-3488-BF22-CB12-F85EFCFD6235}"/>
+          </ac:picMkLst>
+        </pc:picChg>
+        <pc:picChg chg="add del mod">
+          <ac:chgData name="Maxwell,Daniel" userId="1b6ea79d-60d7-472e-a79a-e3fa9de1dfad" providerId="ADAL" clId="{7EADAE9A-F2CD-4ADD-9950-0327C2C1326E}" dt="2023-05-25T18:11:03.588" v="4409"/>
+          <ac:picMkLst>
+            <pc:docMk/>
+            <pc:sldMk cId="1132462549" sldId="296"/>
+            <ac:picMk id="14" creationId="{47C38008-9E49-560B-F6C1-1FD5AB30864D}"/>
+          </ac:picMkLst>
+        </pc:picChg>
+        <pc:picChg chg="add del mod">
+          <ac:chgData name="Maxwell,Daniel" userId="1b6ea79d-60d7-472e-a79a-e3fa9de1dfad" providerId="ADAL" clId="{7EADAE9A-F2CD-4ADD-9950-0327C2C1326E}" dt="2023-05-25T18:11:25.514" v="4411"/>
+          <ac:picMkLst>
+            <pc:docMk/>
+            <pc:sldMk cId="1132462549" sldId="296"/>
+            <ac:picMk id="15" creationId="{9FB37291-7FE0-A79D-8718-C7FF7A36CEF8}"/>
+          </ac:picMkLst>
+        </pc:picChg>
+        <pc:picChg chg="add del mod">
+          <ac:chgData name="Maxwell,Daniel" userId="1b6ea79d-60d7-472e-a79a-e3fa9de1dfad" providerId="ADAL" clId="{7EADAE9A-F2CD-4ADD-9950-0327C2C1326E}" dt="2023-05-25T18:11:37.905" v="4413"/>
+          <ac:picMkLst>
+            <pc:docMk/>
+            <pc:sldMk cId="1132462549" sldId="296"/>
+            <ac:picMk id="16" creationId="{2AE1E91D-0EBF-CB2E-1208-EF4DB3713F57}"/>
+          </ac:picMkLst>
+        </pc:picChg>
+        <pc:picChg chg="add mod">
+          <ac:chgData name="Maxwell,Daniel" userId="1b6ea79d-60d7-472e-a79a-e3fa9de1dfad" providerId="ADAL" clId="{7EADAE9A-F2CD-4ADD-9950-0327C2C1326E}" dt="2023-05-25T18:12:10.278" v="4414"/>
+          <ac:picMkLst>
+            <pc:docMk/>
+            <pc:sldMk cId="1132462549" sldId="296"/>
+            <ac:picMk id="17" creationId="{D281C9DC-498C-06FC-70CB-8101BB6F393D}"/>
+          </ac:picMkLst>
+        </pc:picChg>
+      </pc:sldChg>
+      <pc:sldChg chg="addSp delSp modSp modTransition modAnim modNotesTx">
+        <pc:chgData name="Maxwell,Daniel" userId="1b6ea79d-60d7-472e-a79a-e3fa9de1dfad" providerId="ADAL" clId="{7EADAE9A-F2CD-4ADD-9950-0327C2C1326E}" dt="2023-05-25T19:02:47.969" v="5889"/>
+        <pc:sldMkLst>
+          <pc:docMk/>
+          <pc:sldMk cId="2194656671" sldId="340"/>
+        </pc:sldMkLst>
+        <pc:picChg chg="add del mod">
+          <ac:chgData name="Maxwell,Daniel" userId="1b6ea79d-60d7-472e-a79a-e3fa9de1dfad" providerId="ADAL" clId="{7EADAE9A-F2CD-4ADD-9950-0327C2C1326E}" dt="2023-05-25T18:58:33.577" v="5845"/>
+          <ac:picMkLst>
+            <pc:docMk/>
+            <pc:sldMk cId="2194656671" sldId="340"/>
+            <ac:picMk id="2" creationId="{94D1E5FA-5814-555E-91D0-DA795100373D}"/>
+          </ac:picMkLst>
+        </pc:picChg>
+        <pc:picChg chg="add del mod">
+          <ac:chgData name="Maxwell,Daniel" userId="1b6ea79d-60d7-472e-a79a-e3fa9de1dfad" providerId="ADAL" clId="{7EADAE9A-F2CD-4ADD-9950-0327C2C1326E}" dt="2023-05-25T19:01:39.428" v="5888"/>
+          <ac:picMkLst>
+            <pc:docMk/>
+            <pc:sldMk cId="2194656671" sldId="340"/>
+            <ac:picMk id="4" creationId="{77CA58BB-24CC-AAF9-C5DB-F530258878AB}"/>
+          </ac:picMkLst>
+        </pc:picChg>
+        <pc:picChg chg="add mod">
+          <ac:chgData name="Maxwell,Daniel" userId="1b6ea79d-60d7-472e-a79a-e3fa9de1dfad" providerId="ADAL" clId="{7EADAE9A-F2CD-4ADD-9950-0327C2C1326E}" dt="2023-05-25T19:02:47.969" v="5889"/>
+          <ac:picMkLst>
+            <pc:docMk/>
+            <pc:sldMk cId="2194656671" sldId="340"/>
+            <ac:picMk id="7" creationId="{35BE8921-D076-F461-BF0A-0E8B86379808}"/>
+          </ac:picMkLst>
+        </pc:picChg>
+      </pc:sldChg>
+      <pc:sldChg chg="addSp delSp modSp new mod modTransition modAnim modNotesTx">
+        <pc:chgData name="Maxwell,Daniel" userId="1b6ea79d-60d7-472e-a79a-e3fa9de1dfad" providerId="ADAL" clId="{7EADAE9A-F2CD-4ADD-9950-0327C2C1326E}" dt="2023-05-25T18:54:46.908" v="5738"/>
+        <pc:sldMkLst>
+          <pc:docMk/>
+          <pc:sldMk cId="3935765361" sldId="341"/>
+        </pc:sldMkLst>
+        <pc:spChg chg="add mod">
+          <ac:chgData name="Maxwell,Daniel" userId="1b6ea79d-60d7-472e-a79a-e3fa9de1dfad" providerId="ADAL" clId="{7EADAE9A-F2CD-4ADD-9950-0327C2C1326E}" dt="2023-05-24T20:12:37.588" v="62" actId="20577"/>
+          <ac:spMkLst>
+            <pc:docMk/>
+            <pc:sldMk cId="3935765361" sldId="341"/>
+            <ac:spMk id="6" creationId="{519DD942-3483-598B-8A07-98C82B3231A8}"/>
+          </ac:spMkLst>
+        </pc:spChg>
+        <pc:picChg chg="add del mod">
+          <ac:chgData name="Maxwell,Daniel" userId="1b6ea79d-60d7-472e-a79a-e3fa9de1dfad" providerId="ADAL" clId="{7EADAE9A-F2CD-4ADD-9950-0327C2C1326E}" dt="2023-05-25T18:39:06.452" v="5162"/>
+          <ac:picMkLst>
+            <pc:docMk/>
+            <pc:sldMk cId="3935765361" sldId="341"/>
+            <ac:picMk id="2" creationId="{E1F1DE2A-E2E3-F33E-39D4-820912C6EDFF}"/>
+          </ac:picMkLst>
+        </pc:picChg>
+        <pc:picChg chg="add del mod">
+          <ac:chgData name="Maxwell,Daniel" userId="1b6ea79d-60d7-472e-a79a-e3fa9de1dfad" providerId="ADAL" clId="{7EADAE9A-F2CD-4ADD-9950-0327C2C1326E}" dt="2023-05-25T18:39:19.908" v="5164"/>
+          <ac:picMkLst>
+            <pc:docMk/>
+            <pc:sldMk cId="3935765361" sldId="341"/>
+            <ac:picMk id="3" creationId="{10C10AD4-4B80-6F4B-C5C3-00ECA770FBCD}"/>
+          </ac:picMkLst>
+        </pc:picChg>
+        <pc:picChg chg="add del mod">
+          <ac:chgData name="Maxwell,Daniel" userId="1b6ea79d-60d7-472e-a79a-e3fa9de1dfad" providerId="ADAL" clId="{7EADAE9A-F2CD-4ADD-9950-0327C2C1326E}" dt="2023-05-24T20:11:57.800" v="24" actId="478"/>
+          <ac:picMkLst>
+            <pc:docMk/>
+            <pc:sldMk cId="3935765361" sldId="341"/>
+            <ac:picMk id="3" creationId="{91F53BA5-4896-CE1F-88A0-C158564EC22C}"/>
+          </ac:picMkLst>
+        </pc:picChg>
+        <pc:picChg chg="add mod">
+          <ac:chgData name="Maxwell,Daniel" userId="1b6ea79d-60d7-472e-a79a-e3fa9de1dfad" providerId="ADAL" clId="{7EADAE9A-F2CD-4ADD-9950-0327C2C1326E}" dt="2023-05-25T14:09:11.132" v="1435"/>
+          <ac:picMkLst>
+            <pc:docMk/>
+            <pc:sldMk cId="3935765361" sldId="341"/>
+            <ac:picMk id="4" creationId="{49E2B260-C7B1-DE64-337E-5FB37A937A3E}"/>
+          </ac:picMkLst>
+        </pc:picChg>
+        <pc:picChg chg="add mod">
+          <ac:chgData name="Maxwell,Daniel" userId="1b6ea79d-60d7-472e-a79a-e3fa9de1dfad" providerId="ADAL" clId="{7EADAE9A-F2CD-4ADD-9950-0327C2C1326E}" dt="2023-05-24T20:12:05.615" v="27" actId="1076"/>
+          <ac:picMkLst>
+            <pc:docMk/>
+            <pc:sldMk cId="3935765361" sldId="341"/>
+            <ac:picMk id="5" creationId="{E0B749DC-2274-BFAC-CA8D-01435D889BCC}"/>
+          </ac:picMkLst>
+        </pc:picChg>
+        <pc:picChg chg="add del mod">
+          <ac:chgData name="Maxwell,Daniel" userId="1b6ea79d-60d7-472e-a79a-e3fa9de1dfad" providerId="ADAL" clId="{7EADAE9A-F2CD-4ADD-9950-0327C2C1326E}" dt="2023-05-25T18:39:41.957" v="5166"/>
+          <ac:picMkLst>
+            <pc:docMk/>
+            <pc:sldMk cId="3935765361" sldId="341"/>
+            <ac:picMk id="7" creationId="{6CFA10E4-6674-3CDB-3DA6-A8B90A2902BF}"/>
+          </ac:picMkLst>
+        </pc:picChg>
+        <pc:picChg chg="add del mod">
+          <ac:chgData name="Maxwell,Daniel" userId="1b6ea79d-60d7-472e-a79a-e3fa9de1dfad" providerId="ADAL" clId="{7EADAE9A-F2CD-4ADD-9950-0327C2C1326E}" dt="2023-05-25T18:42:30.379" v="5223"/>
+          <ac:picMkLst>
+            <pc:docMk/>
+            <pc:sldMk cId="3935765361" sldId="341"/>
+            <ac:picMk id="8" creationId="{1C13B2A3-FD1F-C04E-9357-F30CECCA2539}"/>
+          </ac:picMkLst>
+        </pc:picChg>
+        <pc:picChg chg="add del mod">
+          <ac:chgData name="Maxwell,Daniel" userId="1b6ea79d-60d7-472e-a79a-e3fa9de1dfad" providerId="ADAL" clId="{7EADAE9A-F2CD-4ADD-9950-0327C2C1326E}" dt="2023-05-25T18:46:29.435" v="5400"/>
+          <ac:picMkLst>
+            <pc:docMk/>
+            <pc:sldMk cId="3935765361" sldId="341"/>
+            <ac:picMk id="9" creationId="{4965FD26-0F06-6C03-474F-2A7118063E81}"/>
+          </ac:picMkLst>
+        </pc:picChg>
+        <pc:picChg chg="add del mod">
+          <ac:chgData name="Maxwell,Daniel" userId="1b6ea79d-60d7-472e-a79a-e3fa9de1dfad" providerId="ADAL" clId="{7EADAE9A-F2CD-4ADD-9950-0327C2C1326E}" dt="2023-05-25T18:46:38.544" v="5402"/>
+          <ac:picMkLst>
+            <pc:docMk/>
+            <pc:sldMk cId="3935765361" sldId="341"/>
+            <ac:picMk id="10" creationId="{2A733CF0-BBEA-C72C-9445-1ECA51021BD6}"/>
+          </ac:picMkLst>
+        </pc:picChg>
+        <pc:picChg chg="add del mod">
+          <ac:chgData name="Maxwell,Daniel" userId="1b6ea79d-60d7-472e-a79a-e3fa9de1dfad" providerId="ADAL" clId="{7EADAE9A-F2CD-4ADD-9950-0327C2C1326E}" dt="2023-05-25T18:52:11.757" v="5727"/>
+          <ac:picMkLst>
+            <pc:docMk/>
+            <pc:sldMk cId="3935765361" sldId="341"/>
+            <ac:picMk id="11" creationId="{CAED7BBF-8B13-9E60-133F-612C72B79208}"/>
+          </ac:picMkLst>
+        </pc:picChg>
+        <pc:picChg chg="add del mod">
+          <ac:chgData name="Maxwell,Daniel" userId="1b6ea79d-60d7-472e-a79a-e3fa9de1dfad" providerId="ADAL" clId="{7EADAE9A-F2CD-4ADD-9950-0327C2C1326E}" dt="2023-05-25T18:54:11.807" v="5737"/>
+          <ac:picMkLst>
+            <pc:docMk/>
+            <pc:sldMk cId="3935765361" sldId="341"/>
+            <ac:picMk id="12" creationId="{9FE21A6C-EF8E-9FDF-5FB3-E38D88785A0D}"/>
+          </ac:picMkLst>
+        </pc:picChg>
+        <pc:picChg chg="add mod">
+          <ac:chgData name="Maxwell,Daniel" userId="1b6ea79d-60d7-472e-a79a-e3fa9de1dfad" providerId="ADAL" clId="{7EADAE9A-F2CD-4ADD-9950-0327C2C1326E}" dt="2023-05-25T18:54:46.908" v="5738"/>
+          <ac:picMkLst>
+            <pc:docMk/>
+            <pc:sldMk cId="3935765361" sldId="341"/>
+            <ac:picMk id="13" creationId="{B08BCC7C-7A01-1983-0FA0-0C236C16428D}"/>
+          </ac:picMkLst>
+        </pc:picChg>
+      </pc:sldChg>
+      <pc:sldChg chg="addSp delSp modSp mod modTransition modAnim modNotesTx">
+        <pc:chgData name="Maxwell,Daniel" userId="1b6ea79d-60d7-472e-a79a-e3fa9de1dfad" providerId="ADAL" clId="{7EADAE9A-F2CD-4ADD-9950-0327C2C1326E}" dt="2023-05-25T18:30:20.925" v="5044"/>
+        <pc:sldMkLst>
+          <pc:docMk/>
+          <pc:sldMk cId="4269837095" sldId="342"/>
+        </pc:sldMkLst>
+        <pc:spChg chg="add mod">
+          <ac:chgData name="Maxwell,Daniel" userId="1b6ea79d-60d7-472e-a79a-e3fa9de1dfad" providerId="ADAL" clId="{7EADAE9A-F2CD-4ADD-9950-0327C2C1326E}" dt="2023-05-25T14:45:44.631" v="2826" actId="113"/>
+          <ac:spMkLst>
+            <pc:docMk/>
+            <pc:sldMk cId="4269837095" sldId="342"/>
+            <ac:spMk id="2" creationId="{A7AF31DD-0148-3853-28F8-4B38063C172C}"/>
+          </ac:spMkLst>
+        </pc:spChg>
+        <pc:spChg chg="add mod">
+          <ac:chgData name="Maxwell,Daniel" userId="1b6ea79d-60d7-472e-a79a-e3fa9de1dfad" providerId="ADAL" clId="{7EADAE9A-F2CD-4ADD-9950-0327C2C1326E}" dt="2023-05-25T14:39:38.773" v="2617" actId="14100"/>
+          <ac:spMkLst>
+            <pc:docMk/>
+            <pc:sldMk cId="4269837095" sldId="342"/>
+            <ac:spMk id="4" creationId="{AD19B9E2-23B1-F8F1-5B73-5DB5265D01D2}"/>
+          </ac:spMkLst>
+        </pc:spChg>
+        <pc:spChg chg="add mod">
+          <ac:chgData name="Maxwell,Daniel" userId="1b6ea79d-60d7-472e-a79a-e3fa9de1dfad" providerId="ADAL" clId="{7EADAE9A-F2CD-4ADD-9950-0327C2C1326E}" dt="2023-05-25T14:10:34.103" v="1458" actId="20577"/>
+          <ac:spMkLst>
+            <pc:docMk/>
+            <pc:sldMk cId="4269837095" sldId="342"/>
+            <ac:spMk id="7" creationId="{5648A8F6-D983-70F2-65C2-1B3914361981}"/>
+          </ac:spMkLst>
+        </pc:spChg>
+        <pc:spChg chg="add del mod">
+          <ac:chgData name="Maxwell,Daniel" userId="1b6ea79d-60d7-472e-a79a-e3fa9de1dfad" providerId="ADAL" clId="{7EADAE9A-F2CD-4ADD-9950-0327C2C1326E}" dt="2023-05-25T14:36:40.765" v="2521" actId="478"/>
+          <ac:spMkLst>
+            <pc:docMk/>
+            <pc:sldMk cId="4269837095" sldId="342"/>
+            <ac:spMk id="8" creationId="{9A77F8F9-E865-3412-389F-72CA7AAA0486}"/>
+          </ac:spMkLst>
+        </pc:spChg>
+        <pc:spChg chg="add mod">
+          <ac:chgData name="Maxwell,Daniel" userId="1b6ea79d-60d7-472e-a79a-e3fa9de1dfad" providerId="ADAL" clId="{7EADAE9A-F2CD-4ADD-9950-0327C2C1326E}" dt="2023-05-25T14:39:05.779" v="2615" actId="20577"/>
+          <ac:spMkLst>
+            <pc:docMk/>
+            <pc:sldMk cId="4269837095" sldId="342"/>
+            <ac:spMk id="9" creationId="{AA77BE82-7C54-FC74-DC1F-84FFEC4A931B}"/>
+          </ac:spMkLst>
+        </pc:spChg>
+        <pc:picChg chg="mod">
+          <ac:chgData name="Maxwell,Daniel" userId="1b6ea79d-60d7-472e-a79a-e3fa9de1dfad" providerId="ADAL" clId="{7EADAE9A-F2CD-4ADD-9950-0327C2C1326E}" dt="2023-05-25T14:10:04.158" v="1440" actId="1076"/>
+          <ac:picMkLst>
+            <pc:docMk/>
+            <pc:sldMk cId="4269837095" sldId="342"/>
+            <ac:picMk id="3" creationId="{2F58BEC6-A38B-8DDA-6485-99AC9052FB25}"/>
+          </ac:picMkLst>
+        </pc:picChg>
+        <pc:picChg chg="add del mod">
+          <ac:chgData name="Maxwell,Daniel" userId="1b6ea79d-60d7-472e-a79a-e3fa9de1dfad" providerId="ADAL" clId="{7EADAE9A-F2CD-4ADD-9950-0327C2C1326E}" dt="2023-05-25T18:13:06.773" v="4416"/>
+          <ac:picMkLst>
+            <pc:docMk/>
+            <pc:sldMk cId="4269837095" sldId="342"/>
+            <ac:picMk id="5" creationId="{07F1F8C5-03E4-56D3-2CB1-7F6194C474CA}"/>
+          </ac:picMkLst>
+        </pc:picChg>
+        <pc:picChg chg="del">
+          <ac:chgData name="Maxwell,Daniel" userId="1b6ea79d-60d7-472e-a79a-e3fa9de1dfad" providerId="ADAL" clId="{7EADAE9A-F2CD-4ADD-9950-0327C2C1326E}" dt="2023-05-25T14:00:50.749" v="988" actId="478"/>
+          <ac:picMkLst>
+            <pc:docMk/>
+            <pc:sldMk cId="4269837095" sldId="342"/>
+            <ac:picMk id="5" creationId="{FD7C293A-3CC2-A34D-CEFE-88CF5ED0E9E5}"/>
+          </ac:picMkLst>
+        </pc:picChg>
+        <pc:picChg chg="add mod">
+          <ac:chgData name="Maxwell,Daniel" userId="1b6ea79d-60d7-472e-a79a-e3fa9de1dfad" providerId="ADAL" clId="{7EADAE9A-F2CD-4ADD-9950-0327C2C1326E}" dt="2023-05-25T14:09:06.062" v="1433"/>
+          <ac:picMkLst>
+            <pc:docMk/>
+            <pc:sldMk cId="4269837095" sldId="342"/>
+            <ac:picMk id="6" creationId="{53C07878-8C3C-4DE6-953B-C68065895005}"/>
+          </ac:picMkLst>
+        </pc:picChg>
+        <pc:picChg chg="add del mod">
+          <ac:chgData name="Maxwell,Daniel" userId="1b6ea79d-60d7-472e-a79a-e3fa9de1dfad" providerId="ADAL" clId="{7EADAE9A-F2CD-4ADD-9950-0327C2C1326E}" dt="2023-05-25T18:20:07.519" v="4804"/>
+          <ac:picMkLst>
+            <pc:docMk/>
+            <pc:sldMk cId="4269837095" sldId="342"/>
+            <ac:picMk id="8" creationId="{C1808B49-9F2E-47AD-A0BC-C375A1C56F6F}"/>
+          </ac:picMkLst>
+        </pc:picChg>
+        <pc:picChg chg="add del mod">
+          <ac:chgData name="Maxwell,Daniel" userId="1b6ea79d-60d7-472e-a79a-e3fa9de1dfad" providerId="ADAL" clId="{7EADAE9A-F2CD-4ADD-9950-0327C2C1326E}" dt="2023-05-25T18:20:18.033" v="4806"/>
+          <ac:picMkLst>
+            <pc:docMk/>
+            <pc:sldMk cId="4269837095" sldId="342"/>
+            <ac:picMk id="10" creationId="{4A92CB5E-27C2-1D10-4C10-6FA5D187F189}"/>
+          </ac:picMkLst>
+        </pc:picChg>
+        <pc:picChg chg="add del mod">
+          <ac:chgData name="Maxwell,Daniel" userId="1b6ea79d-60d7-472e-a79a-e3fa9de1dfad" providerId="ADAL" clId="{7EADAE9A-F2CD-4ADD-9950-0327C2C1326E}" dt="2023-05-25T18:20:28.558" v="4808"/>
+          <ac:picMkLst>
+            <pc:docMk/>
+            <pc:sldMk cId="4269837095" sldId="342"/>
+            <ac:picMk id="11" creationId="{691C2D13-6580-CD89-2F14-8341C908356E}"/>
+          </ac:picMkLst>
+        </pc:picChg>
+        <pc:picChg chg="add del mod">
+          <ac:chgData name="Maxwell,Daniel" userId="1b6ea79d-60d7-472e-a79a-e3fa9de1dfad" providerId="ADAL" clId="{7EADAE9A-F2CD-4ADD-9950-0327C2C1326E}" dt="2023-05-25T18:25:52.529" v="4981"/>
+          <ac:picMkLst>
+            <pc:docMk/>
+            <pc:sldMk cId="4269837095" sldId="342"/>
+            <ac:picMk id="12" creationId="{3A6C7CA6-633C-EA7C-F850-8044B3BFDA84}"/>
+          </ac:picMkLst>
+        </pc:picChg>
+        <pc:picChg chg="add del mod">
+          <ac:chgData name="Maxwell,Daniel" userId="1b6ea79d-60d7-472e-a79a-e3fa9de1dfad" providerId="ADAL" clId="{7EADAE9A-F2CD-4ADD-9950-0327C2C1326E}" dt="2023-05-25T18:26:10.901" v="4983"/>
+          <ac:picMkLst>
+            <pc:docMk/>
+            <pc:sldMk cId="4269837095" sldId="342"/>
+            <ac:picMk id="13" creationId="{9C3278E1-6333-830D-C252-BF2F4CF836D2}"/>
+          </ac:picMkLst>
+        </pc:picChg>
+        <pc:picChg chg="add del mod">
+          <ac:chgData name="Maxwell,Daniel" userId="1b6ea79d-60d7-472e-a79a-e3fa9de1dfad" providerId="ADAL" clId="{7EADAE9A-F2CD-4ADD-9950-0327C2C1326E}" dt="2023-05-25T18:26:19.838" v="4985"/>
+          <ac:picMkLst>
+            <pc:docMk/>
+            <pc:sldMk cId="4269837095" sldId="342"/>
+            <ac:picMk id="14" creationId="{F788A482-17A4-CF3C-5145-36CFC7059294}"/>
+          </ac:picMkLst>
+        </pc:picChg>
+        <pc:picChg chg="add del mod">
+          <ac:chgData name="Maxwell,Daniel" userId="1b6ea79d-60d7-472e-a79a-e3fa9de1dfad" providerId="ADAL" clId="{7EADAE9A-F2CD-4ADD-9950-0327C2C1326E}" dt="2023-05-25T18:28:56.059" v="5041"/>
+          <ac:picMkLst>
+            <pc:docMk/>
+            <pc:sldMk cId="4269837095" sldId="342"/>
+            <ac:picMk id="15" creationId="{89B678C9-1D14-E30B-6BD8-CFBD16C69C07}"/>
+          </ac:picMkLst>
+        </pc:picChg>
+        <pc:picChg chg="add del mod">
+          <ac:chgData name="Maxwell,Daniel" userId="1b6ea79d-60d7-472e-a79a-e3fa9de1dfad" providerId="ADAL" clId="{7EADAE9A-F2CD-4ADD-9950-0327C2C1326E}" dt="2023-05-25T18:29:05.250" v="5043"/>
+          <ac:picMkLst>
+            <pc:docMk/>
+            <pc:sldMk cId="4269837095" sldId="342"/>
+            <ac:picMk id="16" creationId="{95C6E614-5945-5396-A282-4EF0008E0AA2}"/>
+          </ac:picMkLst>
+        </pc:picChg>
+        <pc:picChg chg="add mod">
+          <ac:chgData name="Maxwell,Daniel" userId="1b6ea79d-60d7-472e-a79a-e3fa9de1dfad" providerId="ADAL" clId="{7EADAE9A-F2CD-4ADD-9950-0327C2C1326E}" dt="2023-05-25T18:30:20.925" v="5044"/>
+          <ac:picMkLst>
+            <pc:docMk/>
+            <pc:sldMk cId="4269837095" sldId="342"/>
+            <ac:picMk id="17" creationId="{CF65CC0C-7DCE-5B6A-8893-910987416AC6}"/>
+          </ac:picMkLst>
+        </pc:picChg>
+      </pc:sldChg>
+      <pc:sldChg chg="addSp delSp modSp new mod modTransition modAnim modNotesTx">
+        <pc:chgData name="Maxwell,Daniel" userId="1b6ea79d-60d7-472e-a79a-e3fa9de1dfad" providerId="ADAL" clId="{7EADAE9A-F2CD-4ADD-9950-0327C2C1326E}" dt="2023-05-25T18:35:48.919" v="5112"/>
+        <pc:sldMkLst>
+          <pc:docMk/>
+          <pc:sldMk cId="2802503080" sldId="343"/>
+        </pc:sldMkLst>
+        <pc:spChg chg="add mod">
+          <ac:chgData name="Maxwell,Daniel" userId="1b6ea79d-60d7-472e-a79a-e3fa9de1dfad" providerId="ADAL" clId="{7EADAE9A-F2CD-4ADD-9950-0327C2C1326E}" dt="2023-05-25T14:45:05.597" v="2825"/>
+          <ac:spMkLst>
+            <pc:docMk/>
+            <pc:sldMk cId="2802503080" sldId="343"/>
+            <ac:spMk id="4" creationId="{AE74009B-E381-8F74-33A3-E4F47090D2EA}"/>
+          </ac:spMkLst>
+        </pc:spChg>
+        <pc:picChg chg="add mod">
+          <ac:chgData name="Maxwell,Daniel" userId="1b6ea79d-60d7-472e-a79a-e3fa9de1dfad" providerId="ADAL" clId="{7EADAE9A-F2CD-4ADD-9950-0327C2C1326E}" dt="2023-05-25T14:00:47.282" v="987" actId="1076"/>
+          <ac:picMkLst>
+            <pc:docMk/>
+            <pc:sldMk cId="2802503080" sldId="343"/>
+            <ac:picMk id="2" creationId="{5C77E842-ECF9-DC72-49C7-FD54CEDA5C29}"/>
+          </ac:picMkLst>
+        </pc:picChg>
+        <pc:picChg chg="add mod">
+          <ac:chgData name="Maxwell,Daniel" userId="1b6ea79d-60d7-472e-a79a-e3fa9de1dfad" providerId="ADAL" clId="{7EADAE9A-F2CD-4ADD-9950-0327C2C1326E}" dt="2023-05-25T14:09:09.048" v="1434"/>
+          <ac:picMkLst>
+            <pc:docMk/>
+            <pc:sldMk cId="2802503080" sldId="343"/>
+            <ac:picMk id="3" creationId="{4B9BFFE4-91FC-E427-3712-F9F1E72DA0C3}"/>
+          </ac:picMkLst>
+        </pc:picChg>
+        <pc:picChg chg="add del mod">
+          <ac:chgData name="Maxwell,Daniel" userId="1b6ea79d-60d7-472e-a79a-e3fa9de1dfad" providerId="ADAL" clId="{7EADAE9A-F2CD-4ADD-9950-0327C2C1326E}" dt="2023-05-25T18:33:43.355" v="5101"/>
+          <ac:picMkLst>
+            <pc:docMk/>
+            <pc:sldMk cId="2802503080" sldId="343"/>
+            <ac:picMk id="5" creationId="{980B26E2-E942-03E2-332E-0B3238BC5C4D}"/>
+          </ac:picMkLst>
+        </pc:picChg>
+        <pc:picChg chg="add del mod">
+          <ac:chgData name="Maxwell,Daniel" userId="1b6ea79d-60d7-472e-a79a-e3fa9de1dfad" providerId="ADAL" clId="{7EADAE9A-F2CD-4ADD-9950-0327C2C1326E}" dt="2023-05-25T18:33:59.323" v="5103"/>
+          <ac:picMkLst>
+            <pc:docMk/>
+            <pc:sldMk cId="2802503080" sldId="343"/>
+            <ac:picMk id="6" creationId="{9C8909E2-AA75-57EE-D2B8-4BCDEA8833E6}"/>
+          </ac:picMkLst>
+        </pc:picChg>
+        <pc:picChg chg="add del mod">
+          <ac:chgData name="Maxwell,Daniel" userId="1b6ea79d-60d7-472e-a79a-e3fa9de1dfad" providerId="ADAL" clId="{7EADAE9A-F2CD-4ADD-9950-0327C2C1326E}" dt="2023-05-25T18:34:09.615" v="5105"/>
+          <ac:picMkLst>
+            <pc:docMk/>
+            <pc:sldMk cId="2802503080" sldId="343"/>
+            <ac:picMk id="7" creationId="{2D85DD7D-8621-A0F7-8961-DD0B3F6000F8}"/>
+          </ac:picMkLst>
+        </pc:picChg>
+        <pc:picChg chg="add del mod">
+          <ac:chgData name="Maxwell,Daniel" userId="1b6ea79d-60d7-472e-a79a-e3fa9de1dfad" providerId="ADAL" clId="{7EADAE9A-F2CD-4ADD-9950-0327C2C1326E}" dt="2023-05-25T18:34:18.875" v="5107"/>
+          <ac:picMkLst>
+            <pc:docMk/>
+            <pc:sldMk cId="2802503080" sldId="343"/>
+            <ac:picMk id="8" creationId="{8A40D8ED-E36E-1399-08F1-50DB6AFE0376}"/>
+          </ac:picMkLst>
+        </pc:picChg>
+        <pc:picChg chg="add del mod">
+          <ac:chgData name="Maxwell,Daniel" userId="1b6ea79d-60d7-472e-a79a-e3fa9de1dfad" providerId="ADAL" clId="{7EADAE9A-F2CD-4ADD-9950-0327C2C1326E}" dt="2023-05-25T18:35:25.984" v="5109"/>
+          <ac:picMkLst>
+            <pc:docMk/>
+            <pc:sldMk cId="2802503080" sldId="343"/>
+            <ac:picMk id="9" creationId="{5ABE9464-EB68-A947-DF40-419FFE7683B2}"/>
+          </ac:picMkLst>
+        </pc:picChg>
+        <pc:picChg chg="add del mod">
+          <ac:chgData name="Maxwell,Daniel" userId="1b6ea79d-60d7-472e-a79a-e3fa9de1dfad" providerId="ADAL" clId="{7EADAE9A-F2CD-4ADD-9950-0327C2C1326E}" dt="2023-05-25T18:35:35.637" v="5111"/>
+          <ac:picMkLst>
+            <pc:docMk/>
+            <pc:sldMk cId="2802503080" sldId="343"/>
+            <ac:picMk id="10" creationId="{7D786223-BA37-74F1-BB84-4B2251D55456}"/>
+          </ac:picMkLst>
+        </pc:picChg>
+        <pc:picChg chg="add mod">
+          <ac:chgData name="Maxwell,Daniel" userId="1b6ea79d-60d7-472e-a79a-e3fa9de1dfad" providerId="ADAL" clId="{7EADAE9A-F2CD-4ADD-9950-0327C2C1326E}" dt="2023-05-25T18:35:48.919" v="5112"/>
+          <ac:picMkLst>
+            <pc:docMk/>
+            <pc:sldMk cId="2802503080" sldId="343"/>
+            <ac:picMk id="11" creationId="{2601D412-7803-D6FF-730A-7731BAB4C783}"/>
+          </ac:picMkLst>
+        </pc:picChg>
+      </pc:sldChg>
+    </pc:docChg>
+  </pc:docChgLst>
+  <pc:docChgLst>
+    <pc:chgData name="Maxwell,Daniel" userId="1b6ea79d-60d7-472e-a79a-e3fa9de1dfad" providerId="ADAL" clId="{51126302-8A74-4563-B6B1-51EE16078136}"/>
+    <pc:docChg chg="modSld">
+      <pc:chgData name="Maxwell,Daniel" userId="1b6ea79d-60d7-472e-a79a-e3fa9de1dfad" providerId="ADAL" clId="{51126302-8A74-4563-B6B1-51EE16078136}" dt="2023-07-05T17:29:00.297" v="33"/>
+      <pc:docMkLst>
+        <pc:docMk/>
+      </pc:docMkLst>
+      <pc:sldChg chg="delSp modTransition modAnim">
+        <pc:chgData name="Maxwell,Daniel" userId="1b6ea79d-60d7-472e-a79a-e3fa9de1dfad" providerId="ADAL" clId="{51126302-8A74-4563-B6B1-51EE16078136}" dt="2023-07-05T17:29:00.297" v="33"/>
+        <pc:sldMkLst>
+          <pc:docMk/>
+          <pc:sldMk cId="1497806272" sldId="256"/>
+        </pc:sldMkLst>
+        <pc:picChg chg="del">
+          <ac:chgData name="Maxwell,Daniel" userId="1b6ea79d-60d7-472e-a79a-e3fa9de1dfad" providerId="ADAL" clId="{51126302-8A74-4563-B6B1-51EE16078136}" dt="2023-07-05T17:29:00.297" v="33"/>
+          <ac:picMkLst>
+            <pc:docMk/>
+            <pc:sldMk cId="1497806272" sldId="256"/>
+            <ac:picMk id="12" creationId="{9A25D629-32DD-4FFC-D579-1AFAAF3CAC74}"/>
+          </ac:picMkLst>
+        </pc:picChg>
+      </pc:sldChg>
+      <pc:sldChg chg="delSp modTransition modAnim">
+        <pc:chgData name="Maxwell,Daniel" userId="1b6ea79d-60d7-472e-a79a-e3fa9de1dfad" providerId="ADAL" clId="{51126302-8A74-4563-B6B1-51EE16078136}" dt="2023-07-05T17:29:00.297" v="33"/>
+        <pc:sldMkLst>
+          <pc:docMk/>
+          <pc:sldMk cId="829960364" sldId="258"/>
+        </pc:sldMkLst>
+        <pc:picChg chg="del">
+          <ac:chgData name="Maxwell,Daniel" userId="1b6ea79d-60d7-472e-a79a-e3fa9de1dfad" providerId="ADAL" clId="{51126302-8A74-4563-B6B1-51EE16078136}" dt="2023-07-05T17:29:00.297" v="33"/>
+          <ac:picMkLst>
+            <pc:docMk/>
+            <pc:sldMk cId="829960364" sldId="258"/>
+            <ac:picMk id="10" creationId="{76E5F377-2F1E-1374-1EE7-40BAA745C3A9}"/>
+          </ac:picMkLst>
+        </pc:picChg>
+      </pc:sldChg>
+      <pc:sldChg chg="delSp modTransition modAnim">
+        <pc:chgData name="Maxwell,Daniel" userId="1b6ea79d-60d7-472e-a79a-e3fa9de1dfad" providerId="ADAL" clId="{51126302-8A74-4563-B6B1-51EE16078136}" dt="2023-07-05T17:29:00.297" v="33"/>
+        <pc:sldMkLst>
+          <pc:docMk/>
+          <pc:sldMk cId="1201263647" sldId="259"/>
+        </pc:sldMkLst>
+        <pc:picChg chg="del">
+          <ac:chgData name="Maxwell,Daniel" userId="1b6ea79d-60d7-472e-a79a-e3fa9de1dfad" providerId="ADAL" clId="{51126302-8A74-4563-B6B1-51EE16078136}" dt="2023-07-05T17:29:00.297" v="33"/>
+          <ac:picMkLst>
+            <pc:docMk/>
+            <pc:sldMk cId="1201263647" sldId="259"/>
+            <ac:picMk id="7" creationId="{E76C7EF2-1B38-AE6D-EDEB-1FE3CF1CD903}"/>
+          </ac:picMkLst>
+        </pc:picChg>
+      </pc:sldChg>
+      <pc:sldChg chg="delSp modTransition modAnim">
+        <pc:chgData name="Maxwell,Daniel" userId="1b6ea79d-60d7-472e-a79a-e3fa9de1dfad" providerId="ADAL" clId="{51126302-8A74-4563-B6B1-51EE16078136}" dt="2023-07-05T17:29:00.297" v="33"/>
+        <pc:sldMkLst>
+          <pc:docMk/>
+          <pc:sldMk cId="662354849" sldId="260"/>
+        </pc:sldMkLst>
+        <pc:picChg chg="del">
+          <ac:chgData name="Maxwell,Daniel" userId="1b6ea79d-60d7-472e-a79a-e3fa9de1dfad" providerId="ADAL" clId="{51126302-8A74-4563-B6B1-51EE16078136}" dt="2023-07-05T17:29:00.297" v="33"/>
+          <ac:picMkLst>
+            <pc:docMk/>
+            <pc:sldMk cId="662354849" sldId="260"/>
+            <ac:picMk id="11" creationId="{EAF61509-50CC-588E-DC0B-977D27F48D27}"/>
+          </ac:picMkLst>
+        </pc:picChg>
+      </pc:sldChg>
+      <pc:sldChg chg="delSp modTransition modAnim">
+        <pc:chgData name="Maxwell,Daniel" userId="1b6ea79d-60d7-472e-a79a-e3fa9de1dfad" providerId="ADAL" clId="{51126302-8A74-4563-B6B1-51EE16078136}" dt="2023-07-05T17:29:00.297" v="33"/>
+        <pc:sldMkLst>
+          <pc:docMk/>
+          <pc:sldMk cId="2423826693" sldId="262"/>
+        </pc:sldMkLst>
+        <pc:picChg chg="del">
+          <ac:chgData name="Maxwell,Daniel" userId="1b6ea79d-60d7-472e-a79a-e3fa9de1dfad" providerId="ADAL" clId="{51126302-8A74-4563-B6B1-51EE16078136}" dt="2023-07-05T17:29:00.297" v="33"/>
+          <ac:picMkLst>
+            <pc:docMk/>
+            <pc:sldMk cId="2423826693" sldId="262"/>
+            <ac:picMk id="6" creationId="{00A66A14-E946-B801-A8E5-BCFFE5AB640D}"/>
+          </ac:picMkLst>
+        </pc:picChg>
+      </pc:sldChg>
+      <pc:sldChg chg="delSp modTransition modAnim">
+        <pc:chgData name="Maxwell,Daniel" userId="1b6ea79d-60d7-472e-a79a-e3fa9de1dfad" providerId="ADAL" clId="{51126302-8A74-4563-B6B1-51EE16078136}" dt="2023-07-05T17:29:00.297" v="33"/>
+        <pc:sldMkLst>
+          <pc:docMk/>
+          <pc:sldMk cId="496502312" sldId="267"/>
+        </pc:sldMkLst>
+        <pc:picChg chg="del">
+          <ac:chgData name="Maxwell,Daniel" userId="1b6ea79d-60d7-472e-a79a-e3fa9de1dfad" providerId="ADAL" clId="{51126302-8A74-4563-B6B1-51EE16078136}" dt="2023-07-05T17:29:00.297" v="33"/>
+          <ac:picMkLst>
+            <pc:docMk/>
+            <pc:sldMk cId="496502312" sldId="267"/>
+            <ac:picMk id="11" creationId="{FAA5DAB2-BE8F-9536-CAE1-9242B8539E55}"/>
+          </ac:picMkLst>
+        </pc:picChg>
+      </pc:sldChg>
+      <pc:sldChg chg="delSp modTransition modAnim">
+        <pc:chgData name="Maxwell,Daniel" userId="1b6ea79d-60d7-472e-a79a-e3fa9de1dfad" providerId="ADAL" clId="{51126302-8A74-4563-B6B1-51EE16078136}" dt="2023-07-05T17:29:00.297" v="33"/>
+        <pc:sldMkLst>
+          <pc:docMk/>
+          <pc:sldMk cId="4157323454" sldId="270"/>
+        </pc:sldMkLst>
+        <pc:picChg chg="del">
+          <ac:chgData name="Maxwell,Daniel" userId="1b6ea79d-60d7-472e-a79a-e3fa9de1dfad" providerId="ADAL" clId="{51126302-8A74-4563-B6B1-51EE16078136}" dt="2023-07-05T17:29:00.297" v="33"/>
+          <ac:picMkLst>
+            <pc:docMk/>
+            <pc:sldMk cId="4157323454" sldId="270"/>
+            <ac:picMk id="12" creationId="{C813CC4C-8536-436A-0D20-D54D59691C14}"/>
+          </ac:picMkLst>
+        </pc:picChg>
+      </pc:sldChg>
+      <pc:sldChg chg="delSp modTransition modAnim">
+        <pc:chgData name="Maxwell,Daniel" userId="1b6ea79d-60d7-472e-a79a-e3fa9de1dfad" providerId="ADAL" clId="{51126302-8A74-4563-B6B1-51EE16078136}" dt="2023-07-05T17:29:00.297" v="33"/>
+        <pc:sldMkLst>
+          <pc:docMk/>
+          <pc:sldMk cId="2288319049" sldId="271"/>
+        </pc:sldMkLst>
+        <pc:picChg chg="del">
+          <ac:chgData name="Maxwell,Daniel" userId="1b6ea79d-60d7-472e-a79a-e3fa9de1dfad" providerId="ADAL" clId="{51126302-8A74-4563-B6B1-51EE16078136}" dt="2023-07-05T17:29:00.297" v="33"/>
+          <ac:picMkLst>
+            <pc:docMk/>
+            <pc:sldMk cId="2288319049" sldId="271"/>
+            <ac:picMk id="9" creationId="{E1BB8828-B707-AC11-AEEF-A48D6FF719AE}"/>
+          </ac:picMkLst>
+        </pc:picChg>
+      </pc:sldChg>
+      <pc:sldChg chg="delSp modTransition modAnim">
+        <pc:chgData name="Maxwell,Daniel" userId="1b6ea79d-60d7-472e-a79a-e3fa9de1dfad" providerId="ADAL" clId="{51126302-8A74-4563-B6B1-51EE16078136}" dt="2023-07-05T17:29:00.297" v="33"/>
+        <pc:sldMkLst>
+          <pc:docMk/>
+          <pc:sldMk cId="1958738313" sldId="273"/>
+        </pc:sldMkLst>
+        <pc:picChg chg="del">
+          <ac:chgData name="Maxwell,Daniel" userId="1b6ea79d-60d7-472e-a79a-e3fa9de1dfad" providerId="ADAL" clId="{51126302-8A74-4563-B6B1-51EE16078136}" dt="2023-07-05T17:29:00.297" v="33"/>
+          <ac:picMkLst>
+            <pc:docMk/>
+            <pc:sldMk cId="1958738313" sldId="273"/>
+            <ac:picMk id="6" creationId="{7F870087-1355-5BC9-64EB-391830D7E4E6}"/>
+          </ac:picMkLst>
+        </pc:picChg>
+      </pc:sldChg>
+      <pc:sldChg chg="delSp modTransition modAnim">
+        <pc:chgData name="Maxwell,Daniel" userId="1b6ea79d-60d7-472e-a79a-e3fa9de1dfad" providerId="ADAL" clId="{51126302-8A74-4563-B6B1-51EE16078136}" dt="2023-07-05T17:29:00.297" v="33"/>
+        <pc:sldMkLst>
+          <pc:docMk/>
+          <pc:sldMk cId="170311557" sldId="277"/>
+        </pc:sldMkLst>
+        <pc:picChg chg="del">
+          <ac:chgData name="Maxwell,Daniel" userId="1b6ea79d-60d7-472e-a79a-e3fa9de1dfad" providerId="ADAL" clId="{51126302-8A74-4563-B6B1-51EE16078136}" dt="2023-07-05T17:29:00.297" v="33"/>
+          <ac:picMkLst>
+            <pc:docMk/>
+            <pc:sldMk cId="170311557" sldId="277"/>
+            <ac:picMk id="65" creationId="{9C8B7285-1FBE-82F2-7D07-9D6CF3ACAB73}"/>
+          </ac:picMkLst>
+        </pc:picChg>
+      </pc:sldChg>
+      <pc:sldChg chg="delSp modTransition modAnim">
+        <pc:chgData name="Maxwell,Daniel" userId="1b6ea79d-60d7-472e-a79a-e3fa9de1dfad" providerId="ADAL" clId="{51126302-8A74-4563-B6B1-51EE16078136}" dt="2023-07-05T17:29:00.297" v="33"/>
+        <pc:sldMkLst>
+          <pc:docMk/>
+          <pc:sldMk cId="4083169647" sldId="280"/>
+        </pc:sldMkLst>
+        <pc:picChg chg="del">
+          <ac:chgData name="Maxwell,Daniel" userId="1b6ea79d-60d7-472e-a79a-e3fa9de1dfad" providerId="ADAL" clId="{51126302-8A74-4563-B6B1-51EE16078136}" dt="2023-07-05T17:29:00.297" v="33"/>
+          <ac:picMkLst>
+            <pc:docMk/>
+            <pc:sldMk cId="4083169647" sldId="280"/>
+            <ac:picMk id="7" creationId="{9DEAF864-137B-5269-88CF-2F3F7F381ABE}"/>
+          </ac:picMkLst>
+        </pc:picChg>
+      </pc:sldChg>
+      <pc:sldChg chg="delSp modTransition modAnim">
+        <pc:chgData name="Maxwell,Daniel" userId="1b6ea79d-60d7-472e-a79a-e3fa9de1dfad" providerId="ADAL" clId="{51126302-8A74-4563-B6B1-51EE16078136}" dt="2023-07-05T17:29:00.297" v="33"/>
+        <pc:sldMkLst>
+          <pc:docMk/>
+          <pc:sldMk cId="337556145" sldId="282"/>
+        </pc:sldMkLst>
+        <pc:picChg chg="del">
+          <ac:chgData name="Maxwell,Daniel" userId="1b6ea79d-60d7-472e-a79a-e3fa9de1dfad" providerId="ADAL" clId="{51126302-8A74-4563-B6B1-51EE16078136}" dt="2023-07-05T17:29:00.297" v="33"/>
+          <ac:picMkLst>
+            <pc:docMk/>
+            <pc:sldMk cId="337556145" sldId="282"/>
+            <ac:picMk id="4" creationId="{85FCFAC6-A532-3303-BF9F-6ADBD55FF23E}"/>
+          </ac:picMkLst>
+        </pc:picChg>
+      </pc:sldChg>
+      <pc:sldChg chg="delSp modTransition modAnim">
+        <pc:chgData name="Maxwell,Daniel" userId="1b6ea79d-60d7-472e-a79a-e3fa9de1dfad" providerId="ADAL" clId="{51126302-8A74-4563-B6B1-51EE16078136}" dt="2023-07-05T17:29:00.297" v="33"/>
+        <pc:sldMkLst>
+          <pc:docMk/>
+          <pc:sldMk cId="2815250072" sldId="287"/>
+        </pc:sldMkLst>
+        <pc:picChg chg="del">
+          <ac:chgData name="Maxwell,Daniel" userId="1b6ea79d-60d7-472e-a79a-e3fa9de1dfad" providerId="ADAL" clId="{51126302-8A74-4563-B6B1-51EE16078136}" dt="2023-07-05T17:29:00.297" v="33"/>
+          <ac:picMkLst>
+            <pc:docMk/>
+            <pc:sldMk cId="2815250072" sldId="287"/>
+            <ac:picMk id="7" creationId="{DD9F4BE1-7FB4-55F4-AD59-D5FDBD2FF2B9}"/>
+          </ac:picMkLst>
+        </pc:picChg>
+      </pc:sldChg>
+      <pc:sldChg chg="delSp modTransition modAnim">
+        <pc:chgData name="Maxwell,Daniel" userId="1b6ea79d-60d7-472e-a79a-e3fa9de1dfad" providerId="ADAL" clId="{51126302-8A74-4563-B6B1-51EE16078136}" dt="2023-07-05T17:29:00.297" v="33"/>
+        <pc:sldMkLst>
+          <pc:docMk/>
+          <pc:sldMk cId="3192052037" sldId="293"/>
+        </pc:sldMkLst>
+        <pc:picChg chg="del">
+          <ac:chgData name="Maxwell,Daniel" userId="1b6ea79d-60d7-472e-a79a-e3fa9de1dfad" providerId="ADAL" clId="{51126302-8A74-4563-B6B1-51EE16078136}" dt="2023-07-05T17:29:00.297" v="33"/>
+          <ac:picMkLst>
+            <pc:docMk/>
+            <pc:sldMk cId="3192052037" sldId="293"/>
+            <ac:picMk id="8" creationId="{3646C95C-4F3A-453B-750E-44A9F00E5D12}"/>
+          </ac:picMkLst>
+        </pc:picChg>
+      </pc:sldChg>
+      <pc:sldChg chg="delSp modTransition modAnim">
+        <pc:chgData name="Maxwell,Daniel" userId="1b6ea79d-60d7-472e-a79a-e3fa9de1dfad" providerId="ADAL" clId="{51126302-8A74-4563-B6B1-51EE16078136}" dt="2023-07-05T17:29:00.297" v="33"/>
+        <pc:sldMkLst>
+          <pc:docMk/>
+          <pc:sldMk cId="1132462549" sldId="296"/>
+        </pc:sldMkLst>
+        <pc:picChg chg="del">
+          <ac:chgData name="Maxwell,Daniel" userId="1b6ea79d-60d7-472e-a79a-e3fa9de1dfad" providerId="ADAL" clId="{51126302-8A74-4563-B6B1-51EE16078136}" dt="2023-07-05T17:29:00.297" v="33"/>
+          <ac:picMkLst>
+            <pc:docMk/>
+            <pc:sldMk cId="1132462549" sldId="296"/>
+            <ac:picMk id="17" creationId="{D281C9DC-498C-06FC-70CB-8101BB6F393D}"/>
+          </ac:picMkLst>
+        </pc:picChg>
+      </pc:sldChg>
+      <pc:sldChg chg="delSp modSp mod modTransition modAnim">
+        <pc:chgData name="Maxwell,Daniel" userId="1b6ea79d-60d7-472e-a79a-e3fa9de1dfad" providerId="ADAL" clId="{51126302-8A74-4563-B6B1-51EE16078136}" dt="2023-07-05T17:29:00.297" v="33"/>
+        <pc:sldMkLst>
+          <pc:docMk/>
+          <pc:sldMk cId="4206352663" sldId="329"/>
+        </pc:sldMkLst>
+        <pc:spChg chg="mod">
+          <ac:chgData name="Maxwell,Daniel" userId="1b6ea79d-60d7-472e-a79a-e3fa9de1dfad" providerId="ADAL" clId="{51126302-8A74-4563-B6B1-51EE16078136}" dt="2023-07-05T17:28:19.454" v="32" actId="6549"/>
+          <ac:spMkLst>
+            <pc:docMk/>
+            <pc:sldMk cId="4206352663" sldId="329"/>
+            <ac:spMk id="3" creationId="{098BC2D2-CCF7-4C63-8489-B46BF394FCA2}"/>
+          </ac:spMkLst>
+        </pc:spChg>
+        <pc:picChg chg="del">
+          <ac:chgData name="Maxwell,Daniel" userId="1b6ea79d-60d7-472e-a79a-e3fa9de1dfad" providerId="ADAL" clId="{51126302-8A74-4563-B6B1-51EE16078136}" dt="2023-07-05T17:29:00.297" v="33"/>
+          <ac:picMkLst>
+            <pc:docMk/>
+            <pc:sldMk cId="4206352663" sldId="329"/>
+            <ac:picMk id="7" creationId="{218651F8-4116-1E26-6B30-3D354FBDF1C2}"/>
+          </ac:picMkLst>
+        </pc:picChg>
+      </pc:sldChg>
+      <pc:sldChg chg="delSp modTransition modAnim">
+        <pc:chgData name="Maxwell,Daniel" userId="1b6ea79d-60d7-472e-a79a-e3fa9de1dfad" providerId="ADAL" clId="{51126302-8A74-4563-B6B1-51EE16078136}" dt="2023-07-05T17:29:00.297" v="33"/>
+        <pc:sldMkLst>
+          <pc:docMk/>
+          <pc:sldMk cId="3789637587" sldId="330"/>
+        </pc:sldMkLst>
+        <pc:picChg chg="del">
+          <ac:chgData name="Maxwell,Daniel" userId="1b6ea79d-60d7-472e-a79a-e3fa9de1dfad" providerId="ADAL" clId="{51126302-8A74-4563-B6B1-51EE16078136}" dt="2023-07-05T17:29:00.297" v="33"/>
+          <ac:picMkLst>
+            <pc:docMk/>
+            <pc:sldMk cId="3789637587" sldId="330"/>
+            <ac:picMk id="3" creationId="{E142FED4-0F84-B36F-F801-0EC65C51D26E}"/>
+          </ac:picMkLst>
+        </pc:picChg>
+      </pc:sldChg>
+      <pc:sldChg chg="delSp modTransition modAnim">
+        <pc:chgData name="Maxwell,Daniel" userId="1b6ea79d-60d7-472e-a79a-e3fa9de1dfad" providerId="ADAL" clId="{51126302-8A74-4563-B6B1-51EE16078136}" dt="2023-07-05T17:29:00.297" v="33"/>
+        <pc:sldMkLst>
+          <pc:docMk/>
+          <pc:sldMk cId="3979248159" sldId="331"/>
+        </pc:sldMkLst>
+        <pc:picChg chg="del">
+          <ac:chgData name="Maxwell,Daniel" userId="1b6ea79d-60d7-472e-a79a-e3fa9de1dfad" providerId="ADAL" clId="{51126302-8A74-4563-B6B1-51EE16078136}" dt="2023-07-05T17:29:00.297" v="33"/>
+          <ac:picMkLst>
+            <pc:docMk/>
+            <pc:sldMk cId="3979248159" sldId="331"/>
+            <ac:picMk id="3" creationId="{080DBE7A-59D9-F032-BD87-7D163A781D77}"/>
+          </ac:picMkLst>
+        </pc:picChg>
+      </pc:sldChg>
+      <pc:sldChg chg="delSp modTransition modAnim">
+        <pc:chgData name="Maxwell,Daniel" userId="1b6ea79d-60d7-472e-a79a-e3fa9de1dfad" providerId="ADAL" clId="{51126302-8A74-4563-B6B1-51EE16078136}" dt="2023-07-05T17:29:00.297" v="33"/>
+        <pc:sldMkLst>
+          <pc:docMk/>
+          <pc:sldMk cId="2967570048" sldId="332"/>
+        </pc:sldMkLst>
+        <pc:picChg chg="del">
+          <ac:chgData name="Maxwell,Daniel" userId="1b6ea79d-60d7-472e-a79a-e3fa9de1dfad" providerId="ADAL" clId="{51126302-8A74-4563-B6B1-51EE16078136}" dt="2023-07-05T17:29:00.297" v="33"/>
+          <ac:picMkLst>
+            <pc:docMk/>
+            <pc:sldMk cId="2967570048" sldId="332"/>
+            <ac:picMk id="7" creationId="{77C85524-D007-F051-248A-07D58F020852}"/>
+          </ac:picMkLst>
+        </pc:picChg>
+      </pc:sldChg>
+      <pc:sldChg chg="delSp modTransition modAnim">
+        <pc:chgData name="Maxwell,Daniel" userId="1b6ea79d-60d7-472e-a79a-e3fa9de1dfad" providerId="ADAL" clId="{51126302-8A74-4563-B6B1-51EE16078136}" dt="2023-07-05T17:29:00.297" v="33"/>
+        <pc:sldMkLst>
+          <pc:docMk/>
+          <pc:sldMk cId="2794066038" sldId="334"/>
+        </pc:sldMkLst>
+        <pc:picChg chg="del">
+          <ac:chgData name="Maxwell,Daniel" userId="1b6ea79d-60d7-472e-a79a-e3fa9de1dfad" providerId="ADAL" clId="{51126302-8A74-4563-B6B1-51EE16078136}" dt="2023-07-05T17:29:00.297" v="33"/>
+          <ac:picMkLst>
+            <pc:docMk/>
+            <pc:sldMk cId="2794066038" sldId="334"/>
+            <ac:picMk id="6" creationId="{4EED1408-1716-2D87-B3E0-D732F60CCBB5}"/>
+          </ac:picMkLst>
+        </pc:picChg>
+      </pc:sldChg>
+      <pc:sldChg chg="delSp modTransition modAnim">
+        <pc:chgData name="Maxwell,Daniel" userId="1b6ea79d-60d7-472e-a79a-e3fa9de1dfad" providerId="ADAL" clId="{51126302-8A74-4563-B6B1-51EE16078136}" dt="2023-07-05T17:29:00.297" v="33"/>
+        <pc:sldMkLst>
+          <pc:docMk/>
+          <pc:sldMk cId="1823499810" sldId="336"/>
+        </pc:sldMkLst>
+        <pc:picChg chg="del">
+          <ac:chgData name="Maxwell,Daniel" userId="1b6ea79d-60d7-472e-a79a-e3fa9de1dfad" providerId="ADAL" clId="{51126302-8A74-4563-B6B1-51EE16078136}" dt="2023-07-05T17:29:00.297" v="33"/>
+          <ac:picMkLst>
+            <pc:docMk/>
+            <pc:sldMk cId="1823499810" sldId="336"/>
+            <ac:picMk id="5" creationId="{C6018A0C-9108-5F86-278D-BF92DE141DDF}"/>
+          </ac:picMkLst>
+        </pc:picChg>
+      </pc:sldChg>
+      <pc:sldChg chg="modTransition">
+        <pc:chgData name="Maxwell,Daniel" userId="1b6ea79d-60d7-472e-a79a-e3fa9de1dfad" providerId="ADAL" clId="{51126302-8A74-4563-B6B1-51EE16078136}" dt="2023-07-05T17:29:00.297" v="33"/>
+        <pc:sldMkLst>
+          <pc:docMk/>
+          <pc:sldMk cId="1859151050" sldId="337"/>
+        </pc:sldMkLst>
+      </pc:sldChg>
+      <pc:sldChg chg="delSp modTransition modAnim">
+        <pc:chgData name="Maxwell,Daniel" userId="1b6ea79d-60d7-472e-a79a-e3fa9de1dfad" providerId="ADAL" clId="{51126302-8A74-4563-B6B1-51EE16078136}" dt="2023-07-05T17:29:00.297" v="33"/>
+        <pc:sldMkLst>
+          <pc:docMk/>
+          <pc:sldMk cId="4064151526" sldId="338"/>
+        </pc:sldMkLst>
+        <pc:picChg chg="del">
+          <ac:chgData name="Maxwell,Daniel" userId="1b6ea79d-60d7-472e-a79a-e3fa9de1dfad" providerId="ADAL" clId="{51126302-8A74-4563-B6B1-51EE16078136}" dt="2023-07-05T17:29:00.297" v="33"/>
+          <ac:picMkLst>
+            <pc:docMk/>
+            <pc:sldMk cId="4064151526" sldId="338"/>
+            <ac:picMk id="7" creationId="{870D7F6B-275D-C39C-1C4A-3A7F551406A5}"/>
+          </ac:picMkLst>
+        </pc:picChg>
+      </pc:sldChg>
+      <pc:sldChg chg="delSp modTransition modAnim">
+        <pc:chgData name="Maxwell,Daniel" userId="1b6ea79d-60d7-472e-a79a-e3fa9de1dfad" providerId="ADAL" clId="{51126302-8A74-4563-B6B1-51EE16078136}" dt="2023-07-05T17:29:00.297" v="33"/>
+        <pc:sldMkLst>
+          <pc:docMk/>
+          <pc:sldMk cId="3665965237" sldId="339"/>
+        </pc:sldMkLst>
+        <pc:picChg chg="del">
+          <ac:chgData name="Maxwell,Daniel" userId="1b6ea79d-60d7-472e-a79a-e3fa9de1dfad" providerId="ADAL" clId="{51126302-8A74-4563-B6B1-51EE16078136}" dt="2023-07-05T17:29:00.297" v="33"/>
+          <ac:picMkLst>
+            <pc:docMk/>
+            <pc:sldMk cId="3665965237" sldId="339"/>
+            <ac:picMk id="7" creationId="{EDC682D8-2366-C522-F80D-DBBE7755EE6A}"/>
+          </ac:picMkLst>
+        </pc:picChg>
+      </pc:sldChg>
+      <pc:sldChg chg="delSp modTransition modAnim">
+        <pc:chgData name="Maxwell,Daniel" userId="1b6ea79d-60d7-472e-a79a-e3fa9de1dfad" providerId="ADAL" clId="{51126302-8A74-4563-B6B1-51EE16078136}" dt="2023-07-05T17:29:00.297" v="33"/>
+        <pc:sldMkLst>
+          <pc:docMk/>
+          <pc:sldMk cId="2194656671" sldId="340"/>
+        </pc:sldMkLst>
+        <pc:picChg chg="del">
+          <ac:chgData name="Maxwell,Daniel" userId="1b6ea79d-60d7-472e-a79a-e3fa9de1dfad" providerId="ADAL" clId="{51126302-8A74-4563-B6B1-51EE16078136}" dt="2023-07-05T17:29:00.297" v="33"/>
+          <ac:picMkLst>
+            <pc:docMk/>
+            <pc:sldMk cId="2194656671" sldId="340"/>
+            <ac:picMk id="7" creationId="{35BE8921-D076-F461-BF0A-0E8B86379808}"/>
+          </ac:picMkLst>
+        </pc:picChg>
+      </pc:sldChg>
+      <pc:sldChg chg="delSp modTransition modAnim">
+        <pc:chgData name="Maxwell,Daniel" userId="1b6ea79d-60d7-472e-a79a-e3fa9de1dfad" providerId="ADAL" clId="{51126302-8A74-4563-B6B1-51EE16078136}" dt="2023-07-05T17:29:00.297" v="33"/>
+        <pc:sldMkLst>
+          <pc:docMk/>
+          <pc:sldMk cId="3935765361" sldId="341"/>
+        </pc:sldMkLst>
+        <pc:picChg chg="del">
+          <ac:chgData name="Maxwell,Daniel" userId="1b6ea79d-60d7-472e-a79a-e3fa9de1dfad" providerId="ADAL" clId="{51126302-8A74-4563-B6B1-51EE16078136}" dt="2023-07-05T17:29:00.297" v="33"/>
+          <ac:picMkLst>
+            <pc:docMk/>
+            <pc:sldMk cId="3935765361" sldId="341"/>
+            <ac:picMk id="13" creationId="{B08BCC7C-7A01-1983-0FA0-0C236C16428D}"/>
+          </ac:picMkLst>
+        </pc:picChg>
+      </pc:sldChg>
+      <pc:sldChg chg="delSp modTransition modAnim">
+        <pc:chgData name="Maxwell,Daniel" userId="1b6ea79d-60d7-472e-a79a-e3fa9de1dfad" providerId="ADAL" clId="{51126302-8A74-4563-B6B1-51EE16078136}" dt="2023-07-05T17:29:00.297" v="33"/>
+        <pc:sldMkLst>
+          <pc:docMk/>
+          <pc:sldMk cId="4269837095" sldId="342"/>
+        </pc:sldMkLst>
+        <pc:picChg chg="del">
+          <ac:chgData name="Maxwell,Daniel" userId="1b6ea79d-60d7-472e-a79a-e3fa9de1dfad" providerId="ADAL" clId="{51126302-8A74-4563-B6B1-51EE16078136}" dt="2023-07-05T17:29:00.297" v="33"/>
+          <ac:picMkLst>
+            <pc:docMk/>
+            <pc:sldMk cId="4269837095" sldId="342"/>
+            <ac:picMk id="17" creationId="{CF65CC0C-7DCE-5B6A-8893-910987416AC6}"/>
+          </ac:picMkLst>
+        </pc:picChg>
+      </pc:sldChg>
+      <pc:sldChg chg="delSp modTransition modAnim">
+        <pc:chgData name="Maxwell,Daniel" userId="1b6ea79d-60d7-472e-a79a-e3fa9de1dfad" providerId="ADAL" clId="{51126302-8A74-4563-B6B1-51EE16078136}" dt="2023-07-05T17:29:00.297" v="33"/>
+        <pc:sldMkLst>
+          <pc:docMk/>
+          <pc:sldMk cId="2802503080" sldId="343"/>
+        </pc:sldMkLst>
+        <pc:picChg chg="del">
+          <ac:chgData name="Maxwell,Daniel" userId="1b6ea79d-60d7-472e-a79a-e3fa9de1dfad" providerId="ADAL" clId="{51126302-8A74-4563-B6B1-51EE16078136}" dt="2023-07-05T17:29:00.297" v="33"/>
+          <ac:picMkLst>
+            <pc:docMk/>
+            <pc:sldMk cId="2802503080" sldId="343"/>
+            <ac:picMk id="11" creationId="{2601D412-7803-D6FF-730A-7731BAB4C783}"/>
+          </ac:picMkLst>
+        </pc:picChg>
+      </pc:sldChg>
+    </pc:docChg>
+  </pc:docChgLst>
+  <pc:docChgLst>
+    <pc:chgData name="brian.stucky" userId="S::brian.stucky_usda.gov#ext#@uflorida.onmicrosoft.com::5072c14d-432b-458e-801b-9505db496804" providerId="AD" clId="Web-{1B4ECB15-F96E-6087-430A-D71DFABB7837}"/>
     <pc:docChg chg="mod">
-      <pc:chgData name="heather.savoy" userId="S::heather.savoy_usda.gov#ext#@uflorida.onmicrosoft.com::14fc4cfb-ad45-439a-89d7-7df559a38e96" providerId="AD" clId="Web-{0C6293EC-6907-68E5-5001-1052E3FDB578}" dt="2023-11-30T04:27:44.851" v="1"/>
+      <pc:chgData name="brian.stucky" userId="S::brian.stucky_usda.gov#ext#@uflorida.onmicrosoft.com::5072c14d-432b-458e-801b-9505db496804" providerId="AD" clId="Web-{1B4ECB15-F96E-6087-430A-D71DFABB7837}" dt="2023-11-30T04:28:43.941" v="4"/>
       <pc:docMkLst>
         <pc:docMk/>
       </pc:docMkLst>
       <pc:sldChg chg="addCm">
-        <pc:chgData name="heather.savoy" userId="S::heather.savoy_usda.gov#ext#@uflorida.onmicrosoft.com::14fc4cfb-ad45-439a-89d7-7df559a38e96" providerId="AD" clId="Web-{0C6293EC-6907-68E5-5001-1052E3FDB578}" dt="2023-11-30T04:27:44.851" v="1"/>
+        <pc:chgData name="brian.stucky" userId="S::brian.stucky_usda.gov#ext#@uflorida.onmicrosoft.com::5072c14d-432b-458e-801b-9505db496804" providerId="AD" clId="Web-{1B4ECB15-F96E-6087-430A-D71DFABB7837}" dt="2023-11-30T04:25:38.670" v="1"/>
         <pc:sldMkLst>
           <pc:docMk/>
-          <pc:sldMk cId="662354849" sldId="260"/>
+          <pc:sldMk cId="1497806272" sldId="256"/>
         </pc:sldMkLst>
         <pc:extLst>
           <p:ext xmlns:p="http://schemas.openxmlformats.org/presentationml/2006/main" uri="{D6D511B9-2390-475A-947B-AFAB55BFBCF1}">
             <pc226:cmChg xmlns:pc226="http://schemas.microsoft.com/office/powerpoint/2022/06/main/command" chg="add">
-              <pc226:chgData name="heather.savoy" userId="S::heather.savoy_usda.gov#ext#@uflorida.onmicrosoft.com::14fc4cfb-ad45-439a-89d7-7df559a38e96" providerId="AD" clId="Web-{0C6293EC-6907-68E5-5001-1052E3FDB578}" dt="2023-11-30T04:27:44.851" v="1"/>
+              <pc226:chgData name="brian.stucky" userId="S::brian.stucky_usda.gov#ext#@uflorida.onmicrosoft.com::5072c14d-432b-458e-801b-9505db496804" providerId="AD" clId="Web-{1B4ECB15-F96E-6087-430A-D71DFABB7837}" dt="2023-11-30T04:25:38.670" v="1"/>
               <pc2:cmMkLst xmlns:pc2="http://schemas.microsoft.com/office/powerpoint/2019/9/main/command">
                 <pc:docMk/>
-                <pc:sldMk cId="662354849" sldId="260"/>
-                <pc2:cmMk id="{F0E7D142-9E67-4A1B-B1CA-B53583088BD4}"/>
+                <pc:sldMk cId="1497806272" sldId="256"/>
+                <pc2:cmMk id="{329310D8-0964-4626-8D31-036CD4CD6DB2}"/>
               </pc2:cmMkLst>
             </pc226:cmChg>
           </p:ext>
         </pc:extLst>
+      </pc:sldChg>
+      <pc:sldChg chg="addCm">
+        <pc:chgData name="brian.stucky" userId="S::brian.stucky_usda.gov#ext#@uflorida.onmicrosoft.com::5072c14d-432b-458e-801b-9505db496804" providerId="AD" clId="Web-{1B4ECB15-F96E-6087-430A-D71DFABB7837}" dt="2023-11-30T04:26:42.781" v="2"/>
+        <pc:sldMkLst>
+          <pc:docMk/>
+          <pc:sldMk cId="2288319049" sldId="271"/>
+        </pc:sldMkLst>
+        <pc:extLst>
+          <p:ext xmlns:p="http://schemas.openxmlformats.org/presentationml/2006/main" uri="{D6D511B9-2390-475A-947B-AFAB55BFBCF1}">
+            <pc226:cmChg xmlns:pc226="http://schemas.microsoft.com/office/powerpoint/2022/06/main/command" chg="add">
+              <pc226:chgData name="brian.stucky" userId="S::brian.stucky_usda.gov#ext#@uflorida.onmicrosoft.com::5072c14d-432b-458e-801b-9505db496804" providerId="AD" clId="Web-{1B4ECB15-F96E-6087-430A-D71DFABB7837}" dt="2023-11-30T04:26:42.781" v="2"/>
+              <pc2:cmMkLst xmlns:pc2="http://schemas.microsoft.com/office/powerpoint/2019/9/main/command">
+                <pc:docMk/>
+                <pc:sldMk cId="2288319049" sldId="271"/>
+                <pc2:cmMk id="{E6BDAA77-A739-405A-B6BB-B3A25F33140A}"/>
+              </pc2:cmMkLst>
+            </pc226:cmChg>
+          </p:ext>
+        </pc:extLst>
+      </pc:sldChg>
+      <pc:sldChg chg="addCm">
+        <pc:chgData name="brian.stucky" userId="S::brian.stucky_usda.gov#ext#@uflorida.onmicrosoft.com::5072c14d-432b-458e-801b-9505db496804" providerId="AD" clId="Web-{1B4ECB15-F96E-6087-430A-D71DFABB7837}" dt="2023-11-30T04:28:43.941" v="4"/>
+        <pc:sldMkLst>
+          <pc:docMk/>
+          <pc:sldMk cId="1958738313" sldId="273"/>
+        </pc:sldMkLst>
+        <pc:extLst>
+          <p:ext xmlns:p="http://schemas.openxmlformats.org/presentationml/2006/main" uri="{D6D511B9-2390-475A-947B-AFAB55BFBCF1}">
+            <pc226:cmChg xmlns:pc226="http://schemas.microsoft.com/office/powerpoint/2022/06/main/command" chg="add">
+              <pc226:chgData name="brian.stucky" userId="S::brian.stucky_usda.gov#ext#@uflorida.onmicrosoft.com::5072c14d-432b-458e-801b-9505db496804" providerId="AD" clId="Web-{1B4ECB15-F96E-6087-430A-D71DFABB7837}" dt="2023-11-30T04:28:43.941" v="4"/>
+              <pc2:cmMkLst xmlns:pc2="http://schemas.microsoft.com/office/powerpoint/2019/9/main/command">
+                <pc:docMk/>
+                <pc:sldMk cId="1958738313" sldId="273"/>
+                <pc2:cmMk id="{279D8E60-1B1E-4A01-A3C3-6A6B0DC1111B}"/>
+              </pc2:cmMkLst>
+            </pc226:cmChg>
+          </p:ext>
+        </pc:extLst>
+      </pc:sldChg>
+      <pc:sldChg chg="addCm">
+        <pc:chgData name="brian.stucky" userId="S::brian.stucky_usda.gov#ext#@uflorida.onmicrosoft.com::5072c14d-432b-458e-801b-9505db496804" providerId="AD" clId="Web-{1B4ECB15-F96E-6087-430A-D71DFABB7837}" dt="2023-11-30T04:27:45.080" v="3"/>
+        <pc:sldMkLst>
+          <pc:docMk/>
+          <pc:sldMk cId="4083169647" sldId="280"/>
+        </pc:sldMkLst>
+        <pc:extLst>
+          <p:ext xmlns:p="http://schemas.openxmlformats.org/presentationml/2006/main" uri="{D6D511B9-2390-475A-947B-AFAB55BFBCF1}">
+            <pc226:cmChg xmlns:pc226="http://schemas.microsoft.com/office/powerpoint/2022/06/main/command" chg="add">
+              <pc226:chgData name="brian.stucky" userId="S::brian.stucky_usda.gov#ext#@uflorida.onmicrosoft.com::5072c14d-432b-458e-801b-9505db496804" providerId="AD" clId="Web-{1B4ECB15-F96E-6087-430A-D71DFABB7837}" dt="2023-11-30T04:27:45.080" v="3"/>
+              <pc2:cmMkLst xmlns:pc2="http://schemas.microsoft.com/office/powerpoint/2019/9/main/command">
+                <pc:docMk/>
+                <pc:sldMk cId="4083169647" sldId="280"/>
+                <pc2:cmMk id="{5F15D6F7-5430-4AC9-BBFC-8F52A8F0598E}"/>
+              </pc2:cmMkLst>
+            </pc226:cmChg>
+          </p:ext>
+        </pc:extLst>
+      </pc:sldChg>
+    </pc:docChg>
+  </pc:docChgLst>
+  <pc:docChgLst>
+    <pc:chgData name="Lutticken,Ian" userId="7c924bd7-b15d-44ce-a55d-4f6ade4fe12e" providerId="ADAL" clId="{1AFCA746-C8A1-4B31-A5DE-98DB35043DA4}"/>
+    <pc:docChg chg="delSld modSld">
+      <pc:chgData name="Lutticken,Ian" userId="7c924bd7-b15d-44ce-a55d-4f6ade4fe12e" providerId="ADAL" clId="{1AFCA746-C8A1-4B31-A5DE-98DB35043DA4}" dt="2024-11-20T17:39:57.838" v="5" actId="2696"/>
+      <pc:docMkLst>
+        <pc:docMk/>
+      </pc:docMkLst>
+      <pc:sldChg chg="modSp mod">
+        <pc:chgData name="Lutticken,Ian" userId="7c924bd7-b15d-44ce-a55d-4f6ade4fe12e" providerId="ADAL" clId="{1AFCA746-C8A1-4B31-A5DE-98DB35043DA4}" dt="2024-11-20T17:39:05.992" v="3" actId="20577"/>
+        <pc:sldMkLst>
+          <pc:docMk/>
+          <pc:sldMk cId="1497806272" sldId="256"/>
+        </pc:sldMkLst>
+        <pc:graphicFrameChg chg="modGraphic">
+          <ac:chgData name="Lutticken,Ian" userId="7c924bd7-b15d-44ce-a55d-4f6ade4fe12e" providerId="ADAL" clId="{1AFCA746-C8A1-4B31-A5DE-98DB35043DA4}" dt="2024-11-20T17:39:05.992" v="3" actId="20577"/>
+          <ac:graphicFrameMkLst>
+            <pc:docMk/>
+            <pc:sldMk cId="1497806272" sldId="256"/>
+            <ac:graphicFrameMk id="6" creationId="{1EAB3EF0-EE31-3F46-207C-3B2DEA6AEA35}"/>
+          </ac:graphicFrameMkLst>
+        </pc:graphicFrameChg>
+      </pc:sldChg>
+      <pc:sldChg chg="del">
+        <pc:chgData name="Lutticken,Ian" userId="7c924bd7-b15d-44ce-a55d-4f6ade4fe12e" providerId="ADAL" clId="{1AFCA746-C8A1-4B31-A5DE-98DB35043DA4}" dt="2024-11-20T17:39:53.967" v="4" actId="2696"/>
+        <pc:sldMkLst>
+          <pc:docMk/>
+          <pc:sldMk cId="2288319049" sldId="271"/>
+        </pc:sldMkLst>
+      </pc:sldChg>
+      <pc:sldChg chg="del">
+        <pc:chgData name="Lutticken,Ian" userId="7c924bd7-b15d-44ce-a55d-4f6ade4fe12e" providerId="ADAL" clId="{1AFCA746-C8A1-4B31-A5DE-98DB35043DA4}" dt="2024-11-20T17:39:57.838" v="5" actId="2696"/>
+        <pc:sldMkLst>
+          <pc:docMk/>
+          <pc:sldMk cId="4273893588" sldId="345"/>
+        </pc:sldMkLst>
       </pc:sldChg>
     </pc:docChg>
   </pc:docChgLst>
@@ -2073,1378 +3424,12 @@
       </pc:sldChg>
     </pc:docChg>
   </pc:docChgLst>
-  <pc:docChgLst>
-    <pc:chgData name="Maxwell,Daniel" userId="S::danielmaxwell@ufl.edu::1b6ea79d-60d7-472e-a79a-e3fa9de1dfad" providerId="AD" clId="Web-{338F8242-20CC-BD5C-C11A-0AAB6E9FA4EF}"/>
-    <pc:docChg chg="mod modSld">
-      <pc:chgData name="Maxwell,Daniel" userId="S::danielmaxwell@ufl.edu::1b6ea79d-60d7-472e-a79a-e3fa9de1dfad" providerId="AD" clId="Web-{338F8242-20CC-BD5C-C11A-0AAB6E9FA4EF}" dt="2023-11-30T15:44:50.310" v="19" actId="20577"/>
-      <pc:docMkLst>
-        <pc:docMk/>
-      </pc:docMkLst>
-      <pc:sldChg chg="modSp modCm">
-        <pc:chgData name="Maxwell,Daniel" userId="S::danielmaxwell@ufl.edu::1b6ea79d-60d7-472e-a79a-e3fa9de1dfad" providerId="AD" clId="Web-{338F8242-20CC-BD5C-C11A-0AAB6E9FA4EF}" dt="2023-11-30T15:42:05.399" v="9" actId="20577"/>
-        <pc:sldMkLst>
-          <pc:docMk/>
-          <pc:sldMk cId="1497806272" sldId="256"/>
-        </pc:sldMkLst>
-        <pc:spChg chg="mod">
-          <ac:chgData name="Maxwell,Daniel" userId="S::danielmaxwell@ufl.edu::1b6ea79d-60d7-472e-a79a-e3fa9de1dfad" providerId="AD" clId="Web-{338F8242-20CC-BD5C-C11A-0AAB6E9FA4EF}" dt="2023-11-30T15:42:05.399" v="9" actId="20577"/>
-          <ac:spMkLst>
-            <pc:docMk/>
-            <pc:sldMk cId="1497806272" sldId="256"/>
-            <ac:spMk id="5" creationId="{00000000-0000-0000-0000-000000000000}"/>
-          </ac:spMkLst>
-        </pc:spChg>
-        <pc:extLst>
-          <p:ext xmlns:p="http://schemas.openxmlformats.org/presentationml/2006/main" uri="{D6D511B9-2390-475A-947B-AFAB55BFBCF1}">
-            <pc226:cmChg xmlns:pc226="http://schemas.microsoft.com/office/powerpoint/2022/06/main/command" chg="mod">
-              <pc226:chgData name="Maxwell,Daniel" userId="S::danielmaxwell@ufl.edu::1b6ea79d-60d7-472e-a79a-e3fa9de1dfad" providerId="AD" clId="Web-{338F8242-20CC-BD5C-C11A-0AAB6E9FA4EF}" dt="2023-11-30T15:42:05.399" v="9" actId="20577"/>
-              <pc2:cmMkLst xmlns:pc2="http://schemas.microsoft.com/office/powerpoint/2019/9/main/command">
-                <pc:docMk/>
-                <pc:sldMk cId="1497806272" sldId="256"/>
-                <pc2:cmMk id="{329310D8-0964-4626-8D31-036CD4CD6DB2}"/>
-              </pc2:cmMkLst>
-              <pc226:cmRplyChg chg="add">
-                <pc226:chgData name="Maxwell,Daniel" userId="S::danielmaxwell@ufl.edu::1b6ea79d-60d7-472e-a79a-e3fa9de1dfad" providerId="AD" clId="Web-{338F8242-20CC-BD5C-C11A-0AAB6E9FA4EF}" dt="2023-11-30T15:41:56.665" v="8"/>
-                <pc2:cmRplyMkLst xmlns:pc2="http://schemas.microsoft.com/office/powerpoint/2019/9/main/command">
-                  <pc:docMk/>
-                  <pc:sldMk cId="1497806272" sldId="256"/>
-                  <pc2:cmMk id="{329310D8-0964-4626-8D31-036CD4CD6DB2}"/>
-                  <pc2:cmRplyMk id="{36A94BD6-17CD-4865-AA4B-B5ADDC784817}"/>
-                </pc2:cmRplyMkLst>
-              </pc226:cmRplyChg>
-            </pc226:cmChg>
-          </p:ext>
-        </pc:extLst>
-      </pc:sldChg>
-      <pc:sldChg chg="modSp modCm">
-        <pc:chgData name="Maxwell,Daniel" userId="S::danielmaxwell@ufl.edu::1b6ea79d-60d7-472e-a79a-e3fa9de1dfad" providerId="AD" clId="Web-{338F8242-20CC-BD5C-C11A-0AAB6E9FA4EF}" dt="2023-11-30T15:44:50.310" v="19" actId="20577"/>
-        <pc:sldMkLst>
-          <pc:docMk/>
-          <pc:sldMk cId="662354849" sldId="260"/>
-        </pc:sldMkLst>
-        <pc:spChg chg="mod">
-          <ac:chgData name="Maxwell,Daniel" userId="S::danielmaxwell@ufl.edu::1b6ea79d-60d7-472e-a79a-e3fa9de1dfad" providerId="AD" clId="Web-{338F8242-20CC-BD5C-C11A-0AAB6E9FA4EF}" dt="2023-11-30T15:44:50.310" v="19" actId="20577"/>
-          <ac:spMkLst>
-            <pc:docMk/>
-            <pc:sldMk cId="662354849" sldId="260"/>
-            <ac:spMk id="5" creationId="{00000000-0000-0000-0000-000000000000}"/>
-          </ac:spMkLst>
-        </pc:spChg>
-        <pc:extLst>
-          <p:ext xmlns:p="http://schemas.openxmlformats.org/presentationml/2006/main" uri="{D6D511B9-2390-475A-947B-AFAB55BFBCF1}">
-            <pc226:cmChg xmlns:pc226="http://schemas.microsoft.com/office/powerpoint/2022/06/main/command" chg="">
-              <pc226:chgData name="Maxwell,Daniel" userId="S::danielmaxwell@ufl.edu::1b6ea79d-60d7-472e-a79a-e3fa9de1dfad" providerId="AD" clId="Web-{338F8242-20CC-BD5C-C11A-0AAB6E9FA4EF}" dt="2023-11-30T15:44:45.763" v="18"/>
-              <pc2:cmMkLst xmlns:pc2="http://schemas.microsoft.com/office/powerpoint/2019/9/main/command">
-                <pc:docMk/>
-                <pc:sldMk cId="662354849" sldId="260"/>
-                <pc2:cmMk id="{F0E7D142-9E67-4A1B-B1CA-B53583088BD4}"/>
-              </pc2:cmMkLst>
-              <pc226:cmRplyChg chg="add">
-                <pc226:chgData name="Maxwell,Daniel" userId="S::danielmaxwell@ufl.edu::1b6ea79d-60d7-472e-a79a-e3fa9de1dfad" providerId="AD" clId="Web-{338F8242-20CC-BD5C-C11A-0AAB6E9FA4EF}" dt="2023-11-30T15:44:45.763" v="18"/>
-                <pc2:cmRplyMkLst xmlns:pc2="http://schemas.microsoft.com/office/powerpoint/2019/9/main/command">
-                  <pc:docMk/>
-                  <pc:sldMk cId="662354849" sldId="260"/>
-                  <pc2:cmMk id="{F0E7D142-9E67-4A1B-B1CA-B53583088BD4}"/>
-                  <pc2:cmRplyMk id="{60C0CA22-AFBD-4523-BB43-F7FEE42AA451}"/>
-                </pc2:cmRplyMkLst>
-              </pc226:cmRplyChg>
-            </pc226:cmChg>
-          </p:ext>
-        </pc:extLst>
-      </pc:sldChg>
-    </pc:docChg>
-  </pc:docChgLst>
-  <pc:docChgLst>
-    <pc:chgData name="Gitzendanner, Matt" userId="b4bd9a28-947d-4019-a646-080a1de8474c" providerId="ADAL" clId="{97F31FD1-00C1-4414-A100-D1220899B2F0}"/>
-    <pc:docChg chg="">
-      <pc:chgData name="Gitzendanner, Matt" userId="b4bd9a28-947d-4019-a646-080a1de8474c" providerId="ADAL" clId="{97F31FD1-00C1-4414-A100-D1220899B2F0}" dt="2023-11-30T19:49:28.290" v="3"/>
-      <pc:docMkLst>
-        <pc:docMk/>
-      </pc:docMkLst>
-      <pc:sldChg chg="delCm">
-        <pc:chgData name="Gitzendanner, Matt" userId="b4bd9a28-947d-4019-a646-080a1de8474c" providerId="ADAL" clId="{97F31FD1-00C1-4414-A100-D1220899B2F0}" dt="2023-11-30T19:48:04.519" v="0"/>
-        <pc:sldMkLst>
-          <pc:docMk/>
-          <pc:sldMk cId="1497806272" sldId="256"/>
-        </pc:sldMkLst>
-        <pc:extLst>
-          <p:ext xmlns:p="http://schemas.openxmlformats.org/presentationml/2006/main" uri="{D6D511B9-2390-475A-947B-AFAB55BFBCF1}">
-            <pc226:cmChg xmlns:pc226="http://schemas.microsoft.com/office/powerpoint/2022/06/main/command" chg="del">
-              <pc226:chgData name="Gitzendanner, Matt" userId="b4bd9a28-947d-4019-a646-080a1de8474c" providerId="ADAL" clId="{97F31FD1-00C1-4414-A100-D1220899B2F0}" dt="2023-11-30T19:48:04.519" v="0"/>
-              <pc2:cmMkLst xmlns:pc2="http://schemas.microsoft.com/office/powerpoint/2019/9/main/command">
-                <pc:docMk/>
-                <pc:sldMk cId="1497806272" sldId="256"/>
-                <pc2:cmMk id="{329310D8-0964-4626-8D31-036CD4CD6DB2}"/>
-              </pc2:cmMkLst>
-            </pc226:cmChg>
-          </p:ext>
-        </pc:extLst>
-      </pc:sldChg>
-      <pc:sldChg chg="delCm">
-        <pc:chgData name="Gitzendanner, Matt" userId="b4bd9a28-947d-4019-a646-080a1de8474c" providerId="ADAL" clId="{97F31FD1-00C1-4414-A100-D1220899B2F0}" dt="2023-11-30T19:48:27.549" v="1"/>
-        <pc:sldMkLst>
-          <pc:docMk/>
-          <pc:sldMk cId="662354849" sldId="260"/>
-        </pc:sldMkLst>
-        <pc:extLst>
-          <p:ext xmlns:p="http://schemas.openxmlformats.org/presentationml/2006/main" uri="{D6D511B9-2390-475A-947B-AFAB55BFBCF1}">
-            <pc226:cmChg xmlns:pc226="http://schemas.microsoft.com/office/powerpoint/2022/06/main/command" chg="del">
-              <pc226:chgData name="Gitzendanner, Matt" userId="b4bd9a28-947d-4019-a646-080a1de8474c" providerId="ADAL" clId="{97F31FD1-00C1-4414-A100-D1220899B2F0}" dt="2023-11-30T19:48:27.549" v="1"/>
-              <pc2:cmMkLst xmlns:pc2="http://schemas.microsoft.com/office/powerpoint/2019/9/main/command">
-                <pc:docMk/>
-                <pc:sldMk cId="662354849" sldId="260"/>
-                <pc2:cmMk id="{F0E7D142-9E67-4A1B-B1CA-B53583088BD4}"/>
-              </pc2:cmMkLst>
-            </pc226:cmChg>
-          </p:ext>
-        </pc:extLst>
-      </pc:sldChg>
-      <pc:sldChg chg="delCm modCm">
-        <pc:chgData name="Gitzendanner, Matt" userId="b4bd9a28-947d-4019-a646-080a1de8474c" providerId="ADAL" clId="{97F31FD1-00C1-4414-A100-D1220899B2F0}" dt="2023-11-30T19:49:28.290" v="3"/>
-        <pc:sldMkLst>
-          <pc:docMk/>
-          <pc:sldMk cId="4083169647" sldId="280"/>
-        </pc:sldMkLst>
-        <pc:extLst>
-          <p:ext xmlns:p="http://schemas.openxmlformats.org/presentationml/2006/main" uri="{D6D511B9-2390-475A-947B-AFAB55BFBCF1}">
-            <pc226:cmChg xmlns:pc226="http://schemas.microsoft.com/office/powerpoint/2022/06/main/command" chg="del mod modRxn">
-              <pc226:chgData name="Gitzendanner, Matt" userId="b4bd9a28-947d-4019-a646-080a1de8474c" providerId="ADAL" clId="{97F31FD1-00C1-4414-A100-D1220899B2F0}" dt="2023-11-30T19:49:28.290" v="3"/>
-              <pc2:cmMkLst xmlns:pc2="http://schemas.microsoft.com/office/powerpoint/2019/9/main/command">
-                <pc:docMk/>
-                <pc:sldMk cId="4083169647" sldId="280"/>
-                <pc2:cmMk id="{5F15D6F7-5430-4AC9-BBFC-8F52A8F0598E}"/>
-              </pc2:cmMkLst>
-            </pc226:cmChg>
-          </p:ext>
-        </pc:extLst>
-      </pc:sldChg>
-    </pc:docChg>
-  </pc:docChgLst>
-  <pc:docChgLst>
-    <pc:chgData name="Maxwell,Daniel" userId="1b6ea79d-60d7-472e-a79a-e3fa9de1dfad" providerId="ADAL" clId="{07A6B61E-C1A0-4DFF-BA1D-AC60A3FD0371}"/>
-    <pc:docChg chg="custSel addSld modSld sldOrd">
-      <pc:chgData name="Maxwell,Daniel" userId="1b6ea79d-60d7-472e-a79a-e3fa9de1dfad" providerId="ADAL" clId="{07A6B61E-C1A0-4DFF-BA1D-AC60A3FD0371}" dt="2023-11-30T16:13:34.947" v="333"/>
-      <pc:docMkLst>
-        <pc:docMk/>
-      </pc:docMkLst>
-      <pc:sldChg chg="addSp modSp mod ord modCm">
-        <pc:chgData name="Maxwell,Daniel" userId="1b6ea79d-60d7-472e-a79a-e3fa9de1dfad" providerId="ADAL" clId="{07A6B61E-C1A0-4DFF-BA1D-AC60A3FD0371}" dt="2023-11-30T15:54:01.790" v="17" actId="207"/>
-        <pc:sldMkLst>
-          <pc:docMk/>
-          <pc:sldMk cId="2288319049" sldId="271"/>
-        </pc:sldMkLst>
-        <pc:spChg chg="add mod">
-          <ac:chgData name="Maxwell,Daniel" userId="1b6ea79d-60d7-472e-a79a-e3fa9de1dfad" providerId="ADAL" clId="{07A6B61E-C1A0-4DFF-BA1D-AC60A3FD0371}" dt="2023-11-30T15:54:01.790" v="17" actId="207"/>
-          <ac:spMkLst>
-            <pc:docMk/>
-            <pc:sldMk cId="2288319049" sldId="271"/>
-            <ac:spMk id="5" creationId="{E2E80E2E-17C6-5C5F-46CF-95BD82F6E2D3}"/>
-          </ac:spMkLst>
-        </pc:spChg>
-        <pc:extLst>
-          <p:ext xmlns:p="http://schemas.openxmlformats.org/presentationml/2006/main" uri="{D6D511B9-2390-475A-947B-AFAB55BFBCF1}">
-            <pc226:cmChg xmlns:pc226="http://schemas.microsoft.com/office/powerpoint/2022/06/main/command" chg="">
-              <pc226:chgData name="Maxwell,Daniel" userId="1b6ea79d-60d7-472e-a79a-e3fa9de1dfad" providerId="ADAL" clId="{07A6B61E-C1A0-4DFF-BA1D-AC60A3FD0371}" dt="2023-11-30T15:53:12.287" v="3"/>
-              <pc2:cmMkLst xmlns:pc2="http://schemas.microsoft.com/office/powerpoint/2019/9/main/command">
-                <pc:docMk/>
-                <pc:sldMk cId="2288319049" sldId="271"/>
-                <pc2:cmMk id="{E6BDAA77-A739-405A-B6BB-B3A25F33140A}"/>
-              </pc2:cmMkLst>
-              <pc226:cmRplyChg chg="add">
-                <pc226:chgData name="Maxwell,Daniel" userId="1b6ea79d-60d7-472e-a79a-e3fa9de1dfad" providerId="ADAL" clId="{07A6B61E-C1A0-4DFF-BA1D-AC60A3FD0371}" dt="2023-11-30T15:53:12.287" v="3"/>
-                <pc2:cmRplyMkLst xmlns:pc2="http://schemas.microsoft.com/office/powerpoint/2019/9/main/command">
-                  <pc:docMk/>
-                  <pc:sldMk cId="2288319049" sldId="271"/>
-                  <pc2:cmMk id="{E6BDAA77-A739-405A-B6BB-B3A25F33140A}"/>
-                  <pc2:cmRplyMk id="{DCE30F5A-8568-4A3C-8D4F-CAC1D5150671}"/>
-                </pc2:cmRplyMkLst>
-              </pc226:cmRplyChg>
-            </pc226:cmChg>
-          </p:ext>
-        </pc:extLst>
-      </pc:sldChg>
-      <pc:sldChg chg="modSp modAnim modCm modNotesTx">
-        <pc:chgData name="Maxwell,Daniel" userId="1b6ea79d-60d7-472e-a79a-e3fa9de1dfad" providerId="ADAL" clId="{07A6B61E-C1A0-4DFF-BA1D-AC60A3FD0371}" dt="2023-11-30T16:13:34.947" v="333"/>
-        <pc:sldMkLst>
-          <pc:docMk/>
-          <pc:sldMk cId="1958738313" sldId="273"/>
-        </pc:sldMkLst>
-        <pc:spChg chg="mod">
-          <ac:chgData name="Maxwell,Daniel" userId="1b6ea79d-60d7-472e-a79a-e3fa9de1dfad" providerId="ADAL" clId="{07A6B61E-C1A0-4DFF-BA1D-AC60A3FD0371}" dt="2023-11-30T16:12:38.021" v="330" actId="20577"/>
-          <ac:spMkLst>
-            <pc:docMk/>
-            <pc:sldMk cId="1958738313" sldId="273"/>
-            <ac:spMk id="3" creationId="{1E86C963-755D-4715-8118-D4601D47AAD3}"/>
-          </ac:spMkLst>
-        </pc:spChg>
-        <pc:extLst>
-          <p:ext xmlns:p="http://schemas.openxmlformats.org/presentationml/2006/main" uri="{D6D511B9-2390-475A-947B-AFAB55BFBCF1}">
-            <pc226:cmChg xmlns:pc226="http://schemas.microsoft.com/office/powerpoint/2022/06/main/command" chg="">
-              <pc226:chgData name="Maxwell,Daniel" userId="1b6ea79d-60d7-472e-a79a-e3fa9de1dfad" providerId="ADAL" clId="{07A6B61E-C1A0-4DFF-BA1D-AC60A3FD0371}" dt="2023-11-30T16:13:34.947" v="333"/>
-              <pc2:cmMkLst xmlns:pc2="http://schemas.microsoft.com/office/powerpoint/2019/9/main/command">
-                <pc:docMk/>
-                <pc:sldMk cId="1958738313" sldId="273"/>
-                <pc2:cmMk id="{279D8E60-1B1E-4A01-A3C3-6A6B0DC1111B}"/>
-              </pc2:cmMkLst>
-              <pc226:cmRplyChg chg="add mod">
-                <pc226:chgData name="Maxwell,Daniel" userId="1b6ea79d-60d7-472e-a79a-e3fa9de1dfad" providerId="ADAL" clId="{07A6B61E-C1A0-4DFF-BA1D-AC60A3FD0371}" dt="2023-11-30T16:13:34.947" v="333"/>
-                <pc2:cmRplyMkLst xmlns:pc2="http://schemas.microsoft.com/office/powerpoint/2019/9/main/command">
-                  <pc:docMk/>
-                  <pc:sldMk cId="1958738313" sldId="273"/>
-                  <pc2:cmMk id="{279D8E60-1B1E-4A01-A3C3-6A6B0DC1111B}"/>
-                  <pc2:cmRplyMk id="{0B6C524A-4666-4B12-BDBF-84AD15C84700}"/>
-                </pc2:cmRplyMkLst>
-              </pc226:cmRplyChg>
-            </pc226:cmChg>
-          </p:ext>
-        </pc:extLst>
-      </pc:sldChg>
-      <pc:sldChg chg="addSp delSp modSp mod modCm modNotesTx">
-        <pc:chgData name="Maxwell,Daniel" userId="1b6ea79d-60d7-472e-a79a-e3fa9de1dfad" providerId="ADAL" clId="{07A6B61E-C1A0-4DFF-BA1D-AC60A3FD0371}" dt="2023-11-30T16:06:33.943" v="327" actId="20577"/>
-        <pc:sldMkLst>
-          <pc:docMk/>
-          <pc:sldMk cId="4083169647" sldId="280"/>
-        </pc:sldMkLst>
-        <pc:spChg chg="add del">
-          <ac:chgData name="Maxwell,Daniel" userId="1b6ea79d-60d7-472e-a79a-e3fa9de1dfad" providerId="ADAL" clId="{07A6B61E-C1A0-4DFF-BA1D-AC60A3FD0371}" dt="2023-11-30T15:57:00.704" v="23" actId="478"/>
-          <ac:spMkLst>
-            <pc:docMk/>
-            <pc:sldMk cId="4083169647" sldId="280"/>
-            <ac:spMk id="4" creationId="{F2CD9A60-39C9-50E1-1BF6-314C91715334}"/>
-          </ac:spMkLst>
-        </pc:spChg>
-        <pc:spChg chg="add del">
-          <ac:chgData name="Maxwell,Daniel" userId="1b6ea79d-60d7-472e-a79a-e3fa9de1dfad" providerId="ADAL" clId="{07A6B61E-C1A0-4DFF-BA1D-AC60A3FD0371}" dt="2023-11-30T15:57:39.520" v="25" actId="478"/>
-          <ac:spMkLst>
-            <pc:docMk/>
-            <pc:sldMk cId="4083169647" sldId="280"/>
-            <ac:spMk id="5" creationId="{FE640065-B982-6D8F-531E-14BED0FBECD8}"/>
-          </ac:spMkLst>
-        </pc:spChg>
-        <pc:spChg chg="mod">
-          <ac:chgData name="Maxwell,Daniel" userId="1b6ea79d-60d7-472e-a79a-e3fa9de1dfad" providerId="ADAL" clId="{07A6B61E-C1A0-4DFF-BA1D-AC60A3FD0371}" dt="2023-11-30T16:04:39.878" v="160" actId="20577"/>
-          <ac:spMkLst>
-            <pc:docMk/>
-            <pc:sldMk cId="4083169647" sldId="280"/>
-            <ac:spMk id="11" creationId="{D139B772-0676-4CFA-8DC1-30205C5EF85F}"/>
-          </ac:spMkLst>
-        </pc:spChg>
-        <pc:picChg chg="add del">
-          <ac:chgData name="Maxwell,Daniel" userId="1b6ea79d-60d7-472e-a79a-e3fa9de1dfad" providerId="ADAL" clId="{07A6B61E-C1A0-4DFF-BA1D-AC60A3FD0371}" dt="2023-11-30T16:00:49.419" v="27" actId="478"/>
-          <ac:picMkLst>
-            <pc:docMk/>
-            <pc:sldMk cId="4083169647" sldId="280"/>
-            <ac:picMk id="7" creationId="{5AEED4D5-7125-D5A2-7A51-97090C652BD4}"/>
-          </ac:picMkLst>
-        </pc:picChg>
-        <pc:picChg chg="del mod">
-          <ac:chgData name="Maxwell,Daniel" userId="1b6ea79d-60d7-472e-a79a-e3fa9de1dfad" providerId="ADAL" clId="{07A6B61E-C1A0-4DFF-BA1D-AC60A3FD0371}" dt="2023-11-30T15:56:50.083" v="20" actId="478"/>
-          <ac:picMkLst>
-            <pc:docMk/>
-            <pc:sldMk cId="4083169647" sldId="280"/>
-            <ac:picMk id="8" creationId="{40E51E7D-A4F8-47A3-953B-E63CEA5AA233}"/>
-          </ac:picMkLst>
-        </pc:picChg>
-        <pc:picChg chg="add">
-          <ac:chgData name="Maxwell,Daniel" userId="1b6ea79d-60d7-472e-a79a-e3fa9de1dfad" providerId="ADAL" clId="{07A6B61E-C1A0-4DFF-BA1D-AC60A3FD0371}" dt="2023-11-30T16:00:52.240" v="28"/>
-          <ac:picMkLst>
-            <pc:docMk/>
-            <pc:sldMk cId="4083169647" sldId="280"/>
-            <ac:picMk id="1030" creationId="{BF0429D3-C239-9943-FFF1-53DBD8570023}"/>
-          </ac:picMkLst>
-        </pc:picChg>
-        <pc:picChg chg="del">
-          <ac:chgData name="Maxwell,Daniel" userId="1b6ea79d-60d7-472e-a79a-e3fa9de1dfad" providerId="ADAL" clId="{07A6B61E-C1A0-4DFF-BA1D-AC60A3FD0371}" dt="2023-11-30T15:56:53.091" v="22" actId="478"/>
-          <ac:picMkLst>
-            <pc:docMk/>
-            <pc:sldMk cId="4083169647" sldId="280"/>
-            <ac:picMk id="2050" creationId="{A8A604AE-38F9-4BA8-858C-E33429DF7680}"/>
-          </ac:picMkLst>
-        </pc:picChg>
-        <pc:extLst>
-          <p:ext xmlns:p="http://schemas.openxmlformats.org/presentationml/2006/main" uri="{D6D511B9-2390-475A-947B-AFAB55BFBCF1}">
-            <pc226:cmChg xmlns:pc226="http://schemas.microsoft.com/office/powerpoint/2022/06/main/command" chg="mod">
-              <pc226:chgData name="Maxwell,Daniel" userId="1b6ea79d-60d7-472e-a79a-e3fa9de1dfad" providerId="ADAL" clId="{07A6B61E-C1A0-4DFF-BA1D-AC60A3FD0371}" dt="2023-11-30T16:06:12.841" v="319"/>
-              <pc2:cmMkLst xmlns:pc2="http://schemas.microsoft.com/office/powerpoint/2019/9/main/command">
-                <pc:docMk/>
-                <pc:sldMk cId="4083169647" sldId="280"/>
-                <pc2:cmMk id="{5F15D6F7-5430-4AC9-BBFC-8F52A8F0598E}"/>
-              </pc2:cmMkLst>
-              <pc226:cmRplyChg chg="add mod">
-                <pc226:chgData name="Maxwell,Daniel" userId="1b6ea79d-60d7-472e-a79a-e3fa9de1dfad" providerId="ADAL" clId="{07A6B61E-C1A0-4DFF-BA1D-AC60A3FD0371}" dt="2023-11-30T16:06:12.841" v="319"/>
-                <pc2:cmRplyMkLst xmlns:pc2="http://schemas.microsoft.com/office/powerpoint/2019/9/main/command">
-                  <pc:docMk/>
-                  <pc:sldMk cId="4083169647" sldId="280"/>
-                  <pc2:cmMk id="{5F15D6F7-5430-4AC9-BBFC-8F52A8F0598E}"/>
-                  <pc2:cmRplyMk id="{A4FC82C3-2706-46AC-B467-9E87A89C8272}"/>
-                </pc2:cmRplyMkLst>
-              </pc226:cmRplyChg>
-            </pc226:cmChg>
-          </p:ext>
-        </pc:extLst>
-      </pc:sldChg>
-      <pc:sldChg chg="new">
-        <pc:chgData name="Maxwell,Daniel" userId="1b6ea79d-60d7-472e-a79a-e3fa9de1dfad" providerId="ADAL" clId="{07A6B61E-C1A0-4DFF-BA1D-AC60A3FD0371}" dt="2023-11-30T15:52:19.945" v="2" actId="680"/>
-        <pc:sldMkLst>
-          <pc:docMk/>
-          <pc:sldMk cId="4273893588" sldId="345"/>
-        </pc:sldMkLst>
-      </pc:sldChg>
-    </pc:docChg>
-  </pc:docChgLst>
-  <pc:docChgLst>
-    <pc:chgData name="Maxwell,Daniel" userId="1b6ea79d-60d7-472e-a79a-e3fa9de1dfad" providerId="ADAL" clId="{51126302-8A74-4563-B6B1-51EE16078136}"/>
-    <pc:docChg chg="modSld">
-      <pc:chgData name="Maxwell,Daniel" userId="1b6ea79d-60d7-472e-a79a-e3fa9de1dfad" providerId="ADAL" clId="{51126302-8A74-4563-B6B1-51EE16078136}" dt="2023-07-05T17:29:00.297" v="33"/>
-      <pc:docMkLst>
-        <pc:docMk/>
-      </pc:docMkLst>
-      <pc:sldChg chg="delSp modTransition modAnim">
-        <pc:chgData name="Maxwell,Daniel" userId="1b6ea79d-60d7-472e-a79a-e3fa9de1dfad" providerId="ADAL" clId="{51126302-8A74-4563-B6B1-51EE16078136}" dt="2023-07-05T17:29:00.297" v="33"/>
-        <pc:sldMkLst>
-          <pc:docMk/>
-          <pc:sldMk cId="1497806272" sldId="256"/>
-        </pc:sldMkLst>
-        <pc:picChg chg="del">
-          <ac:chgData name="Maxwell,Daniel" userId="1b6ea79d-60d7-472e-a79a-e3fa9de1dfad" providerId="ADAL" clId="{51126302-8A74-4563-B6B1-51EE16078136}" dt="2023-07-05T17:29:00.297" v="33"/>
-          <ac:picMkLst>
-            <pc:docMk/>
-            <pc:sldMk cId="1497806272" sldId="256"/>
-            <ac:picMk id="12" creationId="{9A25D629-32DD-4FFC-D579-1AFAAF3CAC74}"/>
-          </ac:picMkLst>
-        </pc:picChg>
-      </pc:sldChg>
-      <pc:sldChg chg="delSp modTransition modAnim">
-        <pc:chgData name="Maxwell,Daniel" userId="1b6ea79d-60d7-472e-a79a-e3fa9de1dfad" providerId="ADAL" clId="{51126302-8A74-4563-B6B1-51EE16078136}" dt="2023-07-05T17:29:00.297" v="33"/>
-        <pc:sldMkLst>
-          <pc:docMk/>
-          <pc:sldMk cId="829960364" sldId="258"/>
-        </pc:sldMkLst>
-        <pc:picChg chg="del">
-          <ac:chgData name="Maxwell,Daniel" userId="1b6ea79d-60d7-472e-a79a-e3fa9de1dfad" providerId="ADAL" clId="{51126302-8A74-4563-B6B1-51EE16078136}" dt="2023-07-05T17:29:00.297" v="33"/>
-          <ac:picMkLst>
-            <pc:docMk/>
-            <pc:sldMk cId="829960364" sldId="258"/>
-            <ac:picMk id="10" creationId="{76E5F377-2F1E-1374-1EE7-40BAA745C3A9}"/>
-          </ac:picMkLst>
-        </pc:picChg>
-      </pc:sldChg>
-      <pc:sldChg chg="delSp modTransition modAnim">
-        <pc:chgData name="Maxwell,Daniel" userId="1b6ea79d-60d7-472e-a79a-e3fa9de1dfad" providerId="ADAL" clId="{51126302-8A74-4563-B6B1-51EE16078136}" dt="2023-07-05T17:29:00.297" v="33"/>
-        <pc:sldMkLst>
-          <pc:docMk/>
-          <pc:sldMk cId="1201263647" sldId="259"/>
-        </pc:sldMkLst>
-        <pc:picChg chg="del">
-          <ac:chgData name="Maxwell,Daniel" userId="1b6ea79d-60d7-472e-a79a-e3fa9de1dfad" providerId="ADAL" clId="{51126302-8A74-4563-B6B1-51EE16078136}" dt="2023-07-05T17:29:00.297" v="33"/>
-          <ac:picMkLst>
-            <pc:docMk/>
-            <pc:sldMk cId="1201263647" sldId="259"/>
-            <ac:picMk id="7" creationId="{E76C7EF2-1B38-AE6D-EDEB-1FE3CF1CD903}"/>
-          </ac:picMkLst>
-        </pc:picChg>
-      </pc:sldChg>
-      <pc:sldChg chg="delSp modTransition modAnim">
-        <pc:chgData name="Maxwell,Daniel" userId="1b6ea79d-60d7-472e-a79a-e3fa9de1dfad" providerId="ADAL" clId="{51126302-8A74-4563-B6B1-51EE16078136}" dt="2023-07-05T17:29:00.297" v="33"/>
-        <pc:sldMkLst>
-          <pc:docMk/>
-          <pc:sldMk cId="662354849" sldId="260"/>
-        </pc:sldMkLst>
-        <pc:picChg chg="del">
-          <ac:chgData name="Maxwell,Daniel" userId="1b6ea79d-60d7-472e-a79a-e3fa9de1dfad" providerId="ADAL" clId="{51126302-8A74-4563-B6B1-51EE16078136}" dt="2023-07-05T17:29:00.297" v="33"/>
-          <ac:picMkLst>
-            <pc:docMk/>
-            <pc:sldMk cId="662354849" sldId="260"/>
-            <ac:picMk id="11" creationId="{EAF61509-50CC-588E-DC0B-977D27F48D27}"/>
-          </ac:picMkLst>
-        </pc:picChg>
-      </pc:sldChg>
-      <pc:sldChg chg="delSp modTransition modAnim">
-        <pc:chgData name="Maxwell,Daniel" userId="1b6ea79d-60d7-472e-a79a-e3fa9de1dfad" providerId="ADAL" clId="{51126302-8A74-4563-B6B1-51EE16078136}" dt="2023-07-05T17:29:00.297" v="33"/>
-        <pc:sldMkLst>
-          <pc:docMk/>
-          <pc:sldMk cId="2423826693" sldId="262"/>
-        </pc:sldMkLst>
-        <pc:picChg chg="del">
-          <ac:chgData name="Maxwell,Daniel" userId="1b6ea79d-60d7-472e-a79a-e3fa9de1dfad" providerId="ADAL" clId="{51126302-8A74-4563-B6B1-51EE16078136}" dt="2023-07-05T17:29:00.297" v="33"/>
-          <ac:picMkLst>
-            <pc:docMk/>
-            <pc:sldMk cId="2423826693" sldId="262"/>
-            <ac:picMk id="6" creationId="{00A66A14-E946-B801-A8E5-BCFFE5AB640D}"/>
-          </ac:picMkLst>
-        </pc:picChg>
-      </pc:sldChg>
-      <pc:sldChg chg="delSp modTransition modAnim">
-        <pc:chgData name="Maxwell,Daniel" userId="1b6ea79d-60d7-472e-a79a-e3fa9de1dfad" providerId="ADAL" clId="{51126302-8A74-4563-B6B1-51EE16078136}" dt="2023-07-05T17:29:00.297" v="33"/>
-        <pc:sldMkLst>
-          <pc:docMk/>
-          <pc:sldMk cId="496502312" sldId="267"/>
-        </pc:sldMkLst>
-        <pc:picChg chg="del">
-          <ac:chgData name="Maxwell,Daniel" userId="1b6ea79d-60d7-472e-a79a-e3fa9de1dfad" providerId="ADAL" clId="{51126302-8A74-4563-B6B1-51EE16078136}" dt="2023-07-05T17:29:00.297" v="33"/>
-          <ac:picMkLst>
-            <pc:docMk/>
-            <pc:sldMk cId="496502312" sldId="267"/>
-            <ac:picMk id="11" creationId="{FAA5DAB2-BE8F-9536-CAE1-9242B8539E55}"/>
-          </ac:picMkLst>
-        </pc:picChg>
-      </pc:sldChg>
-      <pc:sldChg chg="delSp modTransition modAnim">
-        <pc:chgData name="Maxwell,Daniel" userId="1b6ea79d-60d7-472e-a79a-e3fa9de1dfad" providerId="ADAL" clId="{51126302-8A74-4563-B6B1-51EE16078136}" dt="2023-07-05T17:29:00.297" v="33"/>
-        <pc:sldMkLst>
-          <pc:docMk/>
-          <pc:sldMk cId="4157323454" sldId="270"/>
-        </pc:sldMkLst>
-        <pc:picChg chg="del">
-          <ac:chgData name="Maxwell,Daniel" userId="1b6ea79d-60d7-472e-a79a-e3fa9de1dfad" providerId="ADAL" clId="{51126302-8A74-4563-B6B1-51EE16078136}" dt="2023-07-05T17:29:00.297" v="33"/>
-          <ac:picMkLst>
-            <pc:docMk/>
-            <pc:sldMk cId="4157323454" sldId="270"/>
-            <ac:picMk id="12" creationId="{C813CC4C-8536-436A-0D20-D54D59691C14}"/>
-          </ac:picMkLst>
-        </pc:picChg>
-      </pc:sldChg>
-      <pc:sldChg chg="delSp modTransition modAnim">
-        <pc:chgData name="Maxwell,Daniel" userId="1b6ea79d-60d7-472e-a79a-e3fa9de1dfad" providerId="ADAL" clId="{51126302-8A74-4563-B6B1-51EE16078136}" dt="2023-07-05T17:29:00.297" v="33"/>
-        <pc:sldMkLst>
-          <pc:docMk/>
-          <pc:sldMk cId="2288319049" sldId="271"/>
-        </pc:sldMkLst>
-        <pc:picChg chg="del">
-          <ac:chgData name="Maxwell,Daniel" userId="1b6ea79d-60d7-472e-a79a-e3fa9de1dfad" providerId="ADAL" clId="{51126302-8A74-4563-B6B1-51EE16078136}" dt="2023-07-05T17:29:00.297" v="33"/>
-          <ac:picMkLst>
-            <pc:docMk/>
-            <pc:sldMk cId="2288319049" sldId="271"/>
-            <ac:picMk id="9" creationId="{E1BB8828-B707-AC11-AEEF-A48D6FF719AE}"/>
-          </ac:picMkLst>
-        </pc:picChg>
-      </pc:sldChg>
-      <pc:sldChg chg="delSp modTransition modAnim">
-        <pc:chgData name="Maxwell,Daniel" userId="1b6ea79d-60d7-472e-a79a-e3fa9de1dfad" providerId="ADAL" clId="{51126302-8A74-4563-B6B1-51EE16078136}" dt="2023-07-05T17:29:00.297" v="33"/>
-        <pc:sldMkLst>
-          <pc:docMk/>
-          <pc:sldMk cId="1958738313" sldId="273"/>
-        </pc:sldMkLst>
-        <pc:picChg chg="del">
-          <ac:chgData name="Maxwell,Daniel" userId="1b6ea79d-60d7-472e-a79a-e3fa9de1dfad" providerId="ADAL" clId="{51126302-8A74-4563-B6B1-51EE16078136}" dt="2023-07-05T17:29:00.297" v="33"/>
-          <ac:picMkLst>
-            <pc:docMk/>
-            <pc:sldMk cId="1958738313" sldId="273"/>
-            <ac:picMk id="6" creationId="{7F870087-1355-5BC9-64EB-391830D7E4E6}"/>
-          </ac:picMkLst>
-        </pc:picChg>
-      </pc:sldChg>
-      <pc:sldChg chg="delSp modTransition modAnim">
-        <pc:chgData name="Maxwell,Daniel" userId="1b6ea79d-60d7-472e-a79a-e3fa9de1dfad" providerId="ADAL" clId="{51126302-8A74-4563-B6B1-51EE16078136}" dt="2023-07-05T17:29:00.297" v="33"/>
-        <pc:sldMkLst>
-          <pc:docMk/>
-          <pc:sldMk cId="170311557" sldId="277"/>
-        </pc:sldMkLst>
-        <pc:picChg chg="del">
-          <ac:chgData name="Maxwell,Daniel" userId="1b6ea79d-60d7-472e-a79a-e3fa9de1dfad" providerId="ADAL" clId="{51126302-8A74-4563-B6B1-51EE16078136}" dt="2023-07-05T17:29:00.297" v="33"/>
-          <ac:picMkLst>
-            <pc:docMk/>
-            <pc:sldMk cId="170311557" sldId="277"/>
-            <ac:picMk id="65" creationId="{9C8B7285-1FBE-82F2-7D07-9D6CF3ACAB73}"/>
-          </ac:picMkLst>
-        </pc:picChg>
-      </pc:sldChg>
-      <pc:sldChg chg="delSp modTransition modAnim">
-        <pc:chgData name="Maxwell,Daniel" userId="1b6ea79d-60d7-472e-a79a-e3fa9de1dfad" providerId="ADAL" clId="{51126302-8A74-4563-B6B1-51EE16078136}" dt="2023-07-05T17:29:00.297" v="33"/>
-        <pc:sldMkLst>
-          <pc:docMk/>
-          <pc:sldMk cId="4083169647" sldId="280"/>
-        </pc:sldMkLst>
-        <pc:picChg chg="del">
-          <ac:chgData name="Maxwell,Daniel" userId="1b6ea79d-60d7-472e-a79a-e3fa9de1dfad" providerId="ADAL" clId="{51126302-8A74-4563-B6B1-51EE16078136}" dt="2023-07-05T17:29:00.297" v="33"/>
-          <ac:picMkLst>
-            <pc:docMk/>
-            <pc:sldMk cId="4083169647" sldId="280"/>
-            <ac:picMk id="7" creationId="{9DEAF864-137B-5269-88CF-2F3F7F381ABE}"/>
-          </ac:picMkLst>
-        </pc:picChg>
-      </pc:sldChg>
-      <pc:sldChg chg="delSp modTransition modAnim">
-        <pc:chgData name="Maxwell,Daniel" userId="1b6ea79d-60d7-472e-a79a-e3fa9de1dfad" providerId="ADAL" clId="{51126302-8A74-4563-B6B1-51EE16078136}" dt="2023-07-05T17:29:00.297" v="33"/>
-        <pc:sldMkLst>
-          <pc:docMk/>
-          <pc:sldMk cId="337556145" sldId="282"/>
-        </pc:sldMkLst>
-        <pc:picChg chg="del">
-          <ac:chgData name="Maxwell,Daniel" userId="1b6ea79d-60d7-472e-a79a-e3fa9de1dfad" providerId="ADAL" clId="{51126302-8A74-4563-B6B1-51EE16078136}" dt="2023-07-05T17:29:00.297" v="33"/>
-          <ac:picMkLst>
-            <pc:docMk/>
-            <pc:sldMk cId="337556145" sldId="282"/>
-            <ac:picMk id="4" creationId="{85FCFAC6-A532-3303-BF9F-6ADBD55FF23E}"/>
-          </ac:picMkLst>
-        </pc:picChg>
-      </pc:sldChg>
-      <pc:sldChg chg="delSp modTransition modAnim">
-        <pc:chgData name="Maxwell,Daniel" userId="1b6ea79d-60d7-472e-a79a-e3fa9de1dfad" providerId="ADAL" clId="{51126302-8A74-4563-B6B1-51EE16078136}" dt="2023-07-05T17:29:00.297" v="33"/>
-        <pc:sldMkLst>
-          <pc:docMk/>
-          <pc:sldMk cId="2815250072" sldId="287"/>
-        </pc:sldMkLst>
-        <pc:picChg chg="del">
-          <ac:chgData name="Maxwell,Daniel" userId="1b6ea79d-60d7-472e-a79a-e3fa9de1dfad" providerId="ADAL" clId="{51126302-8A74-4563-B6B1-51EE16078136}" dt="2023-07-05T17:29:00.297" v="33"/>
-          <ac:picMkLst>
-            <pc:docMk/>
-            <pc:sldMk cId="2815250072" sldId="287"/>
-            <ac:picMk id="7" creationId="{DD9F4BE1-7FB4-55F4-AD59-D5FDBD2FF2B9}"/>
-          </ac:picMkLst>
-        </pc:picChg>
-      </pc:sldChg>
-      <pc:sldChg chg="delSp modTransition modAnim">
-        <pc:chgData name="Maxwell,Daniel" userId="1b6ea79d-60d7-472e-a79a-e3fa9de1dfad" providerId="ADAL" clId="{51126302-8A74-4563-B6B1-51EE16078136}" dt="2023-07-05T17:29:00.297" v="33"/>
-        <pc:sldMkLst>
-          <pc:docMk/>
-          <pc:sldMk cId="3192052037" sldId="293"/>
-        </pc:sldMkLst>
-        <pc:picChg chg="del">
-          <ac:chgData name="Maxwell,Daniel" userId="1b6ea79d-60d7-472e-a79a-e3fa9de1dfad" providerId="ADAL" clId="{51126302-8A74-4563-B6B1-51EE16078136}" dt="2023-07-05T17:29:00.297" v="33"/>
-          <ac:picMkLst>
-            <pc:docMk/>
-            <pc:sldMk cId="3192052037" sldId="293"/>
-            <ac:picMk id="8" creationId="{3646C95C-4F3A-453B-750E-44A9F00E5D12}"/>
-          </ac:picMkLst>
-        </pc:picChg>
-      </pc:sldChg>
-      <pc:sldChg chg="delSp modTransition modAnim">
-        <pc:chgData name="Maxwell,Daniel" userId="1b6ea79d-60d7-472e-a79a-e3fa9de1dfad" providerId="ADAL" clId="{51126302-8A74-4563-B6B1-51EE16078136}" dt="2023-07-05T17:29:00.297" v="33"/>
-        <pc:sldMkLst>
-          <pc:docMk/>
-          <pc:sldMk cId="1132462549" sldId="296"/>
-        </pc:sldMkLst>
-        <pc:picChg chg="del">
-          <ac:chgData name="Maxwell,Daniel" userId="1b6ea79d-60d7-472e-a79a-e3fa9de1dfad" providerId="ADAL" clId="{51126302-8A74-4563-B6B1-51EE16078136}" dt="2023-07-05T17:29:00.297" v="33"/>
-          <ac:picMkLst>
-            <pc:docMk/>
-            <pc:sldMk cId="1132462549" sldId="296"/>
-            <ac:picMk id="17" creationId="{D281C9DC-498C-06FC-70CB-8101BB6F393D}"/>
-          </ac:picMkLst>
-        </pc:picChg>
-      </pc:sldChg>
-      <pc:sldChg chg="delSp modSp mod modTransition modAnim">
-        <pc:chgData name="Maxwell,Daniel" userId="1b6ea79d-60d7-472e-a79a-e3fa9de1dfad" providerId="ADAL" clId="{51126302-8A74-4563-B6B1-51EE16078136}" dt="2023-07-05T17:29:00.297" v="33"/>
-        <pc:sldMkLst>
-          <pc:docMk/>
-          <pc:sldMk cId="4206352663" sldId="329"/>
-        </pc:sldMkLst>
-        <pc:spChg chg="mod">
-          <ac:chgData name="Maxwell,Daniel" userId="1b6ea79d-60d7-472e-a79a-e3fa9de1dfad" providerId="ADAL" clId="{51126302-8A74-4563-B6B1-51EE16078136}" dt="2023-07-05T17:28:19.454" v="32" actId="6549"/>
-          <ac:spMkLst>
-            <pc:docMk/>
-            <pc:sldMk cId="4206352663" sldId="329"/>
-            <ac:spMk id="3" creationId="{098BC2D2-CCF7-4C63-8489-B46BF394FCA2}"/>
-          </ac:spMkLst>
-        </pc:spChg>
-        <pc:picChg chg="del">
-          <ac:chgData name="Maxwell,Daniel" userId="1b6ea79d-60d7-472e-a79a-e3fa9de1dfad" providerId="ADAL" clId="{51126302-8A74-4563-B6B1-51EE16078136}" dt="2023-07-05T17:29:00.297" v="33"/>
-          <ac:picMkLst>
-            <pc:docMk/>
-            <pc:sldMk cId="4206352663" sldId="329"/>
-            <ac:picMk id="7" creationId="{218651F8-4116-1E26-6B30-3D354FBDF1C2}"/>
-          </ac:picMkLst>
-        </pc:picChg>
-      </pc:sldChg>
-      <pc:sldChg chg="delSp modTransition modAnim">
-        <pc:chgData name="Maxwell,Daniel" userId="1b6ea79d-60d7-472e-a79a-e3fa9de1dfad" providerId="ADAL" clId="{51126302-8A74-4563-B6B1-51EE16078136}" dt="2023-07-05T17:29:00.297" v="33"/>
-        <pc:sldMkLst>
-          <pc:docMk/>
-          <pc:sldMk cId="3789637587" sldId="330"/>
-        </pc:sldMkLst>
-        <pc:picChg chg="del">
-          <ac:chgData name="Maxwell,Daniel" userId="1b6ea79d-60d7-472e-a79a-e3fa9de1dfad" providerId="ADAL" clId="{51126302-8A74-4563-B6B1-51EE16078136}" dt="2023-07-05T17:29:00.297" v="33"/>
-          <ac:picMkLst>
-            <pc:docMk/>
-            <pc:sldMk cId="3789637587" sldId="330"/>
-            <ac:picMk id="3" creationId="{E142FED4-0F84-B36F-F801-0EC65C51D26E}"/>
-          </ac:picMkLst>
-        </pc:picChg>
-      </pc:sldChg>
-      <pc:sldChg chg="delSp modTransition modAnim">
-        <pc:chgData name="Maxwell,Daniel" userId="1b6ea79d-60d7-472e-a79a-e3fa9de1dfad" providerId="ADAL" clId="{51126302-8A74-4563-B6B1-51EE16078136}" dt="2023-07-05T17:29:00.297" v="33"/>
-        <pc:sldMkLst>
-          <pc:docMk/>
-          <pc:sldMk cId="3979248159" sldId="331"/>
-        </pc:sldMkLst>
-        <pc:picChg chg="del">
-          <ac:chgData name="Maxwell,Daniel" userId="1b6ea79d-60d7-472e-a79a-e3fa9de1dfad" providerId="ADAL" clId="{51126302-8A74-4563-B6B1-51EE16078136}" dt="2023-07-05T17:29:00.297" v="33"/>
-          <ac:picMkLst>
-            <pc:docMk/>
-            <pc:sldMk cId="3979248159" sldId="331"/>
-            <ac:picMk id="3" creationId="{080DBE7A-59D9-F032-BD87-7D163A781D77}"/>
-          </ac:picMkLst>
-        </pc:picChg>
-      </pc:sldChg>
-      <pc:sldChg chg="delSp modTransition modAnim">
-        <pc:chgData name="Maxwell,Daniel" userId="1b6ea79d-60d7-472e-a79a-e3fa9de1dfad" providerId="ADAL" clId="{51126302-8A74-4563-B6B1-51EE16078136}" dt="2023-07-05T17:29:00.297" v="33"/>
-        <pc:sldMkLst>
-          <pc:docMk/>
-          <pc:sldMk cId="2967570048" sldId="332"/>
-        </pc:sldMkLst>
-        <pc:picChg chg="del">
-          <ac:chgData name="Maxwell,Daniel" userId="1b6ea79d-60d7-472e-a79a-e3fa9de1dfad" providerId="ADAL" clId="{51126302-8A74-4563-B6B1-51EE16078136}" dt="2023-07-05T17:29:00.297" v="33"/>
-          <ac:picMkLst>
-            <pc:docMk/>
-            <pc:sldMk cId="2967570048" sldId="332"/>
-            <ac:picMk id="7" creationId="{77C85524-D007-F051-248A-07D58F020852}"/>
-          </ac:picMkLst>
-        </pc:picChg>
-      </pc:sldChg>
-      <pc:sldChg chg="delSp modTransition modAnim">
-        <pc:chgData name="Maxwell,Daniel" userId="1b6ea79d-60d7-472e-a79a-e3fa9de1dfad" providerId="ADAL" clId="{51126302-8A74-4563-B6B1-51EE16078136}" dt="2023-07-05T17:29:00.297" v="33"/>
-        <pc:sldMkLst>
-          <pc:docMk/>
-          <pc:sldMk cId="2794066038" sldId="334"/>
-        </pc:sldMkLst>
-        <pc:picChg chg="del">
-          <ac:chgData name="Maxwell,Daniel" userId="1b6ea79d-60d7-472e-a79a-e3fa9de1dfad" providerId="ADAL" clId="{51126302-8A74-4563-B6B1-51EE16078136}" dt="2023-07-05T17:29:00.297" v="33"/>
-          <ac:picMkLst>
-            <pc:docMk/>
-            <pc:sldMk cId="2794066038" sldId="334"/>
-            <ac:picMk id="6" creationId="{4EED1408-1716-2D87-B3E0-D732F60CCBB5}"/>
-          </ac:picMkLst>
-        </pc:picChg>
-      </pc:sldChg>
-      <pc:sldChg chg="delSp modTransition modAnim">
-        <pc:chgData name="Maxwell,Daniel" userId="1b6ea79d-60d7-472e-a79a-e3fa9de1dfad" providerId="ADAL" clId="{51126302-8A74-4563-B6B1-51EE16078136}" dt="2023-07-05T17:29:00.297" v="33"/>
-        <pc:sldMkLst>
-          <pc:docMk/>
-          <pc:sldMk cId="1823499810" sldId="336"/>
-        </pc:sldMkLst>
-        <pc:picChg chg="del">
-          <ac:chgData name="Maxwell,Daniel" userId="1b6ea79d-60d7-472e-a79a-e3fa9de1dfad" providerId="ADAL" clId="{51126302-8A74-4563-B6B1-51EE16078136}" dt="2023-07-05T17:29:00.297" v="33"/>
-          <ac:picMkLst>
-            <pc:docMk/>
-            <pc:sldMk cId="1823499810" sldId="336"/>
-            <ac:picMk id="5" creationId="{C6018A0C-9108-5F86-278D-BF92DE141DDF}"/>
-          </ac:picMkLst>
-        </pc:picChg>
-      </pc:sldChg>
-      <pc:sldChg chg="modTransition">
-        <pc:chgData name="Maxwell,Daniel" userId="1b6ea79d-60d7-472e-a79a-e3fa9de1dfad" providerId="ADAL" clId="{51126302-8A74-4563-B6B1-51EE16078136}" dt="2023-07-05T17:29:00.297" v="33"/>
-        <pc:sldMkLst>
-          <pc:docMk/>
-          <pc:sldMk cId="1859151050" sldId="337"/>
-        </pc:sldMkLst>
-      </pc:sldChg>
-      <pc:sldChg chg="delSp modTransition modAnim">
-        <pc:chgData name="Maxwell,Daniel" userId="1b6ea79d-60d7-472e-a79a-e3fa9de1dfad" providerId="ADAL" clId="{51126302-8A74-4563-B6B1-51EE16078136}" dt="2023-07-05T17:29:00.297" v="33"/>
-        <pc:sldMkLst>
-          <pc:docMk/>
-          <pc:sldMk cId="4064151526" sldId="338"/>
-        </pc:sldMkLst>
-        <pc:picChg chg="del">
-          <ac:chgData name="Maxwell,Daniel" userId="1b6ea79d-60d7-472e-a79a-e3fa9de1dfad" providerId="ADAL" clId="{51126302-8A74-4563-B6B1-51EE16078136}" dt="2023-07-05T17:29:00.297" v="33"/>
-          <ac:picMkLst>
-            <pc:docMk/>
-            <pc:sldMk cId="4064151526" sldId="338"/>
-            <ac:picMk id="7" creationId="{870D7F6B-275D-C39C-1C4A-3A7F551406A5}"/>
-          </ac:picMkLst>
-        </pc:picChg>
-      </pc:sldChg>
-      <pc:sldChg chg="delSp modTransition modAnim">
-        <pc:chgData name="Maxwell,Daniel" userId="1b6ea79d-60d7-472e-a79a-e3fa9de1dfad" providerId="ADAL" clId="{51126302-8A74-4563-B6B1-51EE16078136}" dt="2023-07-05T17:29:00.297" v="33"/>
-        <pc:sldMkLst>
-          <pc:docMk/>
-          <pc:sldMk cId="3665965237" sldId="339"/>
-        </pc:sldMkLst>
-        <pc:picChg chg="del">
-          <ac:chgData name="Maxwell,Daniel" userId="1b6ea79d-60d7-472e-a79a-e3fa9de1dfad" providerId="ADAL" clId="{51126302-8A74-4563-B6B1-51EE16078136}" dt="2023-07-05T17:29:00.297" v="33"/>
-          <ac:picMkLst>
-            <pc:docMk/>
-            <pc:sldMk cId="3665965237" sldId="339"/>
-            <ac:picMk id="7" creationId="{EDC682D8-2366-C522-F80D-DBBE7755EE6A}"/>
-          </ac:picMkLst>
-        </pc:picChg>
-      </pc:sldChg>
-      <pc:sldChg chg="delSp modTransition modAnim">
-        <pc:chgData name="Maxwell,Daniel" userId="1b6ea79d-60d7-472e-a79a-e3fa9de1dfad" providerId="ADAL" clId="{51126302-8A74-4563-B6B1-51EE16078136}" dt="2023-07-05T17:29:00.297" v="33"/>
-        <pc:sldMkLst>
-          <pc:docMk/>
-          <pc:sldMk cId="2194656671" sldId="340"/>
-        </pc:sldMkLst>
-        <pc:picChg chg="del">
-          <ac:chgData name="Maxwell,Daniel" userId="1b6ea79d-60d7-472e-a79a-e3fa9de1dfad" providerId="ADAL" clId="{51126302-8A74-4563-B6B1-51EE16078136}" dt="2023-07-05T17:29:00.297" v="33"/>
-          <ac:picMkLst>
-            <pc:docMk/>
-            <pc:sldMk cId="2194656671" sldId="340"/>
-            <ac:picMk id="7" creationId="{35BE8921-D076-F461-BF0A-0E8B86379808}"/>
-          </ac:picMkLst>
-        </pc:picChg>
-      </pc:sldChg>
-      <pc:sldChg chg="delSp modTransition modAnim">
-        <pc:chgData name="Maxwell,Daniel" userId="1b6ea79d-60d7-472e-a79a-e3fa9de1dfad" providerId="ADAL" clId="{51126302-8A74-4563-B6B1-51EE16078136}" dt="2023-07-05T17:29:00.297" v="33"/>
-        <pc:sldMkLst>
-          <pc:docMk/>
-          <pc:sldMk cId="3935765361" sldId="341"/>
-        </pc:sldMkLst>
-        <pc:picChg chg="del">
-          <ac:chgData name="Maxwell,Daniel" userId="1b6ea79d-60d7-472e-a79a-e3fa9de1dfad" providerId="ADAL" clId="{51126302-8A74-4563-B6B1-51EE16078136}" dt="2023-07-05T17:29:00.297" v="33"/>
-          <ac:picMkLst>
-            <pc:docMk/>
-            <pc:sldMk cId="3935765361" sldId="341"/>
-            <ac:picMk id="13" creationId="{B08BCC7C-7A01-1983-0FA0-0C236C16428D}"/>
-          </ac:picMkLst>
-        </pc:picChg>
-      </pc:sldChg>
-      <pc:sldChg chg="delSp modTransition modAnim">
-        <pc:chgData name="Maxwell,Daniel" userId="1b6ea79d-60d7-472e-a79a-e3fa9de1dfad" providerId="ADAL" clId="{51126302-8A74-4563-B6B1-51EE16078136}" dt="2023-07-05T17:29:00.297" v="33"/>
-        <pc:sldMkLst>
-          <pc:docMk/>
-          <pc:sldMk cId="4269837095" sldId="342"/>
-        </pc:sldMkLst>
-        <pc:picChg chg="del">
-          <ac:chgData name="Maxwell,Daniel" userId="1b6ea79d-60d7-472e-a79a-e3fa9de1dfad" providerId="ADAL" clId="{51126302-8A74-4563-B6B1-51EE16078136}" dt="2023-07-05T17:29:00.297" v="33"/>
-          <ac:picMkLst>
-            <pc:docMk/>
-            <pc:sldMk cId="4269837095" sldId="342"/>
-            <ac:picMk id="17" creationId="{CF65CC0C-7DCE-5B6A-8893-910987416AC6}"/>
-          </ac:picMkLst>
-        </pc:picChg>
-      </pc:sldChg>
-      <pc:sldChg chg="delSp modTransition modAnim">
-        <pc:chgData name="Maxwell,Daniel" userId="1b6ea79d-60d7-472e-a79a-e3fa9de1dfad" providerId="ADAL" clId="{51126302-8A74-4563-B6B1-51EE16078136}" dt="2023-07-05T17:29:00.297" v="33"/>
-        <pc:sldMkLst>
-          <pc:docMk/>
-          <pc:sldMk cId="2802503080" sldId="343"/>
-        </pc:sldMkLst>
-        <pc:picChg chg="del">
-          <ac:chgData name="Maxwell,Daniel" userId="1b6ea79d-60d7-472e-a79a-e3fa9de1dfad" providerId="ADAL" clId="{51126302-8A74-4563-B6B1-51EE16078136}" dt="2023-07-05T17:29:00.297" v="33"/>
-          <ac:picMkLst>
-            <pc:docMk/>
-            <pc:sldMk cId="2802503080" sldId="343"/>
-            <ac:picMk id="11" creationId="{2601D412-7803-D6FF-730A-7731BAB4C783}"/>
-          </ac:picMkLst>
-        </pc:picChg>
-      </pc:sldChg>
-    </pc:docChg>
-  </pc:docChgLst>
-  <pc:docChgLst>
-    <pc:chgData name="Maxwell,Daniel" userId="1b6ea79d-60d7-472e-a79a-e3fa9de1dfad" providerId="ADAL" clId="{7EADAE9A-F2CD-4ADD-9950-0327C2C1326E}"/>
-    <pc:docChg chg="custSel addSld modSld">
-      <pc:chgData name="Maxwell,Daniel" userId="1b6ea79d-60d7-472e-a79a-e3fa9de1dfad" providerId="ADAL" clId="{7EADAE9A-F2CD-4ADD-9950-0327C2C1326E}" dt="2023-05-25T19:02:47.969" v="5889"/>
-      <pc:docMkLst>
-        <pc:docMk/>
-      </pc:docMkLst>
-      <pc:sldChg chg="addSp delSp modSp mod modTransition modAnim modNotesTx">
-        <pc:chgData name="Maxwell,Daniel" userId="1b6ea79d-60d7-472e-a79a-e3fa9de1dfad" providerId="ADAL" clId="{7EADAE9A-F2CD-4ADD-9950-0327C2C1326E}" dt="2023-05-25T17:58:24.049" v="3999"/>
-        <pc:sldMkLst>
-          <pc:docMk/>
-          <pc:sldMk cId="2815250072" sldId="287"/>
-        </pc:sldMkLst>
-        <pc:spChg chg="add mod">
-          <ac:chgData name="Maxwell,Daniel" userId="1b6ea79d-60d7-472e-a79a-e3fa9de1dfad" providerId="ADAL" clId="{7EADAE9A-F2CD-4ADD-9950-0327C2C1326E}" dt="2023-05-25T14:11:39.690" v="1516" actId="20577"/>
-          <ac:spMkLst>
-            <pc:docMk/>
-            <pc:sldMk cId="2815250072" sldId="287"/>
-            <ac:spMk id="15" creationId="{12AF450C-973B-0F40-0F68-086AD9FD3455}"/>
-          </ac:spMkLst>
-        </pc:spChg>
-        <pc:picChg chg="del">
-          <ac:chgData name="Maxwell,Daniel" userId="1b6ea79d-60d7-472e-a79a-e3fa9de1dfad" providerId="ADAL" clId="{7EADAE9A-F2CD-4ADD-9950-0327C2C1326E}" dt="2023-05-25T17:55:21.651" v="3989"/>
-          <ac:picMkLst>
-            <pc:docMk/>
-            <pc:sldMk cId="2815250072" sldId="287"/>
-            <ac:picMk id="5" creationId="{1F5A25BC-AEF1-4F35-E881-6346287E0A05}"/>
-          </ac:picMkLst>
-        </pc:picChg>
-        <pc:picChg chg="add del mod">
-          <ac:chgData name="Maxwell,Daniel" userId="1b6ea79d-60d7-472e-a79a-e3fa9de1dfad" providerId="ADAL" clId="{7EADAE9A-F2CD-4ADD-9950-0327C2C1326E}" dt="2023-05-25T17:57:56.748" v="3998"/>
-          <ac:picMkLst>
-            <pc:docMk/>
-            <pc:sldMk cId="2815250072" sldId="287"/>
-            <ac:picMk id="6" creationId="{B28E9F03-87BF-ADAA-D96C-7EE25E2BFCC8}"/>
-          </ac:picMkLst>
-        </pc:picChg>
-        <pc:picChg chg="add mod">
-          <ac:chgData name="Maxwell,Daniel" userId="1b6ea79d-60d7-472e-a79a-e3fa9de1dfad" providerId="ADAL" clId="{7EADAE9A-F2CD-4ADD-9950-0327C2C1326E}" dt="2023-05-25T17:58:24.049" v="3999"/>
-          <ac:picMkLst>
-            <pc:docMk/>
-            <pc:sldMk cId="2815250072" sldId="287"/>
-            <ac:picMk id="7" creationId="{DD9F4BE1-7FB4-55F4-AD59-D5FDBD2FF2B9}"/>
-          </ac:picMkLst>
-        </pc:picChg>
-      </pc:sldChg>
-      <pc:sldChg chg="addSp delSp modSp modTransition modAnim modNotesTx">
-        <pc:chgData name="Maxwell,Daniel" userId="1b6ea79d-60d7-472e-a79a-e3fa9de1dfad" providerId="ADAL" clId="{7EADAE9A-F2CD-4ADD-9950-0327C2C1326E}" dt="2023-05-25T18:57:13.026" v="5843"/>
-        <pc:sldMkLst>
-          <pc:docMk/>
-          <pc:sldMk cId="3192052037" sldId="293"/>
-        </pc:sldMkLst>
-        <pc:picChg chg="add del mod">
-          <ac:chgData name="Maxwell,Daniel" userId="1b6ea79d-60d7-472e-a79a-e3fa9de1dfad" providerId="ADAL" clId="{7EADAE9A-F2CD-4ADD-9950-0327C2C1326E}" dt="2023-05-25T18:56:46.457" v="5840"/>
-          <ac:picMkLst>
-            <pc:docMk/>
-            <pc:sldMk cId="3192052037" sldId="293"/>
-            <ac:picMk id="4" creationId="{3146CAD9-588C-1F4E-4CAB-C7557A4E426B}"/>
-          </ac:picMkLst>
-        </pc:picChg>
-        <pc:picChg chg="add del mod">
-          <ac:chgData name="Maxwell,Daniel" userId="1b6ea79d-60d7-472e-a79a-e3fa9de1dfad" providerId="ADAL" clId="{7EADAE9A-F2CD-4ADD-9950-0327C2C1326E}" dt="2023-05-25T18:57:00.111" v="5842"/>
-          <ac:picMkLst>
-            <pc:docMk/>
-            <pc:sldMk cId="3192052037" sldId="293"/>
-            <ac:picMk id="6" creationId="{BEEEDC65-1862-D2D2-6F1E-EA8A6994E82B}"/>
-          </ac:picMkLst>
-        </pc:picChg>
-        <pc:picChg chg="del">
-          <ac:chgData name="Maxwell,Daniel" userId="1b6ea79d-60d7-472e-a79a-e3fa9de1dfad" providerId="ADAL" clId="{7EADAE9A-F2CD-4ADD-9950-0327C2C1326E}" dt="2023-05-25T18:55:53.756" v="5739"/>
-          <ac:picMkLst>
-            <pc:docMk/>
-            <pc:sldMk cId="3192052037" sldId="293"/>
-            <ac:picMk id="7" creationId="{8BA7D920-234A-0C8A-A7D5-28F313DACFC8}"/>
-          </ac:picMkLst>
-        </pc:picChg>
-        <pc:picChg chg="add mod">
-          <ac:chgData name="Maxwell,Daniel" userId="1b6ea79d-60d7-472e-a79a-e3fa9de1dfad" providerId="ADAL" clId="{7EADAE9A-F2CD-4ADD-9950-0327C2C1326E}" dt="2023-05-25T18:57:13.026" v="5843"/>
-          <ac:picMkLst>
-            <pc:docMk/>
-            <pc:sldMk cId="3192052037" sldId="293"/>
-            <ac:picMk id="8" creationId="{3646C95C-4F3A-453B-750E-44A9F00E5D12}"/>
-          </ac:picMkLst>
-        </pc:picChg>
-      </pc:sldChg>
-      <pc:sldChg chg="addSp delSp modSp mod modTransition modAnim modNotesTx">
-        <pc:chgData name="Maxwell,Daniel" userId="1b6ea79d-60d7-472e-a79a-e3fa9de1dfad" providerId="ADAL" clId="{7EADAE9A-F2CD-4ADD-9950-0327C2C1326E}" dt="2023-05-25T18:12:10.278" v="4414"/>
-        <pc:sldMkLst>
-          <pc:docMk/>
-          <pc:sldMk cId="1132462549" sldId="296"/>
-        </pc:sldMkLst>
-        <pc:spChg chg="add mod">
-          <ac:chgData name="Maxwell,Daniel" userId="1b6ea79d-60d7-472e-a79a-e3fa9de1dfad" providerId="ADAL" clId="{7EADAE9A-F2CD-4ADD-9950-0327C2C1326E}" dt="2023-05-25T14:10:59.523" v="1485" actId="20577"/>
-          <ac:spMkLst>
-            <pc:docMk/>
-            <pc:sldMk cId="1132462549" sldId="296"/>
-            <ac:spMk id="6" creationId="{993B0674-BA9C-A38D-92EB-22D2774DDC99}"/>
-          </ac:spMkLst>
-        </pc:spChg>
-        <pc:picChg chg="add del mod">
-          <ac:chgData name="Maxwell,Daniel" userId="1b6ea79d-60d7-472e-a79a-e3fa9de1dfad" providerId="ADAL" clId="{7EADAE9A-F2CD-4ADD-9950-0327C2C1326E}" dt="2023-05-25T18:00:02.250" v="4002"/>
-          <ac:picMkLst>
-            <pc:docMk/>
-            <pc:sldMk cId="1132462549" sldId="296"/>
-            <ac:picMk id="2" creationId="{4CBF7054-6C3B-EB4A-DBDE-4D319AA50269}"/>
-          </ac:picMkLst>
-        </pc:picChg>
-        <pc:picChg chg="del">
-          <ac:chgData name="Maxwell,Daniel" userId="1b6ea79d-60d7-472e-a79a-e3fa9de1dfad" providerId="ADAL" clId="{7EADAE9A-F2CD-4ADD-9950-0327C2C1326E}" dt="2023-05-25T17:59:04.881" v="4000"/>
-          <ac:picMkLst>
-            <pc:docMk/>
-            <pc:sldMk cId="1132462549" sldId="296"/>
-            <ac:picMk id="5" creationId="{D3FEC116-A279-1453-B3D5-796D3BE12B68}"/>
-          </ac:picMkLst>
-        </pc:picChg>
-        <pc:picChg chg="add del mod">
-          <ac:chgData name="Maxwell,Daniel" userId="1b6ea79d-60d7-472e-a79a-e3fa9de1dfad" providerId="ADAL" clId="{7EADAE9A-F2CD-4ADD-9950-0327C2C1326E}" dt="2023-05-25T18:00:13.360" v="4004"/>
-          <ac:picMkLst>
-            <pc:docMk/>
-            <pc:sldMk cId="1132462549" sldId="296"/>
-            <ac:picMk id="8" creationId="{533676E9-F031-0455-1C93-121262790508}"/>
-          </ac:picMkLst>
-        </pc:picChg>
-        <pc:picChg chg="add del mod">
-          <ac:chgData name="Maxwell,Daniel" userId="1b6ea79d-60d7-472e-a79a-e3fa9de1dfad" providerId="ADAL" clId="{7EADAE9A-F2CD-4ADD-9950-0327C2C1326E}" dt="2023-05-25T18:06:53.809" v="4362"/>
-          <ac:picMkLst>
-            <pc:docMk/>
-            <pc:sldMk cId="1132462549" sldId="296"/>
-            <ac:picMk id="9" creationId="{DB608422-BB44-CE43-F183-2379FBBD4D42}"/>
-          </ac:picMkLst>
-        </pc:picChg>
-        <pc:picChg chg="add del mod">
-          <ac:chgData name="Maxwell,Daniel" userId="1b6ea79d-60d7-472e-a79a-e3fa9de1dfad" providerId="ADAL" clId="{7EADAE9A-F2CD-4ADD-9950-0327C2C1326E}" dt="2023-05-25T18:08:13.649" v="4390"/>
-          <ac:picMkLst>
-            <pc:docMk/>
-            <pc:sldMk cId="1132462549" sldId="296"/>
-            <ac:picMk id="10" creationId="{11995508-984B-20DE-AFF7-56C464049645}"/>
-          </ac:picMkLst>
-        </pc:picChg>
-        <pc:picChg chg="add del mod">
-          <ac:chgData name="Maxwell,Daniel" userId="1b6ea79d-60d7-472e-a79a-e3fa9de1dfad" providerId="ADAL" clId="{7EADAE9A-F2CD-4ADD-9950-0327C2C1326E}" dt="2023-05-25T18:08:31.904" v="4392"/>
-          <ac:picMkLst>
-            <pc:docMk/>
-            <pc:sldMk cId="1132462549" sldId="296"/>
-            <ac:picMk id="11" creationId="{DD2CA4E6-696E-7A18-0205-3BBD4DEE7221}"/>
-          </ac:picMkLst>
-        </pc:picChg>
-        <pc:picChg chg="add del mod">
-          <ac:chgData name="Maxwell,Daniel" userId="1b6ea79d-60d7-472e-a79a-e3fa9de1dfad" providerId="ADAL" clId="{7EADAE9A-F2CD-4ADD-9950-0327C2C1326E}" dt="2023-05-25T18:09:55.098" v="4405"/>
-          <ac:picMkLst>
-            <pc:docMk/>
-            <pc:sldMk cId="1132462549" sldId="296"/>
-            <ac:picMk id="12" creationId="{19FCDA0D-06B6-4A90-539F-D7EE8DD7BDF1}"/>
-          </ac:picMkLst>
-        </pc:picChg>
-        <pc:picChg chg="add del mod">
-          <ac:chgData name="Maxwell,Daniel" userId="1b6ea79d-60d7-472e-a79a-e3fa9de1dfad" providerId="ADAL" clId="{7EADAE9A-F2CD-4ADD-9950-0327C2C1326E}" dt="2023-05-25T18:10:12.240" v="4407"/>
-          <ac:picMkLst>
-            <pc:docMk/>
-            <pc:sldMk cId="1132462549" sldId="296"/>
-            <ac:picMk id="13" creationId="{CE7A0F5F-3488-BF22-CB12-F85EFCFD6235}"/>
-          </ac:picMkLst>
-        </pc:picChg>
-        <pc:picChg chg="add del mod">
-          <ac:chgData name="Maxwell,Daniel" userId="1b6ea79d-60d7-472e-a79a-e3fa9de1dfad" providerId="ADAL" clId="{7EADAE9A-F2CD-4ADD-9950-0327C2C1326E}" dt="2023-05-25T18:11:03.588" v="4409"/>
-          <ac:picMkLst>
-            <pc:docMk/>
-            <pc:sldMk cId="1132462549" sldId="296"/>
-            <ac:picMk id="14" creationId="{47C38008-9E49-560B-F6C1-1FD5AB30864D}"/>
-          </ac:picMkLst>
-        </pc:picChg>
-        <pc:picChg chg="add del mod">
-          <ac:chgData name="Maxwell,Daniel" userId="1b6ea79d-60d7-472e-a79a-e3fa9de1dfad" providerId="ADAL" clId="{7EADAE9A-F2CD-4ADD-9950-0327C2C1326E}" dt="2023-05-25T18:11:25.514" v="4411"/>
-          <ac:picMkLst>
-            <pc:docMk/>
-            <pc:sldMk cId="1132462549" sldId="296"/>
-            <ac:picMk id="15" creationId="{9FB37291-7FE0-A79D-8718-C7FF7A36CEF8}"/>
-          </ac:picMkLst>
-        </pc:picChg>
-        <pc:picChg chg="add del mod">
-          <ac:chgData name="Maxwell,Daniel" userId="1b6ea79d-60d7-472e-a79a-e3fa9de1dfad" providerId="ADAL" clId="{7EADAE9A-F2CD-4ADD-9950-0327C2C1326E}" dt="2023-05-25T18:11:37.905" v="4413"/>
-          <ac:picMkLst>
-            <pc:docMk/>
-            <pc:sldMk cId="1132462549" sldId="296"/>
-            <ac:picMk id="16" creationId="{2AE1E91D-0EBF-CB2E-1208-EF4DB3713F57}"/>
-          </ac:picMkLst>
-        </pc:picChg>
-        <pc:picChg chg="add mod">
-          <ac:chgData name="Maxwell,Daniel" userId="1b6ea79d-60d7-472e-a79a-e3fa9de1dfad" providerId="ADAL" clId="{7EADAE9A-F2CD-4ADD-9950-0327C2C1326E}" dt="2023-05-25T18:12:10.278" v="4414"/>
-          <ac:picMkLst>
-            <pc:docMk/>
-            <pc:sldMk cId="1132462549" sldId="296"/>
-            <ac:picMk id="17" creationId="{D281C9DC-498C-06FC-70CB-8101BB6F393D}"/>
-          </ac:picMkLst>
-        </pc:picChg>
-      </pc:sldChg>
-      <pc:sldChg chg="addSp delSp modSp modTransition modAnim modNotesTx">
-        <pc:chgData name="Maxwell,Daniel" userId="1b6ea79d-60d7-472e-a79a-e3fa9de1dfad" providerId="ADAL" clId="{7EADAE9A-F2CD-4ADD-9950-0327C2C1326E}" dt="2023-05-25T19:02:47.969" v="5889"/>
-        <pc:sldMkLst>
-          <pc:docMk/>
-          <pc:sldMk cId="2194656671" sldId="340"/>
-        </pc:sldMkLst>
-        <pc:picChg chg="add del mod">
-          <ac:chgData name="Maxwell,Daniel" userId="1b6ea79d-60d7-472e-a79a-e3fa9de1dfad" providerId="ADAL" clId="{7EADAE9A-F2CD-4ADD-9950-0327C2C1326E}" dt="2023-05-25T18:58:33.577" v="5845"/>
-          <ac:picMkLst>
-            <pc:docMk/>
-            <pc:sldMk cId="2194656671" sldId="340"/>
-            <ac:picMk id="2" creationId="{94D1E5FA-5814-555E-91D0-DA795100373D}"/>
-          </ac:picMkLst>
-        </pc:picChg>
-        <pc:picChg chg="add del mod">
-          <ac:chgData name="Maxwell,Daniel" userId="1b6ea79d-60d7-472e-a79a-e3fa9de1dfad" providerId="ADAL" clId="{7EADAE9A-F2CD-4ADD-9950-0327C2C1326E}" dt="2023-05-25T19:01:39.428" v="5888"/>
-          <ac:picMkLst>
-            <pc:docMk/>
-            <pc:sldMk cId="2194656671" sldId="340"/>
-            <ac:picMk id="4" creationId="{77CA58BB-24CC-AAF9-C5DB-F530258878AB}"/>
-          </ac:picMkLst>
-        </pc:picChg>
-        <pc:picChg chg="add mod">
-          <ac:chgData name="Maxwell,Daniel" userId="1b6ea79d-60d7-472e-a79a-e3fa9de1dfad" providerId="ADAL" clId="{7EADAE9A-F2CD-4ADD-9950-0327C2C1326E}" dt="2023-05-25T19:02:47.969" v="5889"/>
-          <ac:picMkLst>
-            <pc:docMk/>
-            <pc:sldMk cId="2194656671" sldId="340"/>
-            <ac:picMk id="7" creationId="{35BE8921-D076-F461-BF0A-0E8B86379808}"/>
-          </ac:picMkLst>
-        </pc:picChg>
-      </pc:sldChg>
-      <pc:sldChg chg="addSp delSp modSp new mod modTransition modAnim modNotesTx">
-        <pc:chgData name="Maxwell,Daniel" userId="1b6ea79d-60d7-472e-a79a-e3fa9de1dfad" providerId="ADAL" clId="{7EADAE9A-F2CD-4ADD-9950-0327C2C1326E}" dt="2023-05-25T18:54:46.908" v="5738"/>
-        <pc:sldMkLst>
-          <pc:docMk/>
-          <pc:sldMk cId="3935765361" sldId="341"/>
-        </pc:sldMkLst>
-        <pc:spChg chg="add mod">
-          <ac:chgData name="Maxwell,Daniel" userId="1b6ea79d-60d7-472e-a79a-e3fa9de1dfad" providerId="ADAL" clId="{7EADAE9A-F2CD-4ADD-9950-0327C2C1326E}" dt="2023-05-24T20:12:37.588" v="62" actId="20577"/>
-          <ac:spMkLst>
-            <pc:docMk/>
-            <pc:sldMk cId="3935765361" sldId="341"/>
-            <ac:spMk id="6" creationId="{519DD942-3483-598B-8A07-98C82B3231A8}"/>
-          </ac:spMkLst>
-        </pc:spChg>
-        <pc:picChg chg="add del mod">
-          <ac:chgData name="Maxwell,Daniel" userId="1b6ea79d-60d7-472e-a79a-e3fa9de1dfad" providerId="ADAL" clId="{7EADAE9A-F2CD-4ADD-9950-0327C2C1326E}" dt="2023-05-25T18:39:06.452" v="5162"/>
-          <ac:picMkLst>
-            <pc:docMk/>
-            <pc:sldMk cId="3935765361" sldId="341"/>
-            <ac:picMk id="2" creationId="{E1F1DE2A-E2E3-F33E-39D4-820912C6EDFF}"/>
-          </ac:picMkLst>
-        </pc:picChg>
-        <pc:picChg chg="add del mod">
-          <ac:chgData name="Maxwell,Daniel" userId="1b6ea79d-60d7-472e-a79a-e3fa9de1dfad" providerId="ADAL" clId="{7EADAE9A-F2CD-4ADD-9950-0327C2C1326E}" dt="2023-05-25T18:39:19.908" v="5164"/>
-          <ac:picMkLst>
-            <pc:docMk/>
-            <pc:sldMk cId="3935765361" sldId="341"/>
-            <ac:picMk id="3" creationId="{10C10AD4-4B80-6F4B-C5C3-00ECA770FBCD}"/>
-          </ac:picMkLst>
-        </pc:picChg>
-        <pc:picChg chg="add del mod">
-          <ac:chgData name="Maxwell,Daniel" userId="1b6ea79d-60d7-472e-a79a-e3fa9de1dfad" providerId="ADAL" clId="{7EADAE9A-F2CD-4ADD-9950-0327C2C1326E}" dt="2023-05-24T20:11:57.800" v="24" actId="478"/>
-          <ac:picMkLst>
-            <pc:docMk/>
-            <pc:sldMk cId="3935765361" sldId="341"/>
-            <ac:picMk id="3" creationId="{91F53BA5-4896-CE1F-88A0-C158564EC22C}"/>
-          </ac:picMkLst>
-        </pc:picChg>
-        <pc:picChg chg="add mod">
-          <ac:chgData name="Maxwell,Daniel" userId="1b6ea79d-60d7-472e-a79a-e3fa9de1dfad" providerId="ADAL" clId="{7EADAE9A-F2CD-4ADD-9950-0327C2C1326E}" dt="2023-05-25T14:09:11.132" v="1435"/>
-          <ac:picMkLst>
-            <pc:docMk/>
-            <pc:sldMk cId="3935765361" sldId="341"/>
-            <ac:picMk id="4" creationId="{49E2B260-C7B1-DE64-337E-5FB37A937A3E}"/>
-          </ac:picMkLst>
-        </pc:picChg>
-        <pc:picChg chg="add mod">
-          <ac:chgData name="Maxwell,Daniel" userId="1b6ea79d-60d7-472e-a79a-e3fa9de1dfad" providerId="ADAL" clId="{7EADAE9A-F2CD-4ADD-9950-0327C2C1326E}" dt="2023-05-24T20:12:05.615" v="27" actId="1076"/>
-          <ac:picMkLst>
-            <pc:docMk/>
-            <pc:sldMk cId="3935765361" sldId="341"/>
-            <ac:picMk id="5" creationId="{E0B749DC-2274-BFAC-CA8D-01435D889BCC}"/>
-          </ac:picMkLst>
-        </pc:picChg>
-        <pc:picChg chg="add del mod">
-          <ac:chgData name="Maxwell,Daniel" userId="1b6ea79d-60d7-472e-a79a-e3fa9de1dfad" providerId="ADAL" clId="{7EADAE9A-F2CD-4ADD-9950-0327C2C1326E}" dt="2023-05-25T18:39:41.957" v="5166"/>
-          <ac:picMkLst>
-            <pc:docMk/>
-            <pc:sldMk cId="3935765361" sldId="341"/>
-            <ac:picMk id="7" creationId="{6CFA10E4-6674-3CDB-3DA6-A8B90A2902BF}"/>
-          </ac:picMkLst>
-        </pc:picChg>
-        <pc:picChg chg="add del mod">
-          <ac:chgData name="Maxwell,Daniel" userId="1b6ea79d-60d7-472e-a79a-e3fa9de1dfad" providerId="ADAL" clId="{7EADAE9A-F2CD-4ADD-9950-0327C2C1326E}" dt="2023-05-25T18:42:30.379" v="5223"/>
-          <ac:picMkLst>
-            <pc:docMk/>
-            <pc:sldMk cId="3935765361" sldId="341"/>
-            <ac:picMk id="8" creationId="{1C13B2A3-FD1F-C04E-9357-F30CECCA2539}"/>
-          </ac:picMkLst>
-        </pc:picChg>
-        <pc:picChg chg="add del mod">
-          <ac:chgData name="Maxwell,Daniel" userId="1b6ea79d-60d7-472e-a79a-e3fa9de1dfad" providerId="ADAL" clId="{7EADAE9A-F2CD-4ADD-9950-0327C2C1326E}" dt="2023-05-25T18:46:29.435" v="5400"/>
-          <ac:picMkLst>
-            <pc:docMk/>
-            <pc:sldMk cId="3935765361" sldId="341"/>
-            <ac:picMk id="9" creationId="{4965FD26-0F06-6C03-474F-2A7118063E81}"/>
-          </ac:picMkLst>
-        </pc:picChg>
-        <pc:picChg chg="add del mod">
-          <ac:chgData name="Maxwell,Daniel" userId="1b6ea79d-60d7-472e-a79a-e3fa9de1dfad" providerId="ADAL" clId="{7EADAE9A-F2CD-4ADD-9950-0327C2C1326E}" dt="2023-05-25T18:46:38.544" v="5402"/>
-          <ac:picMkLst>
-            <pc:docMk/>
-            <pc:sldMk cId="3935765361" sldId="341"/>
-            <ac:picMk id="10" creationId="{2A733CF0-BBEA-C72C-9445-1ECA51021BD6}"/>
-          </ac:picMkLst>
-        </pc:picChg>
-        <pc:picChg chg="add del mod">
-          <ac:chgData name="Maxwell,Daniel" userId="1b6ea79d-60d7-472e-a79a-e3fa9de1dfad" providerId="ADAL" clId="{7EADAE9A-F2CD-4ADD-9950-0327C2C1326E}" dt="2023-05-25T18:52:11.757" v="5727"/>
-          <ac:picMkLst>
-            <pc:docMk/>
-            <pc:sldMk cId="3935765361" sldId="341"/>
-            <ac:picMk id="11" creationId="{CAED7BBF-8B13-9E60-133F-612C72B79208}"/>
-          </ac:picMkLst>
-        </pc:picChg>
-        <pc:picChg chg="add del mod">
-          <ac:chgData name="Maxwell,Daniel" userId="1b6ea79d-60d7-472e-a79a-e3fa9de1dfad" providerId="ADAL" clId="{7EADAE9A-F2CD-4ADD-9950-0327C2C1326E}" dt="2023-05-25T18:54:11.807" v="5737"/>
-          <ac:picMkLst>
-            <pc:docMk/>
-            <pc:sldMk cId="3935765361" sldId="341"/>
-            <ac:picMk id="12" creationId="{9FE21A6C-EF8E-9FDF-5FB3-E38D88785A0D}"/>
-          </ac:picMkLst>
-        </pc:picChg>
-        <pc:picChg chg="add mod">
-          <ac:chgData name="Maxwell,Daniel" userId="1b6ea79d-60d7-472e-a79a-e3fa9de1dfad" providerId="ADAL" clId="{7EADAE9A-F2CD-4ADD-9950-0327C2C1326E}" dt="2023-05-25T18:54:46.908" v="5738"/>
-          <ac:picMkLst>
-            <pc:docMk/>
-            <pc:sldMk cId="3935765361" sldId="341"/>
-            <ac:picMk id="13" creationId="{B08BCC7C-7A01-1983-0FA0-0C236C16428D}"/>
-          </ac:picMkLst>
-        </pc:picChg>
-      </pc:sldChg>
-      <pc:sldChg chg="addSp delSp modSp mod modTransition modAnim modNotesTx">
-        <pc:chgData name="Maxwell,Daniel" userId="1b6ea79d-60d7-472e-a79a-e3fa9de1dfad" providerId="ADAL" clId="{7EADAE9A-F2CD-4ADD-9950-0327C2C1326E}" dt="2023-05-25T18:30:20.925" v="5044"/>
-        <pc:sldMkLst>
-          <pc:docMk/>
-          <pc:sldMk cId="4269837095" sldId="342"/>
-        </pc:sldMkLst>
-        <pc:spChg chg="add mod">
-          <ac:chgData name="Maxwell,Daniel" userId="1b6ea79d-60d7-472e-a79a-e3fa9de1dfad" providerId="ADAL" clId="{7EADAE9A-F2CD-4ADD-9950-0327C2C1326E}" dt="2023-05-25T14:45:44.631" v="2826" actId="113"/>
-          <ac:spMkLst>
-            <pc:docMk/>
-            <pc:sldMk cId="4269837095" sldId="342"/>
-            <ac:spMk id="2" creationId="{A7AF31DD-0148-3853-28F8-4B38063C172C}"/>
-          </ac:spMkLst>
-        </pc:spChg>
-        <pc:spChg chg="add mod">
-          <ac:chgData name="Maxwell,Daniel" userId="1b6ea79d-60d7-472e-a79a-e3fa9de1dfad" providerId="ADAL" clId="{7EADAE9A-F2CD-4ADD-9950-0327C2C1326E}" dt="2023-05-25T14:39:38.773" v="2617" actId="14100"/>
-          <ac:spMkLst>
-            <pc:docMk/>
-            <pc:sldMk cId="4269837095" sldId="342"/>
-            <ac:spMk id="4" creationId="{AD19B9E2-23B1-F8F1-5B73-5DB5265D01D2}"/>
-          </ac:spMkLst>
-        </pc:spChg>
-        <pc:spChg chg="add mod">
-          <ac:chgData name="Maxwell,Daniel" userId="1b6ea79d-60d7-472e-a79a-e3fa9de1dfad" providerId="ADAL" clId="{7EADAE9A-F2CD-4ADD-9950-0327C2C1326E}" dt="2023-05-25T14:10:34.103" v="1458" actId="20577"/>
-          <ac:spMkLst>
-            <pc:docMk/>
-            <pc:sldMk cId="4269837095" sldId="342"/>
-            <ac:spMk id="7" creationId="{5648A8F6-D983-70F2-65C2-1B3914361981}"/>
-          </ac:spMkLst>
-        </pc:spChg>
-        <pc:spChg chg="add del mod">
-          <ac:chgData name="Maxwell,Daniel" userId="1b6ea79d-60d7-472e-a79a-e3fa9de1dfad" providerId="ADAL" clId="{7EADAE9A-F2CD-4ADD-9950-0327C2C1326E}" dt="2023-05-25T14:36:40.765" v="2521" actId="478"/>
-          <ac:spMkLst>
-            <pc:docMk/>
-            <pc:sldMk cId="4269837095" sldId="342"/>
-            <ac:spMk id="8" creationId="{9A77F8F9-E865-3412-389F-72CA7AAA0486}"/>
-          </ac:spMkLst>
-        </pc:spChg>
-        <pc:spChg chg="add mod">
-          <ac:chgData name="Maxwell,Daniel" userId="1b6ea79d-60d7-472e-a79a-e3fa9de1dfad" providerId="ADAL" clId="{7EADAE9A-F2CD-4ADD-9950-0327C2C1326E}" dt="2023-05-25T14:39:05.779" v="2615" actId="20577"/>
-          <ac:spMkLst>
-            <pc:docMk/>
-            <pc:sldMk cId="4269837095" sldId="342"/>
-            <ac:spMk id="9" creationId="{AA77BE82-7C54-FC74-DC1F-84FFEC4A931B}"/>
-          </ac:spMkLst>
-        </pc:spChg>
-        <pc:picChg chg="mod">
-          <ac:chgData name="Maxwell,Daniel" userId="1b6ea79d-60d7-472e-a79a-e3fa9de1dfad" providerId="ADAL" clId="{7EADAE9A-F2CD-4ADD-9950-0327C2C1326E}" dt="2023-05-25T14:10:04.158" v="1440" actId="1076"/>
-          <ac:picMkLst>
-            <pc:docMk/>
-            <pc:sldMk cId="4269837095" sldId="342"/>
-            <ac:picMk id="3" creationId="{2F58BEC6-A38B-8DDA-6485-99AC9052FB25}"/>
-          </ac:picMkLst>
-        </pc:picChg>
-        <pc:picChg chg="add del mod">
-          <ac:chgData name="Maxwell,Daniel" userId="1b6ea79d-60d7-472e-a79a-e3fa9de1dfad" providerId="ADAL" clId="{7EADAE9A-F2CD-4ADD-9950-0327C2C1326E}" dt="2023-05-25T18:13:06.773" v="4416"/>
-          <ac:picMkLst>
-            <pc:docMk/>
-            <pc:sldMk cId="4269837095" sldId="342"/>
-            <ac:picMk id="5" creationId="{07F1F8C5-03E4-56D3-2CB1-7F6194C474CA}"/>
-          </ac:picMkLst>
-        </pc:picChg>
-        <pc:picChg chg="del">
-          <ac:chgData name="Maxwell,Daniel" userId="1b6ea79d-60d7-472e-a79a-e3fa9de1dfad" providerId="ADAL" clId="{7EADAE9A-F2CD-4ADD-9950-0327C2C1326E}" dt="2023-05-25T14:00:50.749" v="988" actId="478"/>
-          <ac:picMkLst>
-            <pc:docMk/>
-            <pc:sldMk cId="4269837095" sldId="342"/>
-            <ac:picMk id="5" creationId="{FD7C293A-3CC2-A34D-CEFE-88CF5ED0E9E5}"/>
-          </ac:picMkLst>
-        </pc:picChg>
-        <pc:picChg chg="add mod">
-          <ac:chgData name="Maxwell,Daniel" userId="1b6ea79d-60d7-472e-a79a-e3fa9de1dfad" providerId="ADAL" clId="{7EADAE9A-F2CD-4ADD-9950-0327C2C1326E}" dt="2023-05-25T14:09:06.062" v="1433"/>
-          <ac:picMkLst>
-            <pc:docMk/>
-            <pc:sldMk cId="4269837095" sldId="342"/>
-            <ac:picMk id="6" creationId="{53C07878-8C3C-4DE6-953B-C68065895005}"/>
-          </ac:picMkLst>
-        </pc:picChg>
-        <pc:picChg chg="add del mod">
-          <ac:chgData name="Maxwell,Daniel" userId="1b6ea79d-60d7-472e-a79a-e3fa9de1dfad" providerId="ADAL" clId="{7EADAE9A-F2CD-4ADD-9950-0327C2C1326E}" dt="2023-05-25T18:20:07.519" v="4804"/>
-          <ac:picMkLst>
-            <pc:docMk/>
-            <pc:sldMk cId="4269837095" sldId="342"/>
-            <ac:picMk id="8" creationId="{C1808B49-9F2E-47AD-A0BC-C375A1C56F6F}"/>
-          </ac:picMkLst>
-        </pc:picChg>
-        <pc:picChg chg="add del mod">
-          <ac:chgData name="Maxwell,Daniel" userId="1b6ea79d-60d7-472e-a79a-e3fa9de1dfad" providerId="ADAL" clId="{7EADAE9A-F2CD-4ADD-9950-0327C2C1326E}" dt="2023-05-25T18:20:18.033" v="4806"/>
-          <ac:picMkLst>
-            <pc:docMk/>
-            <pc:sldMk cId="4269837095" sldId="342"/>
-            <ac:picMk id="10" creationId="{4A92CB5E-27C2-1D10-4C10-6FA5D187F189}"/>
-          </ac:picMkLst>
-        </pc:picChg>
-        <pc:picChg chg="add del mod">
-          <ac:chgData name="Maxwell,Daniel" userId="1b6ea79d-60d7-472e-a79a-e3fa9de1dfad" providerId="ADAL" clId="{7EADAE9A-F2CD-4ADD-9950-0327C2C1326E}" dt="2023-05-25T18:20:28.558" v="4808"/>
-          <ac:picMkLst>
-            <pc:docMk/>
-            <pc:sldMk cId="4269837095" sldId="342"/>
-            <ac:picMk id="11" creationId="{691C2D13-6580-CD89-2F14-8341C908356E}"/>
-          </ac:picMkLst>
-        </pc:picChg>
-        <pc:picChg chg="add del mod">
-          <ac:chgData name="Maxwell,Daniel" userId="1b6ea79d-60d7-472e-a79a-e3fa9de1dfad" providerId="ADAL" clId="{7EADAE9A-F2CD-4ADD-9950-0327C2C1326E}" dt="2023-05-25T18:25:52.529" v="4981"/>
-          <ac:picMkLst>
-            <pc:docMk/>
-            <pc:sldMk cId="4269837095" sldId="342"/>
-            <ac:picMk id="12" creationId="{3A6C7CA6-633C-EA7C-F850-8044B3BFDA84}"/>
-          </ac:picMkLst>
-        </pc:picChg>
-        <pc:picChg chg="add del mod">
-          <ac:chgData name="Maxwell,Daniel" userId="1b6ea79d-60d7-472e-a79a-e3fa9de1dfad" providerId="ADAL" clId="{7EADAE9A-F2CD-4ADD-9950-0327C2C1326E}" dt="2023-05-25T18:26:10.901" v="4983"/>
-          <ac:picMkLst>
-            <pc:docMk/>
-            <pc:sldMk cId="4269837095" sldId="342"/>
-            <ac:picMk id="13" creationId="{9C3278E1-6333-830D-C252-BF2F4CF836D2}"/>
-          </ac:picMkLst>
-        </pc:picChg>
-        <pc:picChg chg="add del mod">
-          <ac:chgData name="Maxwell,Daniel" userId="1b6ea79d-60d7-472e-a79a-e3fa9de1dfad" providerId="ADAL" clId="{7EADAE9A-F2CD-4ADD-9950-0327C2C1326E}" dt="2023-05-25T18:26:19.838" v="4985"/>
-          <ac:picMkLst>
-            <pc:docMk/>
-            <pc:sldMk cId="4269837095" sldId="342"/>
-            <ac:picMk id="14" creationId="{F788A482-17A4-CF3C-5145-36CFC7059294}"/>
-          </ac:picMkLst>
-        </pc:picChg>
-        <pc:picChg chg="add del mod">
-          <ac:chgData name="Maxwell,Daniel" userId="1b6ea79d-60d7-472e-a79a-e3fa9de1dfad" providerId="ADAL" clId="{7EADAE9A-F2CD-4ADD-9950-0327C2C1326E}" dt="2023-05-25T18:28:56.059" v="5041"/>
-          <ac:picMkLst>
-            <pc:docMk/>
-            <pc:sldMk cId="4269837095" sldId="342"/>
-            <ac:picMk id="15" creationId="{89B678C9-1D14-E30B-6BD8-CFBD16C69C07}"/>
-          </ac:picMkLst>
-        </pc:picChg>
-        <pc:picChg chg="add del mod">
-          <ac:chgData name="Maxwell,Daniel" userId="1b6ea79d-60d7-472e-a79a-e3fa9de1dfad" providerId="ADAL" clId="{7EADAE9A-F2CD-4ADD-9950-0327C2C1326E}" dt="2023-05-25T18:29:05.250" v="5043"/>
-          <ac:picMkLst>
-            <pc:docMk/>
-            <pc:sldMk cId="4269837095" sldId="342"/>
-            <ac:picMk id="16" creationId="{95C6E614-5945-5396-A282-4EF0008E0AA2}"/>
-          </ac:picMkLst>
-        </pc:picChg>
-        <pc:picChg chg="add mod">
-          <ac:chgData name="Maxwell,Daniel" userId="1b6ea79d-60d7-472e-a79a-e3fa9de1dfad" providerId="ADAL" clId="{7EADAE9A-F2CD-4ADD-9950-0327C2C1326E}" dt="2023-05-25T18:30:20.925" v="5044"/>
-          <ac:picMkLst>
-            <pc:docMk/>
-            <pc:sldMk cId="4269837095" sldId="342"/>
-            <ac:picMk id="17" creationId="{CF65CC0C-7DCE-5B6A-8893-910987416AC6}"/>
-          </ac:picMkLst>
-        </pc:picChg>
-      </pc:sldChg>
-      <pc:sldChg chg="addSp delSp modSp new mod modTransition modAnim modNotesTx">
-        <pc:chgData name="Maxwell,Daniel" userId="1b6ea79d-60d7-472e-a79a-e3fa9de1dfad" providerId="ADAL" clId="{7EADAE9A-F2CD-4ADD-9950-0327C2C1326E}" dt="2023-05-25T18:35:48.919" v="5112"/>
-        <pc:sldMkLst>
-          <pc:docMk/>
-          <pc:sldMk cId="2802503080" sldId="343"/>
-        </pc:sldMkLst>
-        <pc:spChg chg="add mod">
-          <ac:chgData name="Maxwell,Daniel" userId="1b6ea79d-60d7-472e-a79a-e3fa9de1dfad" providerId="ADAL" clId="{7EADAE9A-F2CD-4ADD-9950-0327C2C1326E}" dt="2023-05-25T14:45:05.597" v="2825"/>
-          <ac:spMkLst>
-            <pc:docMk/>
-            <pc:sldMk cId="2802503080" sldId="343"/>
-            <ac:spMk id="4" creationId="{AE74009B-E381-8F74-33A3-E4F47090D2EA}"/>
-          </ac:spMkLst>
-        </pc:spChg>
-        <pc:picChg chg="add mod">
-          <ac:chgData name="Maxwell,Daniel" userId="1b6ea79d-60d7-472e-a79a-e3fa9de1dfad" providerId="ADAL" clId="{7EADAE9A-F2CD-4ADD-9950-0327C2C1326E}" dt="2023-05-25T14:00:47.282" v="987" actId="1076"/>
-          <ac:picMkLst>
-            <pc:docMk/>
-            <pc:sldMk cId="2802503080" sldId="343"/>
-            <ac:picMk id="2" creationId="{5C77E842-ECF9-DC72-49C7-FD54CEDA5C29}"/>
-          </ac:picMkLst>
-        </pc:picChg>
-        <pc:picChg chg="add mod">
-          <ac:chgData name="Maxwell,Daniel" userId="1b6ea79d-60d7-472e-a79a-e3fa9de1dfad" providerId="ADAL" clId="{7EADAE9A-F2CD-4ADD-9950-0327C2C1326E}" dt="2023-05-25T14:09:09.048" v="1434"/>
-          <ac:picMkLst>
-            <pc:docMk/>
-            <pc:sldMk cId="2802503080" sldId="343"/>
-            <ac:picMk id="3" creationId="{4B9BFFE4-91FC-E427-3712-F9F1E72DA0C3}"/>
-          </ac:picMkLst>
-        </pc:picChg>
-        <pc:picChg chg="add del mod">
-          <ac:chgData name="Maxwell,Daniel" userId="1b6ea79d-60d7-472e-a79a-e3fa9de1dfad" providerId="ADAL" clId="{7EADAE9A-F2CD-4ADD-9950-0327C2C1326E}" dt="2023-05-25T18:33:43.355" v="5101"/>
-          <ac:picMkLst>
-            <pc:docMk/>
-            <pc:sldMk cId="2802503080" sldId="343"/>
-            <ac:picMk id="5" creationId="{980B26E2-E942-03E2-332E-0B3238BC5C4D}"/>
-          </ac:picMkLst>
-        </pc:picChg>
-        <pc:picChg chg="add del mod">
-          <ac:chgData name="Maxwell,Daniel" userId="1b6ea79d-60d7-472e-a79a-e3fa9de1dfad" providerId="ADAL" clId="{7EADAE9A-F2CD-4ADD-9950-0327C2C1326E}" dt="2023-05-25T18:33:59.323" v="5103"/>
-          <ac:picMkLst>
-            <pc:docMk/>
-            <pc:sldMk cId="2802503080" sldId="343"/>
-            <ac:picMk id="6" creationId="{9C8909E2-AA75-57EE-D2B8-4BCDEA8833E6}"/>
-          </ac:picMkLst>
-        </pc:picChg>
-        <pc:picChg chg="add del mod">
-          <ac:chgData name="Maxwell,Daniel" userId="1b6ea79d-60d7-472e-a79a-e3fa9de1dfad" providerId="ADAL" clId="{7EADAE9A-F2CD-4ADD-9950-0327C2C1326E}" dt="2023-05-25T18:34:09.615" v="5105"/>
-          <ac:picMkLst>
-            <pc:docMk/>
-            <pc:sldMk cId="2802503080" sldId="343"/>
-            <ac:picMk id="7" creationId="{2D85DD7D-8621-A0F7-8961-DD0B3F6000F8}"/>
-          </ac:picMkLst>
-        </pc:picChg>
-        <pc:picChg chg="add del mod">
-          <ac:chgData name="Maxwell,Daniel" userId="1b6ea79d-60d7-472e-a79a-e3fa9de1dfad" providerId="ADAL" clId="{7EADAE9A-F2CD-4ADD-9950-0327C2C1326E}" dt="2023-05-25T18:34:18.875" v="5107"/>
-          <ac:picMkLst>
-            <pc:docMk/>
-            <pc:sldMk cId="2802503080" sldId="343"/>
-            <ac:picMk id="8" creationId="{8A40D8ED-E36E-1399-08F1-50DB6AFE0376}"/>
-          </ac:picMkLst>
-        </pc:picChg>
-        <pc:picChg chg="add del mod">
-          <ac:chgData name="Maxwell,Daniel" userId="1b6ea79d-60d7-472e-a79a-e3fa9de1dfad" providerId="ADAL" clId="{7EADAE9A-F2CD-4ADD-9950-0327C2C1326E}" dt="2023-05-25T18:35:25.984" v="5109"/>
-          <ac:picMkLst>
-            <pc:docMk/>
-            <pc:sldMk cId="2802503080" sldId="343"/>
-            <ac:picMk id="9" creationId="{5ABE9464-EB68-A947-DF40-419FFE7683B2}"/>
-          </ac:picMkLst>
-        </pc:picChg>
-        <pc:picChg chg="add del mod">
-          <ac:chgData name="Maxwell,Daniel" userId="1b6ea79d-60d7-472e-a79a-e3fa9de1dfad" providerId="ADAL" clId="{7EADAE9A-F2CD-4ADD-9950-0327C2C1326E}" dt="2023-05-25T18:35:35.637" v="5111"/>
-          <ac:picMkLst>
-            <pc:docMk/>
-            <pc:sldMk cId="2802503080" sldId="343"/>
-            <ac:picMk id="10" creationId="{7D786223-BA37-74F1-BB84-4B2251D55456}"/>
-          </ac:picMkLst>
-        </pc:picChg>
-        <pc:picChg chg="add mod">
-          <ac:chgData name="Maxwell,Daniel" userId="1b6ea79d-60d7-472e-a79a-e3fa9de1dfad" providerId="ADAL" clId="{7EADAE9A-F2CD-4ADD-9950-0327C2C1326E}" dt="2023-05-25T18:35:48.919" v="5112"/>
-          <ac:picMkLst>
-            <pc:docMk/>
-            <pc:sldMk cId="2802503080" sldId="343"/>
-            <ac:picMk id="11" creationId="{2601D412-7803-D6FF-730A-7731BAB4C783}"/>
-          </ac:picMkLst>
-        </pc:picChg>
-      </pc:sldChg>
-    </pc:docChg>
-  </pc:docChgLst>
 </pc:chgInfo>
-</file>
-
-<file path=ppt/comments/modernComment_10F_8864FA49.xml><?xml version="1.0" encoding="utf-8"?>
-<p188:cmLst xmlns:a="http://schemas.openxmlformats.org/drawingml/2006/main" xmlns:r="http://schemas.openxmlformats.org/officeDocument/2006/relationships" xmlns:p188="http://schemas.microsoft.com/office/powerpoint/2018/8/main">
-  <p188:cm id="{E6BDAA77-A739-405A-B6BB-B3A25F33140A}" authorId="{639BEAC5-551A-FE83-9462-39A88DC71FF1}" created="2023-11-30T04:26:42.781">
-    <ac:txMkLst xmlns:ac="http://schemas.microsoft.com/office/drawing/2013/main/command">
-      <pc:docMk xmlns:pc="http://schemas.microsoft.com/office/powerpoint/2013/main/command"/>
-      <pc:sldMk xmlns:pc="http://schemas.microsoft.com/office/powerpoint/2013/main/command" cId="2288319049" sldId="271"/>
-      <ac:spMk id="3" creationId="{11742BE9-AE91-435E-9630-701F9E92A58A}"/>
-      <ac:txMk cp="159" len="16">
-        <ac:context len="245" hash="613445745"/>
-      </ac:txMk>
-    </ac:txMkLst>
-    <p188:pos x="8792307" y="2801815"/>
-    <p188:replyLst>
-      <p188:reply id="{DCE30F5A-8568-4A3C-8D4F-CAC1D5150671}" authorId="{F7096688-5493-9093-194A-FCDF45D02E2C}" created="2023-11-30T15:53:12.253">
-        <p188:txBody>
-          <a:bodyPr/>
-          <a:lstStyle/>
-          <a:p>
-            <a:r>
-              <a:rPr lang="en-US"/>
-              <a:t>This slide to be DELETED.</a:t>
-            </a:r>
-          </a:p>
-        </p188:txBody>
-      </p188:reply>
-    </p188:replyLst>
-    <p188:txBody>
-      <a:bodyPr/>
-      <a:lstStyle/>
-      <a:p>
-        <a:r>
-          <a:rPr lang="en-US"/>
-          <a:t>Suggest deleting this.</a:t>
-        </a:r>
-      </a:p>
-    </p188:txBody>
-  </p188:cm>
-</p188:cmLst>
 </file>
 
 <file path=ppt/comments/modernComment_111_74BFF989.xml><?xml version="1.0" encoding="utf-8"?>
 <p188:cmLst xmlns:a="http://schemas.openxmlformats.org/drawingml/2006/main" xmlns:r="http://schemas.openxmlformats.org/officeDocument/2006/relationships" xmlns:p188="http://schemas.microsoft.com/office/powerpoint/2018/8/main">
-  <p188:cm id="{279D8E60-1B1E-4A01-A3C3-6A6B0DC1111B}" authorId="{639BEAC5-551A-FE83-9462-39A88DC71FF1}" created="2023-11-30T04:28:43.941">
+  <p188:cm id="{279D8E60-1B1E-4A01-A3C3-6A6B0DC1111B}" authorId="{639BEAC5-551A-FE83-9462-39A88DC71FF1}" status="resolved" created="2023-11-30T04:28:43.941" complete="100000">
     <ac:txMkLst xmlns:ac="http://schemas.microsoft.com/office/drawing/2013/main/command">
       <pc:docMk xmlns:pc="http://schemas.microsoft.com/office/powerpoint/2013/main/command"/>
       <pc:sldMk xmlns:pc="http://schemas.microsoft.com/office/powerpoint/2013/main/command" cId="1958738313" sldId="273"/>
@@ -3564,7 +3549,7 @@
           <a:p>
             <a:fld id="{FD93C9B2-20F6-4DB1-B471-224337D0AC79}" type="datetimeFigureOut">
               <a:rPr lang="en-US" smtClean="0"/>
-              <a:t>11/30/2023</a:t>
+              <a:t>11/20/2024</a:t>
             </a:fld>
             <a:endParaRPr lang="en-US"/>
           </a:p>
@@ -6720,275 +6705,6 @@
 </p:notes>
 </file>
 
-<file path=ppt/notesSlides/notesSlide22.xml><?xml version="1.0" encoding="utf-8"?>
-<p:notes xmlns:a="http://schemas.openxmlformats.org/drawingml/2006/main" xmlns:r="http://schemas.openxmlformats.org/officeDocument/2006/relationships" xmlns:p="http://schemas.openxmlformats.org/presentationml/2006/main">
-  <p:cSld>
-    <p:spTree>
-      <p:nvGrpSpPr>
-        <p:cNvPr id="1" name=""/>
-        <p:cNvGrpSpPr/>
-        <p:nvPr/>
-      </p:nvGrpSpPr>
-      <p:grpSpPr>
-        <a:xfrm>
-          <a:off x="0" y="0"/>
-          <a:ext cx="0" cy="0"/>
-          <a:chOff x="0" y="0"/>
-          <a:chExt cx="0" cy="0"/>
-        </a:xfrm>
-      </p:grpSpPr>
-      <p:sp>
-        <p:nvSpPr>
-          <p:cNvPr id="2" name="Slide Image Placeholder 1"/>
-          <p:cNvSpPr>
-            <a:spLocks noGrp="1" noRot="1" noChangeAspect="1"/>
-          </p:cNvSpPr>
-          <p:nvPr>
-            <p:ph type="sldImg"/>
-          </p:nvPr>
-        </p:nvSpPr>
-        <p:spPr/>
-      </p:sp>
-      <p:sp>
-        <p:nvSpPr>
-          <p:cNvPr id="3" name="Notes Placeholder 2"/>
-          <p:cNvSpPr>
-            <a:spLocks noGrp="1"/>
-          </p:cNvSpPr>
-          <p:nvPr>
-            <p:ph type="body" idx="1"/>
-          </p:nvPr>
-        </p:nvSpPr>
-        <p:spPr/>
-        <p:txBody>
-          <a:bodyPr/>
-          <a:lstStyle/>
-          <a:p>
-            <a:pPr marL="0" indent="0">
-              <a:lnSpc>
-                <a:spcPct val="100000"/>
-              </a:lnSpc>
-              <a:buNone/>
-            </a:pPr>
-            <a:r>
-              <a:rPr lang="en-US">
-                <a:latin typeface="+mn-lt"/>
-              </a:rPr>
-              <a:t>And finally – and this is a unique feature not found any other language I know of – Python allows you to do multiple assignments in one line.</a:t>
-            </a:r>
-          </a:p>
-          <a:p>
-            <a:pPr marL="0" indent="0">
-              <a:lnSpc>
-                <a:spcPct val="100000"/>
-              </a:lnSpc>
-              <a:buNone/>
-            </a:pPr>
-            <a:endParaRPr lang="en-US">
-              <a:latin typeface="+mn-lt"/>
-            </a:endParaRPr>
-          </a:p>
-          <a:p>
-            <a:pPr marL="171450" indent="-171450">
-              <a:lnSpc>
-                <a:spcPct val="100000"/>
-              </a:lnSpc>
-              <a:buFont typeface="Courier New" panose="02070309020205020404" pitchFamily="49" charset="0"/>
-              <a:buChar char="o"/>
-            </a:pPr>
-            <a:r>
-              <a:rPr lang="en-US">
-                <a:latin typeface="+mn-lt"/>
-              </a:rPr>
-              <a:t>Assign</a:t>
-            </a:r>
-            <a:r>
-              <a:rPr lang="en-US">
-                <a:solidFill>
-                  <a:srgbClr val="65BB7B"/>
-                </a:solidFill>
-                <a:latin typeface="+mn-lt"/>
-              </a:rPr>
-              <a:t> </a:t>
-            </a:r>
-            <a:r>
-              <a:rPr lang="en-US">
-                <a:solidFill>
-                  <a:srgbClr val="5A5AA8"/>
-                </a:solidFill>
-                <a:latin typeface="+mn-lt"/>
-              </a:rPr>
-              <a:t>one</a:t>
-            </a:r>
-            <a:r>
-              <a:rPr lang="en-US">
-                <a:solidFill>
-                  <a:srgbClr val="65BB7B"/>
-                </a:solidFill>
-                <a:latin typeface="+mn-lt"/>
-              </a:rPr>
-              <a:t> </a:t>
-            </a:r>
-            <a:r>
-              <a:rPr lang="en-US">
-                <a:latin typeface="+mn-lt"/>
-              </a:rPr>
-              <a:t>value to </a:t>
-            </a:r>
-            <a:r>
-              <a:rPr lang="en-US">
-                <a:solidFill>
-                  <a:srgbClr val="5A5AA8"/>
-                </a:solidFill>
-                <a:latin typeface="+mn-lt"/>
-              </a:rPr>
-              <a:t>multiple</a:t>
-            </a:r>
-            <a:r>
-              <a:rPr lang="en-US">
-                <a:latin typeface="+mn-lt"/>
-              </a:rPr>
-              <a:t> variables: </a:t>
-            </a:r>
-            <a:r>
-              <a:rPr lang="en-US">
-                <a:solidFill>
-                  <a:srgbClr val="5A5AA8"/>
-                </a:solidFill>
-                <a:latin typeface="+mn-lt"/>
-              </a:rPr>
-              <a:t>x = y = z = 45</a:t>
-            </a:r>
-          </a:p>
-          <a:p>
-            <a:pPr marL="171450" indent="-171450">
-              <a:lnSpc>
-                <a:spcPct val="100000"/>
-              </a:lnSpc>
-              <a:buFont typeface="Courier New" panose="02070309020205020404" pitchFamily="49" charset="0"/>
-              <a:buChar char="o"/>
-            </a:pPr>
-            <a:r>
-              <a:rPr lang="en-US">
-                <a:latin typeface="+mn-lt"/>
-              </a:rPr>
-              <a:t>Assign </a:t>
-            </a:r>
-            <a:r>
-              <a:rPr lang="en-US">
-                <a:solidFill>
-                  <a:srgbClr val="5A5AA8"/>
-                </a:solidFill>
-                <a:latin typeface="+mn-lt"/>
-              </a:rPr>
-              <a:t>multiple</a:t>
-            </a:r>
-            <a:r>
-              <a:rPr lang="en-US">
-                <a:latin typeface="+mn-lt"/>
-              </a:rPr>
-              <a:t> values to </a:t>
-            </a:r>
-            <a:r>
-              <a:rPr lang="en-US">
-                <a:solidFill>
-                  <a:srgbClr val="5A5AA8"/>
-                </a:solidFill>
-                <a:latin typeface="+mn-lt"/>
-              </a:rPr>
-              <a:t>multiple</a:t>
-            </a:r>
-            <a:r>
-              <a:rPr lang="en-US">
-                <a:latin typeface="+mn-lt"/>
-              </a:rPr>
-              <a:t> variables </a:t>
-            </a:r>
-            <a:r>
-              <a:rPr lang="en-US">
-                <a:solidFill>
-                  <a:srgbClr val="5A5AA8"/>
-                </a:solidFill>
-                <a:latin typeface="+mn-lt"/>
-              </a:rPr>
-              <a:t>(very pythonic!):  x, y, z = 1, 2, 'banana’</a:t>
-            </a:r>
-          </a:p>
-          <a:p>
-            <a:pPr marL="628650" lvl="1" indent="-171450">
-              <a:lnSpc>
-                <a:spcPct val="100000"/>
-              </a:lnSpc>
-              <a:buFont typeface="Courier New" panose="02070309020205020404" pitchFamily="49" charset="0"/>
-              <a:buChar char="o"/>
-            </a:pPr>
-            <a:r>
-              <a:rPr lang="en-US">
-                <a:solidFill>
-                  <a:schemeClr val="tx1"/>
-                </a:solidFill>
-                <a:latin typeface="+mn-lt"/>
-              </a:rPr>
-              <a:t>This is super handy for data structures</a:t>
-            </a:r>
-            <a:endParaRPr lang="en-US">
-              <a:solidFill>
-                <a:srgbClr val="FF0000"/>
-              </a:solidFill>
-              <a:latin typeface="+mn-lt"/>
-            </a:endParaRPr>
-          </a:p>
-          <a:p>
-            <a:endParaRPr lang="en-US">
-              <a:latin typeface="+mn-lt"/>
-            </a:endParaRPr>
-          </a:p>
-          <a:p>
-            <a:r>
-              <a:rPr lang="en-US">
-                <a:latin typeface="+mn-lt"/>
-              </a:rPr>
-              <a:t>[NEXT SLIDE]</a:t>
-            </a:r>
-          </a:p>
-        </p:txBody>
-      </p:sp>
-      <p:sp>
-        <p:nvSpPr>
-          <p:cNvPr id="4" name="Slide Number Placeholder 3"/>
-          <p:cNvSpPr>
-            <a:spLocks noGrp="1"/>
-          </p:cNvSpPr>
-          <p:nvPr>
-            <p:ph type="sldNum" sz="quarter" idx="5"/>
-          </p:nvPr>
-        </p:nvSpPr>
-        <p:spPr/>
-        <p:txBody>
-          <a:bodyPr/>
-          <a:lstStyle/>
-          <a:p>
-            <a:fld id="{3148858F-F1DB-4027-9C85-CCA6849540DD}" type="slidenum">
-              <a:rPr lang="en-US" smtClean="0"/>
-              <a:t>23</a:t>
-            </a:fld>
-            <a:endParaRPr lang="en-US"/>
-          </a:p>
-        </p:txBody>
-      </p:sp>
-    </p:spTree>
-    <p:extLst>
-      <p:ext uri="{BB962C8B-B14F-4D97-AF65-F5344CB8AC3E}">
-        <p14:creationId xmlns:p14="http://schemas.microsoft.com/office/powerpoint/2010/main" val="4064635654"/>
-      </p:ext>
-    </p:extLst>
-  </p:cSld>
-  <p:clrMapOvr>
-    <a:masterClrMapping/>
-  </p:clrMapOvr>
-</p:notes>
-</file>
-
 <file path=ppt/notesSlides/notesSlide3.xml><?xml version="1.0" encoding="utf-8"?>
 <p:notes xmlns:a="http://schemas.openxmlformats.org/drawingml/2006/main" xmlns:r="http://schemas.openxmlformats.org/officeDocument/2006/relationships" xmlns:p="http://schemas.openxmlformats.org/presentationml/2006/main">
   <p:cSld>
@@ -8526,7 +8242,7 @@
           <a:p>
             <a:fld id="{C3F78080-8D0A-4BE8-A5B4-CB115102D524}" type="datetimeFigureOut">
               <a:rPr lang="en-US" smtClean="0"/>
-              <a:t>11/30/2023</a:t>
+              <a:t>11/20/2024</a:t>
             </a:fld>
             <a:endParaRPr lang="en-US"/>
           </a:p>
@@ -8724,7 +8440,7 @@
           <a:p>
             <a:fld id="{C3F78080-8D0A-4BE8-A5B4-CB115102D524}" type="datetimeFigureOut">
               <a:rPr lang="en-US" smtClean="0"/>
-              <a:t>11/30/2023</a:t>
+              <a:t>11/20/2024</a:t>
             </a:fld>
             <a:endParaRPr lang="en-US"/>
           </a:p>
@@ -8932,7 +8648,7 @@
           <a:p>
             <a:fld id="{C3F78080-8D0A-4BE8-A5B4-CB115102D524}" type="datetimeFigureOut">
               <a:rPr lang="en-US" smtClean="0"/>
-              <a:t>11/30/2023</a:t>
+              <a:t>11/20/2024</a:t>
             </a:fld>
             <a:endParaRPr lang="en-US"/>
           </a:p>
@@ -9130,7 +8846,7 @@
           <a:p>
             <a:fld id="{C3F78080-8D0A-4BE8-A5B4-CB115102D524}" type="datetimeFigureOut">
               <a:rPr lang="en-US" smtClean="0"/>
-              <a:t>11/30/2023</a:t>
+              <a:t>11/20/2024</a:t>
             </a:fld>
             <a:endParaRPr lang="en-US"/>
           </a:p>
@@ -9405,7 +9121,7 @@
           <a:p>
             <a:fld id="{C3F78080-8D0A-4BE8-A5B4-CB115102D524}" type="datetimeFigureOut">
               <a:rPr lang="en-US" smtClean="0"/>
-              <a:t>11/30/2023</a:t>
+              <a:t>11/20/2024</a:t>
             </a:fld>
             <a:endParaRPr lang="en-US"/>
           </a:p>
@@ -9670,7 +9386,7 @@
           <a:p>
             <a:fld id="{C3F78080-8D0A-4BE8-A5B4-CB115102D524}" type="datetimeFigureOut">
               <a:rPr lang="en-US" smtClean="0"/>
-              <a:t>11/30/2023</a:t>
+              <a:t>11/20/2024</a:t>
             </a:fld>
             <a:endParaRPr lang="en-US"/>
           </a:p>
@@ -10082,7 +9798,7 @@
           <a:p>
             <a:fld id="{C3F78080-8D0A-4BE8-A5B4-CB115102D524}" type="datetimeFigureOut">
               <a:rPr lang="en-US" smtClean="0"/>
-              <a:t>11/30/2023</a:t>
+              <a:t>11/20/2024</a:t>
             </a:fld>
             <a:endParaRPr lang="en-US"/>
           </a:p>
@@ -10223,7 +9939,7 @@
           <a:p>
             <a:fld id="{C3F78080-8D0A-4BE8-A5B4-CB115102D524}" type="datetimeFigureOut">
               <a:rPr lang="en-US" smtClean="0"/>
-              <a:t>11/30/2023</a:t>
+              <a:t>11/20/2024</a:t>
             </a:fld>
             <a:endParaRPr lang="en-US"/>
           </a:p>
@@ -10336,7 +10052,7 @@
           <a:p>
             <a:fld id="{C3F78080-8D0A-4BE8-A5B4-CB115102D524}" type="datetimeFigureOut">
               <a:rPr lang="en-US" smtClean="0"/>
-              <a:t>11/30/2023</a:t>
+              <a:t>11/20/2024</a:t>
             </a:fld>
             <a:endParaRPr lang="en-US"/>
           </a:p>
@@ -10647,7 +10363,7 @@
           <a:p>
             <a:fld id="{C3F78080-8D0A-4BE8-A5B4-CB115102D524}" type="datetimeFigureOut">
               <a:rPr lang="en-US" smtClean="0"/>
-              <a:t>11/30/2023</a:t>
+              <a:t>11/20/2024</a:t>
             </a:fld>
             <a:endParaRPr lang="en-US"/>
           </a:p>
@@ -10935,7 +10651,7 @@
           <a:p>
             <a:fld id="{C3F78080-8D0A-4BE8-A5B4-CB115102D524}" type="datetimeFigureOut">
               <a:rPr lang="en-US" smtClean="0"/>
-              <a:t>11/30/2023</a:t>
+              <a:t>11/20/2024</a:t>
             </a:fld>
             <a:endParaRPr lang="en-US"/>
           </a:p>
@@ -11176,7 +10892,7 @@
           <a:p>
             <a:fld id="{C3F78080-8D0A-4BE8-A5B4-CB115102D524}" type="datetimeFigureOut">
               <a:rPr lang="en-US" smtClean="0"/>
-              <a:t>11/30/2023</a:t>
+              <a:t>11/20/2024</a:t>
             </a:fld>
             <a:endParaRPr lang="en-US"/>
           </a:p>
@@ -22777,926 +22493,6 @@
 </p:sld>
 </file>
 
-<file path=ppt/slides/slide22.xml><?xml version="1.0" encoding="utf-8"?>
-<p:sld xmlns:a="http://schemas.openxmlformats.org/drawingml/2006/main" xmlns:r="http://schemas.openxmlformats.org/officeDocument/2006/relationships" xmlns:p="http://schemas.openxmlformats.org/presentationml/2006/main">
-  <p:cSld>
-    <p:spTree>
-      <p:nvGrpSpPr>
-        <p:cNvPr id="1" name=""/>
-        <p:cNvGrpSpPr/>
-        <p:nvPr/>
-      </p:nvGrpSpPr>
-      <p:grpSpPr>
-        <a:xfrm>
-          <a:off x="0" y="0"/>
-          <a:ext cx="0" cy="0"/>
-          <a:chOff x="0" y="0"/>
-          <a:chExt cx="0" cy="0"/>
-        </a:xfrm>
-      </p:grpSpPr>
-    </p:spTree>
-    <p:extLst>
-      <p:ext uri="{BB962C8B-B14F-4D97-AF65-F5344CB8AC3E}">
-        <p14:creationId xmlns:p14="http://schemas.microsoft.com/office/powerpoint/2010/main" val="4273893588"/>
-      </p:ext>
-    </p:extLst>
-  </p:cSld>
-  <p:clrMapOvr>
-    <a:masterClrMapping/>
-  </p:clrMapOvr>
-</p:sld>
-</file>
-
-<file path=ppt/slides/slide23.xml><?xml version="1.0" encoding="utf-8"?>
-<p:sld xmlns:a="http://schemas.openxmlformats.org/drawingml/2006/main" xmlns:r="http://schemas.openxmlformats.org/officeDocument/2006/relationships" xmlns:p="http://schemas.openxmlformats.org/presentationml/2006/main">
-  <p:cSld>
-    <p:spTree>
-      <p:nvGrpSpPr>
-        <p:cNvPr id="1" name=""/>
-        <p:cNvGrpSpPr/>
-        <p:nvPr/>
-      </p:nvGrpSpPr>
-      <p:grpSpPr>
-        <a:xfrm>
-          <a:off x="0" y="0"/>
-          <a:ext cx="0" cy="0"/>
-          <a:chOff x="0" y="0"/>
-          <a:chExt cx="0" cy="0"/>
-        </a:xfrm>
-      </p:grpSpPr>
-      <p:sp>
-        <p:nvSpPr>
-          <p:cNvPr id="2" name="Title 1">
-            <a:extLst>
-              <a:ext uri="{FF2B5EF4-FFF2-40B4-BE49-F238E27FC236}">
-                <a16:creationId xmlns:a16="http://schemas.microsoft.com/office/drawing/2014/main" id="{6BFBBFF4-20D4-4911-B124-201441D4F8A6}"/>
-              </a:ext>
-            </a:extLst>
-          </p:cNvPr>
-          <p:cNvSpPr>
-            <a:spLocks noGrp="1"/>
-          </p:cNvSpPr>
-          <p:nvPr>
-            <p:ph type="title"/>
-          </p:nvPr>
-        </p:nvSpPr>
-        <p:spPr/>
-        <p:txBody>
-          <a:bodyPr>
-            <a:normAutofit/>
-          </a:bodyPr>
-          <a:lstStyle/>
-          <a:p>
-            <a:pPr algn="ctr"/>
-            <a:r>
-              <a:rPr lang="en-US" sz="3600" b="1" dirty="0">
-                <a:latin typeface="Avenir Black" panose="02000503020000020003" pitchFamily="2" charset="0"/>
-              </a:rPr>
-              <a:t>Multiple assignment in Python</a:t>
-            </a:r>
-          </a:p>
-        </p:txBody>
-      </p:sp>
-      <p:sp>
-        <p:nvSpPr>
-          <p:cNvPr id="3" name="Content Placeholder 2">
-            <a:extLst>
-              <a:ext uri="{FF2B5EF4-FFF2-40B4-BE49-F238E27FC236}">
-                <a16:creationId xmlns:a16="http://schemas.microsoft.com/office/drawing/2014/main" id="{11742BE9-AE91-435E-9630-701F9E92A58A}"/>
-              </a:ext>
-            </a:extLst>
-          </p:cNvPr>
-          <p:cNvSpPr>
-            <a:spLocks noGrp="1"/>
-          </p:cNvSpPr>
-          <p:nvPr>
-            <p:ph idx="1"/>
-          </p:nvPr>
-        </p:nvSpPr>
-        <p:spPr>
-          <a:xfrm>
-            <a:off x="838200" y="1690689"/>
-            <a:ext cx="10515600" cy="4628580"/>
-          </a:xfrm>
-        </p:spPr>
-        <p:txBody>
-          <a:bodyPr>
-            <a:normAutofit lnSpcReduction="10000"/>
-          </a:bodyPr>
-          <a:lstStyle/>
-          <a:p>
-            <a:pPr marL="0" indent="0">
-              <a:lnSpc>
-                <a:spcPct val="100000"/>
-              </a:lnSpc>
-              <a:buNone/>
-            </a:pPr>
-            <a:r>
-              <a:rPr lang="en-US" dirty="0">
-                <a:latin typeface="Avenir" panose="02000503020000020003" pitchFamily="2" charset="0"/>
-              </a:rPr>
-              <a:t>Python allows you to do multiple assignments in one line</a:t>
-            </a:r>
-          </a:p>
-          <a:p>
-            <a:pPr marL="0" indent="0">
-              <a:lnSpc>
-                <a:spcPct val="100000"/>
-              </a:lnSpc>
-              <a:buNone/>
-            </a:pPr>
-            <a:endParaRPr lang="en-US" dirty="0">
-              <a:latin typeface="Avenir" panose="02000503020000020003" pitchFamily="2" charset="0"/>
-            </a:endParaRPr>
-          </a:p>
-          <a:p>
-            <a:pPr lvl="1">
-              <a:lnSpc>
-                <a:spcPct val="100000"/>
-              </a:lnSpc>
-            </a:pPr>
-            <a:r>
-              <a:rPr lang="en-US" dirty="0">
-                <a:latin typeface="Avenir" panose="02000503020000020003" pitchFamily="2" charset="0"/>
-              </a:rPr>
-              <a:t>Assign</a:t>
-            </a:r>
-            <a:r>
-              <a:rPr lang="en-US" dirty="0">
-                <a:solidFill>
-                  <a:srgbClr val="65BB7B"/>
-                </a:solidFill>
-                <a:latin typeface="Avenir" panose="02000503020000020003" pitchFamily="2" charset="0"/>
-              </a:rPr>
-              <a:t> </a:t>
-            </a:r>
-            <a:r>
-              <a:rPr lang="en-US" dirty="0">
-                <a:solidFill>
-                  <a:srgbClr val="5A5AA8"/>
-                </a:solidFill>
-                <a:latin typeface="Avenir" panose="02000503020000020003" pitchFamily="2" charset="0"/>
-              </a:rPr>
-              <a:t>one</a:t>
-            </a:r>
-            <a:r>
-              <a:rPr lang="en-US" dirty="0">
-                <a:solidFill>
-                  <a:srgbClr val="65BB7B"/>
-                </a:solidFill>
-                <a:latin typeface="Avenir" panose="02000503020000020003" pitchFamily="2" charset="0"/>
-              </a:rPr>
-              <a:t> </a:t>
-            </a:r>
-            <a:r>
-              <a:rPr lang="en-US" dirty="0">
-                <a:latin typeface="Avenir" panose="02000503020000020003" pitchFamily="2" charset="0"/>
-              </a:rPr>
-              <a:t>value to </a:t>
-            </a:r>
-            <a:r>
-              <a:rPr lang="en-US" dirty="0">
-                <a:solidFill>
-                  <a:srgbClr val="5A5AA8"/>
-                </a:solidFill>
-                <a:latin typeface="Avenir" panose="02000503020000020003" pitchFamily="2" charset="0"/>
-              </a:rPr>
-              <a:t>multiple</a:t>
-            </a:r>
-            <a:r>
-              <a:rPr lang="en-US" dirty="0">
-                <a:latin typeface="Avenir" panose="02000503020000020003" pitchFamily="2" charset="0"/>
-              </a:rPr>
-              <a:t> variables</a:t>
-            </a:r>
-          </a:p>
-          <a:p>
-            <a:pPr marL="342900" lvl="1" indent="0">
-              <a:lnSpc>
-                <a:spcPct val="100000"/>
-              </a:lnSpc>
-              <a:buNone/>
-            </a:pPr>
-            <a:br>
-              <a:rPr lang="en-US" dirty="0">
-                <a:latin typeface="Avenir" panose="02000503020000020003" pitchFamily="2" charset="0"/>
-              </a:rPr>
-            </a:br>
-            <a:r>
-              <a:rPr lang="en-US" dirty="0">
-                <a:solidFill>
-                  <a:srgbClr val="5A5AA8"/>
-                </a:solidFill>
-                <a:latin typeface="Avenir" panose="02000503020000020003" pitchFamily="2" charset="0"/>
-              </a:rPr>
-              <a:t>x = y = z = 45</a:t>
-            </a:r>
-          </a:p>
-          <a:p>
-            <a:pPr lvl="1">
-              <a:lnSpc>
-                <a:spcPct val="100000"/>
-              </a:lnSpc>
-            </a:pPr>
-            <a:endParaRPr lang="en-US" dirty="0">
-              <a:latin typeface="Avenir" panose="02000503020000020003" pitchFamily="2" charset="0"/>
-            </a:endParaRPr>
-          </a:p>
-          <a:p>
-            <a:pPr lvl="1">
-              <a:lnSpc>
-                <a:spcPct val="100000"/>
-              </a:lnSpc>
-            </a:pPr>
-            <a:r>
-              <a:rPr lang="en-US" dirty="0">
-                <a:latin typeface="Avenir" panose="02000503020000020003" pitchFamily="2" charset="0"/>
-              </a:rPr>
-              <a:t>Assign </a:t>
-            </a:r>
-            <a:r>
-              <a:rPr lang="en-US" dirty="0">
-                <a:solidFill>
-                  <a:srgbClr val="5A5AA8"/>
-                </a:solidFill>
-                <a:latin typeface="Avenir" panose="02000503020000020003" pitchFamily="2" charset="0"/>
-              </a:rPr>
-              <a:t>multiple</a:t>
-            </a:r>
-            <a:r>
-              <a:rPr lang="en-US" dirty="0">
-                <a:latin typeface="Avenir" panose="02000503020000020003" pitchFamily="2" charset="0"/>
-              </a:rPr>
-              <a:t> values to </a:t>
-            </a:r>
-            <a:r>
-              <a:rPr lang="en-US" dirty="0">
-                <a:solidFill>
-                  <a:srgbClr val="5A5AA8"/>
-                </a:solidFill>
-                <a:latin typeface="Avenir" panose="02000503020000020003" pitchFamily="2" charset="0"/>
-              </a:rPr>
-              <a:t>multiple</a:t>
-            </a:r>
-            <a:r>
-              <a:rPr lang="en-US" dirty="0">
-                <a:latin typeface="Avenir" panose="02000503020000020003" pitchFamily="2" charset="0"/>
-              </a:rPr>
-              <a:t> variables </a:t>
-            </a:r>
-            <a:r>
-              <a:rPr lang="en-US" dirty="0">
-                <a:solidFill>
-                  <a:srgbClr val="5A5AA8"/>
-                </a:solidFill>
-                <a:latin typeface="Avenir" panose="02000503020000020003" pitchFamily="2" charset="0"/>
-              </a:rPr>
-              <a:t>(very pythonic!)</a:t>
-            </a:r>
-          </a:p>
-          <a:p>
-            <a:pPr marL="342900" lvl="1" indent="0">
-              <a:lnSpc>
-                <a:spcPct val="100000"/>
-              </a:lnSpc>
-              <a:buNone/>
-            </a:pPr>
-            <a:br>
-              <a:rPr lang="en-US" dirty="0">
-                <a:latin typeface="Avenir" panose="02000503020000020003" pitchFamily="2" charset="0"/>
-              </a:rPr>
-            </a:br>
-            <a:r>
-              <a:rPr lang="en-US" dirty="0">
-                <a:solidFill>
-                  <a:srgbClr val="5A5AA8"/>
-                </a:solidFill>
-                <a:latin typeface="Avenir" panose="02000503020000020003" pitchFamily="2" charset="0"/>
-              </a:rPr>
-              <a:t>x, y, z = 1, 2, 'banana'</a:t>
-            </a:r>
-          </a:p>
-          <a:p>
-            <a:pPr lvl="2">
-              <a:lnSpc>
-                <a:spcPct val="100000"/>
-              </a:lnSpc>
-            </a:pPr>
-            <a:endParaRPr lang="en-US" dirty="0">
-              <a:solidFill>
-                <a:srgbClr val="92D050"/>
-              </a:solidFill>
-              <a:latin typeface="Avenir" panose="02000503020000020003" pitchFamily="2" charset="0"/>
-            </a:endParaRPr>
-          </a:p>
-          <a:p>
-            <a:pPr lvl="2">
-              <a:lnSpc>
-                <a:spcPct val="100000"/>
-              </a:lnSpc>
-            </a:pPr>
-            <a:r>
-              <a:rPr lang="en-US" dirty="0">
-                <a:solidFill>
-                  <a:schemeClr val="tx1"/>
-                </a:solidFill>
-                <a:latin typeface="Avenir" panose="02000503020000020003" pitchFamily="2" charset="0"/>
-              </a:rPr>
-              <a:t>This is super handy for data structures</a:t>
-            </a:r>
-            <a:endParaRPr lang="en-US" dirty="0">
-              <a:solidFill>
-                <a:srgbClr val="FF0000"/>
-              </a:solidFill>
-              <a:latin typeface="Avenir" panose="02000503020000020003" pitchFamily="2" charset="0"/>
-            </a:endParaRPr>
-          </a:p>
-          <a:p>
-            <a:pPr lvl="1">
-              <a:lnSpc>
-                <a:spcPct val="100000"/>
-              </a:lnSpc>
-            </a:pPr>
-            <a:endParaRPr lang="en-US" dirty="0">
-              <a:latin typeface="Avenir" panose="02000503020000020003" pitchFamily="2" charset="0"/>
-            </a:endParaRPr>
-          </a:p>
-          <a:p>
-            <a:pPr lvl="1">
-              <a:lnSpc>
-                <a:spcPct val="100000"/>
-              </a:lnSpc>
-            </a:pPr>
-            <a:endParaRPr lang="en-US" dirty="0">
-              <a:latin typeface="Avenir" panose="02000503020000020003" pitchFamily="2" charset="0"/>
-            </a:endParaRPr>
-          </a:p>
-        </p:txBody>
-      </p:sp>
-      <p:pic>
-        <p:nvPicPr>
-          <p:cNvPr id="4" name="Picture 3">
-            <a:extLst>
-              <a:ext uri="{FF2B5EF4-FFF2-40B4-BE49-F238E27FC236}">
-                <a16:creationId xmlns:a16="http://schemas.microsoft.com/office/drawing/2014/main" id="{712808EE-9951-9E2D-8475-B384EE9C9437}"/>
-              </a:ext>
-              <a:ext uri="{C183D7F6-B498-43B3-948B-1728B52AA6E4}">
-                <adec:decorative xmlns:adec="http://schemas.microsoft.com/office/drawing/2017/decorative" val="1"/>
-              </a:ext>
-            </a:extLst>
-          </p:cNvPr>
-          <p:cNvPicPr>
-            <a:picLocks noChangeAspect="1"/>
-          </p:cNvPicPr>
-          <p:nvPr/>
-        </p:nvPicPr>
-        <p:blipFill>
-          <a:blip r:embed="rId5">
-            <a:extLst>
-              <a:ext uri="{28A0092B-C50C-407E-A947-70E740481C1C}">
-                <a14:useLocalDpi xmlns:a14="http://schemas.microsoft.com/office/drawing/2010/main" val="0"/>
-              </a:ext>
-            </a:extLst>
-          </a:blip>
-          <a:stretch>
-            <a:fillRect/>
-          </a:stretch>
-        </p:blipFill>
-        <p:spPr>
-          <a:xfrm>
-            <a:off x="11378037" y="6031948"/>
-            <a:ext cx="800100" cy="812800"/>
-          </a:xfrm>
-          <a:prstGeom prst="rect">
-            <a:avLst/>
-          </a:prstGeom>
-        </p:spPr>
-      </p:pic>
-      <p:sp>
-        <p:nvSpPr>
-          <p:cNvPr id="5" name="TextBox 4">
-            <a:extLst>
-              <a:ext uri="{FF2B5EF4-FFF2-40B4-BE49-F238E27FC236}">
-                <a16:creationId xmlns:a16="http://schemas.microsoft.com/office/drawing/2014/main" id="{E2E80E2E-17C6-5C5F-46CF-95BD82F6E2D3}"/>
-              </a:ext>
-            </a:extLst>
-          </p:cNvPr>
-          <p:cNvSpPr txBox="1"/>
-          <p:nvPr/>
-        </p:nvSpPr>
-        <p:spPr>
-          <a:xfrm>
-            <a:off x="1" y="2783663"/>
-            <a:ext cx="12178136" cy="1446550"/>
-          </a:xfrm>
-          <a:prstGeom prst="rect">
-            <a:avLst/>
-          </a:prstGeom>
-          <a:noFill/>
-        </p:spPr>
-        <p:txBody>
-          <a:bodyPr wrap="square" rtlCol="0">
-            <a:spAutoFit/>
-          </a:bodyPr>
-          <a:lstStyle/>
-          <a:p>
-            <a:pPr algn="ctr"/>
-            <a:r>
-              <a:rPr lang="en-US" sz="8800" dirty="0">
-                <a:solidFill>
-                  <a:schemeClr val="tx1">
-                    <a:lumMod val="50000"/>
-                    <a:lumOff val="50000"/>
-                  </a:schemeClr>
-                </a:solidFill>
-              </a:rPr>
-              <a:t>Deleted</a:t>
-            </a:r>
-          </a:p>
-        </p:txBody>
-      </p:sp>
-    </p:spTree>
-    <p:custDataLst>
-      <p:tags r:id="rId1"/>
-    </p:custDataLst>
-    <p:extLst>
-      <p:ext uri="{BB962C8B-B14F-4D97-AF65-F5344CB8AC3E}">
-        <p14:creationId xmlns:p14="http://schemas.microsoft.com/office/powerpoint/2010/main" val="2288319049"/>
-      </p:ext>
-    </p:extLst>
-  </p:cSld>
-  <p:clrMapOvr>
-    <a:masterClrMapping/>
-  </p:clrMapOvr>
-  <p:timing>
-    <p:tnLst>
-      <p:par>
-        <p:cTn id="1" dur="indefinite" restart="never" nodeType="tmRoot">
-          <p:childTnLst>
-            <p:seq concurrent="1" nextAc="seek">
-              <p:cTn id="2" dur="indefinite" nodeType="mainSeq">
-                <p:childTnLst>
-                  <p:par>
-                    <p:cTn id="3" fill="hold">
-                      <p:stCondLst>
-                        <p:cond delay="indefinite"/>
-                      </p:stCondLst>
-                      <p:childTnLst>
-                        <p:par>
-                          <p:cTn id="4" fill="hold">
-                            <p:stCondLst>
-                              <p:cond delay="0"/>
-                            </p:stCondLst>
-                            <p:childTnLst>
-                              <p:par>
-                                <p:cTn id="5" presetID="2" presetClass="entr" presetSubtype="4" fill="hold" nodeType="clickEffect">
-                                  <p:stCondLst>
-                                    <p:cond delay="0"/>
-                                  </p:stCondLst>
-                                  <p:childTnLst>
-                                    <p:set>
-                                      <p:cBhvr>
-                                        <p:cTn id="6" dur="1" fill="hold">
-                                          <p:stCondLst>
-                                            <p:cond delay="0"/>
-                                          </p:stCondLst>
-                                        </p:cTn>
-                                        <p:tgtEl>
-                                          <p:spTgt spid="3">
-                                            <p:txEl>
-                                              <p:pRg st="2" end="2"/>
-                                            </p:txEl>
-                                          </p:spTgt>
-                                        </p:tgtEl>
-                                        <p:attrNameLst>
-                                          <p:attrName>style.visibility</p:attrName>
-                                        </p:attrNameLst>
-                                      </p:cBhvr>
-                                      <p:to>
-                                        <p:strVal val="visible"/>
-                                      </p:to>
-                                    </p:set>
-                                    <p:anim calcmode="lin" valueType="num">
-                                      <p:cBhvr additive="base">
-                                        <p:cTn id="7" dur="500" fill="hold"/>
-                                        <p:tgtEl>
-                                          <p:spTgt spid="3">
-                                            <p:txEl>
-                                              <p:pRg st="2" end="2"/>
-                                            </p:txEl>
-                                          </p:spTgt>
-                                        </p:tgtEl>
-                                        <p:attrNameLst>
-                                          <p:attrName>ppt_x</p:attrName>
-                                        </p:attrNameLst>
-                                      </p:cBhvr>
-                                      <p:tavLst>
-                                        <p:tav tm="0">
-                                          <p:val>
-                                            <p:strVal val="#ppt_x"/>
-                                          </p:val>
-                                        </p:tav>
-                                        <p:tav tm="100000">
-                                          <p:val>
-                                            <p:strVal val="#ppt_x"/>
-                                          </p:val>
-                                        </p:tav>
-                                      </p:tavLst>
-                                    </p:anim>
-                                    <p:anim calcmode="lin" valueType="num">
-                                      <p:cBhvr additive="base">
-                                        <p:cTn id="8" dur="500" fill="hold"/>
-                                        <p:tgtEl>
-                                          <p:spTgt spid="3">
-                                            <p:txEl>
-                                              <p:pRg st="2" end="2"/>
-                                            </p:txEl>
-                                          </p:spTgt>
-                                        </p:tgtEl>
-                                        <p:attrNameLst>
-                                          <p:attrName>ppt_y</p:attrName>
-                                        </p:attrNameLst>
-                                      </p:cBhvr>
-                                      <p:tavLst>
-                                        <p:tav tm="0">
-                                          <p:val>
-                                            <p:strVal val="1+#ppt_h/2"/>
-                                          </p:val>
-                                        </p:tav>
-                                        <p:tav tm="100000">
-                                          <p:val>
-                                            <p:strVal val="#ppt_y"/>
-                                          </p:val>
-                                        </p:tav>
-                                      </p:tavLst>
-                                    </p:anim>
-                                  </p:childTnLst>
-                                </p:cTn>
-                              </p:par>
-                            </p:childTnLst>
-                          </p:cTn>
-                        </p:par>
-                      </p:childTnLst>
-                    </p:cTn>
-                  </p:par>
-                  <p:par>
-                    <p:cTn id="9" fill="hold">
-                      <p:stCondLst>
-                        <p:cond delay="indefinite"/>
-                      </p:stCondLst>
-                      <p:childTnLst>
-                        <p:par>
-                          <p:cTn id="10" fill="hold">
-                            <p:stCondLst>
-                              <p:cond delay="0"/>
-                            </p:stCondLst>
-                            <p:childTnLst>
-                              <p:par>
-                                <p:cTn id="11" presetID="10" presetClass="entr" presetSubtype="0" fill="hold" nodeType="clickEffect">
-                                  <p:stCondLst>
-                                    <p:cond delay="0"/>
-                                  </p:stCondLst>
-                                  <p:childTnLst>
-                                    <p:set>
-                                      <p:cBhvr>
-                                        <p:cTn id="12" dur="1" fill="hold">
-                                          <p:stCondLst>
-                                            <p:cond delay="0"/>
-                                          </p:stCondLst>
-                                        </p:cTn>
-                                        <p:tgtEl>
-                                          <p:spTgt spid="3">
-                                            <p:txEl>
-                                              <p:pRg st="3" end="3"/>
-                                            </p:txEl>
-                                          </p:spTgt>
-                                        </p:tgtEl>
-                                        <p:attrNameLst>
-                                          <p:attrName>style.visibility</p:attrName>
-                                        </p:attrNameLst>
-                                      </p:cBhvr>
-                                      <p:to>
-                                        <p:strVal val="visible"/>
-                                      </p:to>
-                                    </p:set>
-                                    <p:animEffect transition="in" filter="fade">
-                                      <p:cBhvr>
-                                        <p:cTn id="13" dur="500"/>
-                                        <p:tgtEl>
-                                          <p:spTgt spid="3">
-                                            <p:txEl>
-                                              <p:pRg st="3" end="3"/>
-                                            </p:txEl>
-                                          </p:spTgt>
-                                        </p:tgtEl>
-                                      </p:cBhvr>
-                                    </p:animEffect>
-                                  </p:childTnLst>
-                                </p:cTn>
-                              </p:par>
-                            </p:childTnLst>
-                          </p:cTn>
-                        </p:par>
-                      </p:childTnLst>
-                    </p:cTn>
-                  </p:par>
-                  <p:par>
-                    <p:cTn id="14" fill="hold">
-                      <p:stCondLst>
-                        <p:cond delay="indefinite"/>
-                      </p:stCondLst>
-                      <p:childTnLst>
-                        <p:par>
-                          <p:cTn id="15" fill="hold">
-                            <p:stCondLst>
-                              <p:cond delay="0"/>
-                            </p:stCondLst>
-                            <p:childTnLst>
-                              <p:par>
-                                <p:cTn id="16" presetID="2" presetClass="entr" presetSubtype="4" fill="hold" nodeType="clickEffect">
-                                  <p:stCondLst>
-                                    <p:cond delay="0"/>
-                                  </p:stCondLst>
-                                  <p:childTnLst>
-                                    <p:set>
-                                      <p:cBhvr>
-                                        <p:cTn id="17" dur="1" fill="hold">
-                                          <p:stCondLst>
-                                            <p:cond delay="0"/>
-                                          </p:stCondLst>
-                                        </p:cTn>
-                                        <p:tgtEl>
-                                          <p:spTgt spid="3">
-                                            <p:txEl>
-                                              <p:pRg st="5" end="5"/>
-                                            </p:txEl>
-                                          </p:spTgt>
-                                        </p:tgtEl>
-                                        <p:attrNameLst>
-                                          <p:attrName>style.visibility</p:attrName>
-                                        </p:attrNameLst>
-                                      </p:cBhvr>
-                                      <p:to>
-                                        <p:strVal val="visible"/>
-                                      </p:to>
-                                    </p:set>
-                                    <p:anim calcmode="lin" valueType="num">
-                                      <p:cBhvr additive="base">
-                                        <p:cTn id="18" dur="500" fill="hold"/>
-                                        <p:tgtEl>
-                                          <p:spTgt spid="3">
-                                            <p:txEl>
-                                              <p:pRg st="5" end="5"/>
-                                            </p:txEl>
-                                          </p:spTgt>
-                                        </p:tgtEl>
-                                        <p:attrNameLst>
-                                          <p:attrName>ppt_x</p:attrName>
-                                        </p:attrNameLst>
-                                      </p:cBhvr>
-                                      <p:tavLst>
-                                        <p:tav tm="0">
-                                          <p:val>
-                                            <p:strVal val="#ppt_x"/>
-                                          </p:val>
-                                        </p:tav>
-                                        <p:tav tm="100000">
-                                          <p:val>
-                                            <p:strVal val="#ppt_x"/>
-                                          </p:val>
-                                        </p:tav>
-                                      </p:tavLst>
-                                    </p:anim>
-                                    <p:anim calcmode="lin" valueType="num">
-                                      <p:cBhvr additive="base">
-                                        <p:cTn id="19" dur="500" fill="hold"/>
-                                        <p:tgtEl>
-                                          <p:spTgt spid="3">
-                                            <p:txEl>
-                                              <p:pRg st="5" end="5"/>
-                                            </p:txEl>
-                                          </p:spTgt>
-                                        </p:tgtEl>
-                                        <p:attrNameLst>
-                                          <p:attrName>ppt_y</p:attrName>
-                                        </p:attrNameLst>
-                                      </p:cBhvr>
-                                      <p:tavLst>
-                                        <p:tav tm="0">
-                                          <p:val>
-                                            <p:strVal val="1+#ppt_h/2"/>
-                                          </p:val>
-                                        </p:tav>
-                                        <p:tav tm="100000">
-                                          <p:val>
-                                            <p:strVal val="#ppt_y"/>
-                                          </p:val>
-                                        </p:tav>
-                                      </p:tavLst>
-                                    </p:anim>
-                                  </p:childTnLst>
-                                </p:cTn>
-                              </p:par>
-                            </p:childTnLst>
-                          </p:cTn>
-                        </p:par>
-                      </p:childTnLst>
-                    </p:cTn>
-                  </p:par>
-                  <p:par>
-                    <p:cTn id="20" fill="hold">
-                      <p:stCondLst>
-                        <p:cond delay="indefinite"/>
-                      </p:stCondLst>
-                      <p:childTnLst>
-                        <p:par>
-                          <p:cTn id="21" fill="hold">
-                            <p:stCondLst>
-                              <p:cond delay="0"/>
-                            </p:stCondLst>
-                            <p:childTnLst>
-                              <p:par>
-                                <p:cTn id="22" presetID="2" presetClass="entr" presetSubtype="4" fill="hold" nodeType="clickEffect">
-                                  <p:stCondLst>
-                                    <p:cond delay="0"/>
-                                  </p:stCondLst>
-                                  <p:childTnLst>
-                                    <p:set>
-                                      <p:cBhvr>
-                                        <p:cTn id="23" dur="1" fill="hold">
-                                          <p:stCondLst>
-                                            <p:cond delay="0"/>
-                                          </p:stCondLst>
-                                        </p:cTn>
-                                        <p:tgtEl>
-                                          <p:spTgt spid="3">
-                                            <p:txEl>
-                                              <p:pRg st="6" end="6"/>
-                                            </p:txEl>
-                                          </p:spTgt>
-                                        </p:tgtEl>
-                                        <p:attrNameLst>
-                                          <p:attrName>style.visibility</p:attrName>
-                                        </p:attrNameLst>
-                                      </p:cBhvr>
-                                      <p:to>
-                                        <p:strVal val="visible"/>
-                                      </p:to>
-                                    </p:set>
-                                    <p:anim calcmode="lin" valueType="num">
-                                      <p:cBhvr additive="base">
-                                        <p:cTn id="24" dur="500" fill="hold"/>
-                                        <p:tgtEl>
-                                          <p:spTgt spid="3">
-                                            <p:txEl>
-                                              <p:pRg st="6" end="6"/>
-                                            </p:txEl>
-                                          </p:spTgt>
-                                        </p:tgtEl>
-                                        <p:attrNameLst>
-                                          <p:attrName>ppt_x</p:attrName>
-                                        </p:attrNameLst>
-                                      </p:cBhvr>
-                                      <p:tavLst>
-                                        <p:tav tm="0">
-                                          <p:val>
-                                            <p:strVal val="#ppt_x"/>
-                                          </p:val>
-                                        </p:tav>
-                                        <p:tav tm="100000">
-                                          <p:val>
-                                            <p:strVal val="#ppt_x"/>
-                                          </p:val>
-                                        </p:tav>
-                                      </p:tavLst>
-                                    </p:anim>
-                                    <p:anim calcmode="lin" valueType="num">
-                                      <p:cBhvr additive="base">
-                                        <p:cTn id="25" dur="500" fill="hold"/>
-                                        <p:tgtEl>
-                                          <p:spTgt spid="3">
-                                            <p:txEl>
-                                              <p:pRg st="6" end="6"/>
-                                            </p:txEl>
-                                          </p:spTgt>
-                                        </p:tgtEl>
-                                        <p:attrNameLst>
-                                          <p:attrName>ppt_y</p:attrName>
-                                        </p:attrNameLst>
-                                      </p:cBhvr>
-                                      <p:tavLst>
-                                        <p:tav tm="0">
-                                          <p:val>
-                                            <p:strVal val="1+#ppt_h/2"/>
-                                          </p:val>
-                                        </p:tav>
-                                        <p:tav tm="100000">
-                                          <p:val>
-                                            <p:strVal val="#ppt_y"/>
-                                          </p:val>
-                                        </p:tav>
-                                      </p:tavLst>
-                                    </p:anim>
-                                  </p:childTnLst>
-                                </p:cTn>
-                              </p:par>
-                            </p:childTnLst>
-                          </p:cTn>
-                        </p:par>
-                      </p:childTnLst>
-                    </p:cTn>
-                  </p:par>
-                  <p:par>
-                    <p:cTn id="26" fill="hold">
-                      <p:stCondLst>
-                        <p:cond delay="indefinite"/>
-                      </p:stCondLst>
-                      <p:childTnLst>
-                        <p:par>
-                          <p:cTn id="27" fill="hold">
-                            <p:stCondLst>
-                              <p:cond delay="0"/>
-                            </p:stCondLst>
-                            <p:childTnLst>
-                              <p:par>
-                                <p:cTn id="28" presetID="10" presetClass="entr" presetSubtype="0" fill="hold" nodeType="clickEffect">
-                                  <p:stCondLst>
-                                    <p:cond delay="0"/>
-                                  </p:stCondLst>
-                                  <p:childTnLst>
-                                    <p:set>
-                                      <p:cBhvr>
-                                        <p:cTn id="29" dur="1" fill="hold">
-                                          <p:stCondLst>
-                                            <p:cond delay="0"/>
-                                          </p:stCondLst>
-                                        </p:cTn>
-                                        <p:tgtEl>
-                                          <p:spTgt spid="3">
-                                            <p:txEl>
-                                              <p:pRg st="8" end="8"/>
-                                            </p:txEl>
-                                          </p:spTgt>
-                                        </p:tgtEl>
-                                        <p:attrNameLst>
-                                          <p:attrName>style.visibility</p:attrName>
-                                        </p:attrNameLst>
-                                      </p:cBhvr>
-                                      <p:to>
-                                        <p:strVal val="visible"/>
-                                      </p:to>
-                                    </p:set>
-                                    <p:animEffect transition="in" filter="fade">
-                                      <p:cBhvr>
-                                        <p:cTn id="30" dur="500"/>
-                                        <p:tgtEl>
-                                          <p:spTgt spid="3">
-                                            <p:txEl>
-                                              <p:pRg st="8" end="8"/>
-                                            </p:txEl>
-                                          </p:spTgt>
-                                        </p:tgtEl>
-                                      </p:cBhvr>
-                                    </p:animEffect>
-                                  </p:childTnLst>
-                                </p:cTn>
-                              </p:par>
-                            </p:childTnLst>
-                          </p:cTn>
-                        </p:par>
-                      </p:childTnLst>
-                    </p:cTn>
-                  </p:par>
-                </p:childTnLst>
-              </p:cTn>
-              <p:prevCondLst>
-                <p:cond evt="onPrev" delay="0">
-                  <p:tgtEl>
-                    <p:sldTgt/>
-                  </p:tgtEl>
-                </p:cond>
-              </p:prevCondLst>
-              <p:nextCondLst>
-                <p:cond evt="onNext" delay="0">
-                  <p:tgtEl>
-                    <p:sldTgt/>
-                  </p:tgtEl>
-                </p:cond>
-              </p:nextCondLst>
-            </p:seq>
-          </p:childTnLst>
-        </p:cTn>
-      </p:par>
-    </p:tnLst>
-  </p:timing>
-  <p:extLst>
-    <p:ext uri="{6950BFC3-D8DA-4A85-94F7-54DA5524770B}">
-      <p188:commentRel xmlns:p188="http://schemas.microsoft.com/office/powerpoint/2018/8/main" r:id="rId4"/>
-    </p:ext>
-  </p:extLst>
-</p:sld>
-</file>
-
 <file path=ppt/slides/slide3.xml><?xml version="1.0" encoding="utf-8"?>
 <p:sld xmlns:a="http://schemas.openxmlformats.org/drawingml/2006/main" xmlns:r="http://schemas.openxmlformats.org/officeDocument/2006/relationships" xmlns:p="http://schemas.openxmlformats.org/presentationml/2006/main">
   <p:cSld>
@@ -24246,7 +23042,7 @@
           <p:nvPr>
             <p:extLst>
               <p:ext uri="{D42A27DB-BD31-4B8C-83A1-F6EECF244321}">
-                <p14:modId xmlns:p14="http://schemas.microsoft.com/office/powerpoint/2010/main" val="42400910"/>
+                <p14:modId xmlns:p14="http://schemas.microsoft.com/office/powerpoint/2010/main" val="2930904704"/>
               </p:ext>
             </p:extLst>
           </p:nvPr>
@@ -24596,11 +23392,11 @@
                     <a:lstStyle/>
                     <a:p>
                       <a:r>
-                        <a:rPr lang="en-US" sz="2400" b="0" i="0">
+                        <a:rPr lang="en-US" sz="2400" b="0" i="0" dirty="0">
                           <a:latin typeface="Consolas" panose="020B0609020204030204" pitchFamily="49" charset="0"/>
                           <a:cs typeface="Consolas" panose="020B0609020204030204" pitchFamily="49" charset="0"/>
                         </a:rPr>
-                        <a:t>Int</a:t>
+                        <a:t>int</a:t>
                       </a:r>
                     </a:p>
                   </a:txBody>
@@ -24849,11 +23645,11 @@
                     <a:lstStyle/>
                     <a:p>
                       <a:r>
-                        <a:rPr lang="en-US" sz="2400" b="0" i="0">
+                        <a:rPr lang="en-US" sz="2400" b="0" i="0" dirty="0">
                           <a:latin typeface="Consolas" panose="020B0609020204030204" pitchFamily="49" charset="0"/>
                           <a:cs typeface="Consolas" panose="020B0609020204030204" pitchFamily="49" charset="0"/>
                         </a:rPr>
-                        <a:t>Float</a:t>
+                        <a:t>float</a:t>
                       </a:r>
                     </a:p>
                   </a:txBody>
@@ -25642,7 +24438,7 @@
                     <a:lstStyle/>
                     <a:p>
                       <a:r>
-                        <a:rPr lang="en-US" sz="2400" b="0" i="0">
+                        <a:rPr lang="en-US" sz="2400" b="0" i="0" dirty="0">
                           <a:latin typeface="Consolas" panose="020B0609020204030204" pitchFamily="49" charset="0"/>
                           <a:cs typeface="Consolas" panose="020B0609020204030204" pitchFamily="49" charset="0"/>
                         </a:rPr>
@@ -31071,12 +29867,6 @@
 </p:tagLst>
 </file>
 
-<file path=ppt/tags/tag9.xml><?xml version="1.0" encoding="utf-8"?>
-<p:tagLst xmlns:a="http://schemas.openxmlformats.org/drawingml/2006/main" xmlns:r="http://schemas.openxmlformats.org/officeDocument/2006/relationships" xmlns:p="http://schemas.openxmlformats.org/presentationml/2006/main">
-  <p:tag name="TIMING" val="|17.3|4.9|11.6|7|15.8"/>
-</p:tagLst>
-</file>
-
 <file path=ppt/theme/theme1.xml><?xml version="1.0" encoding="utf-8"?>
 <a:theme xmlns:a="http://schemas.openxmlformats.org/drawingml/2006/main" name="Office Theme">
   <a:themeElements>
@@ -31879,6 +30669,15 @@
 </file>
 
 <file path=customXml/item2.xml><?xml version="1.0" encoding="utf-8"?>
+<?mso-contentType ?>
+<FormTemplates xmlns="http://schemas.microsoft.com/sharepoint/v3/contenttype/forms">
+  <Display>DocumentLibraryForm</Display>
+  <Edit>DocumentLibraryForm</Edit>
+  <New>DocumentLibraryForm</New>
+</FormTemplates>
+</file>
+
+<file path=customXml/item3.xml><?xml version="1.0" encoding="utf-8"?>
 <p:properties xmlns:p="http://schemas.microsoft.com/office/2006/metadata/properties" xmlns:xsi="http://www.w3.org/2001/XMLSchema-instance" xmlns:pc="http://schemas.microsoft.com/office/infopath/2007/PartnerControls">
   <documentManagement>
     <lcf76f155ced4ddcb4097134ff3c332f xmlns="73469ae3-3789-4a7f-87ef-b4423e3499cf">
@@ -31887,15 +30686,6 @@
     <TaxCatchAll xmlns="370954b4-d60e-43df-a72f-328730ed82f8" xsi:nil="true"/>
   </documentManagement>
 </p:properties>
-</file>
-
-<file path=customXml/item3.xml><?xml version="1.0" encoding="utf-8"?>
-<?mso-contentType ?>
-<FormTemplates xmlns="http://schemas.microsoft.com/sharepoint/v3/contenttype/forms">
-  <Display>DocumentLibraryForm</Display>
-  <Edit>DocumentLibraryForm</Edit>
-  <New>DocumentLibraryForm</New>
-</FormTemplates>
 </file>
 
 <file path=customXml/itemProps1.xml><?xml version="1.0" encoding="utf-8"?>
@@ -31918,6 +30708,14 @@
 </file>
 
 <file path=customXml/itemProps2.xml><?xml version="1.0" encoding="utf-8"?>
+<ds:datastoreItem xmlns:ds="http://schemas.openxmlformats.org/officeDocument/2006/customXml" ds:itemID="{9D0C5B9F-7D08-4AAD-9CEA-6586D271582C}">
+  <ds:schemaRefs>
+    <ds:schemaRef ds:uri="http://schemas.microsoft.com/sharepoint/v3/contenttype/forms"/>
+  </ds:schemaRefs>
+</ds:datastoreItem>
+</file>
+
+<file path=customXml/itemProps3.xml><?xml version="1.0" encoding="utf-8"?>
 <ds:datastoreItem xmlns:ds="http://schemas.openxmlformats.org/officeDocument/2006/customXml" ds:itemID="{70E6415C-4AC8-42C2-AD5F-2544ED047B48}">
   <ds:schemaRefs>
     <ds:schemaRef ds:uri="370954b4-d60e-43df-a72f-328730ed82f8"/>
@@ -31927,12 +30725,4 @@
     <ds:schemaRef ds:uri="http://schemas.microsoft.com/office/infopath/2007/PartnerControls"/>
   </ds:schemaRefs>
 </ds:datastoreItem>
-</file>
-
-<file path=customXml/itemProps3.xml><?xml version="1.0" encoding="utf-8"?>
-<ds:datastoreItem xmlns:ds="http://schemas.openxmlformats.org/officeDocument/2006/customXml" ds:itemID="{9D0C5B9F-7D08-4AAD-9CEA-6586D271582C}">
-  <ds:schemaRefs>
-    <ds:schemaRef ds:uri="http://schemas.microsoft.com/sharepoint/v3/contenttype/forms"/>
-  </ds:schemaRefs>
-</ds:datastoreItem>
 </file>
</xml_diff>